<commit_message>
Modified various code places for visuals and whatnot
</commit_message>
<xml_diff>
--- a/files/results_slide_template.pptx
+++ b/files/results_slide_template.pptx
@@ -2,30 +2,26 @@
 <file path=ppt/presentation.xml><?xml version="1.0" encoding="utf-8"?>
 <p:presentation xmlns:a="http://schemas.openxmlformats.org/drawingml/2006/main" xmlns:r="http://schemas.openxmlformats.org/officeDocument/2006/relationships" xmlns:p="http://schemas.openxmlformats.org/presentationml/2006/main" saveSubsetFonts="1">
   <p:sldMasterIdLst>
-    <p:sldMasterId id="2147483667" r:id="rId5"/>
+    <p:sldMasterId id="2147483665" r:id="rId4"/>
   </p:sldMasterIdLst>
   <p:notesMasterIdLst>
-    <p:notesMasterId r:id="rId12"/>
+    <p:notesMasterId r:id="rId10"/>
   </p:notesMasterIdLst>
-  <p:handoutMasterIdLst>
-    <p:handoutMasterId r:id="rId13"/>
-  </p:handoutMasterIdLst>
   <p:sldIdLst>
-    <p:sldId id="573" r:id="rId6"/>
-    <p:sldId id="486" r:id="rId7"/>
-    <p:sldId id="566" r:id="rId8"/>
-    <p:sldId id="571" r:id="rId9"/>
-    <p:sldId id="572" r:id="rId10"/>
-    <p:sldId id="570" r:id="rId11"/>
+    <p:sldId id="485" r:id="rId5"/>
+    <p:sldId id="603" r:id="rId6"/>
+    <p:sldId id="617" r:id="rId7"/>
+    <p:sldId id="608" r:id="rId8"/>
+    <p:sldId id="618" r:id="rId9"/>
   </p:sldIdLst>
-  <p:sldSz cx="17373600" cy="9144000"/>
+  <p:sldSz cx="12192000" cy="6858000"/>
   <p:notesSz cx="7010400" cy="9296400"/>
   <p:defaultTextStyle>
     <a:defPPr>
       <a:defRPr lang="en-US"/>
     </a:defPPr>
-    <a:lvl1pPr marL="0" algn="l" defTabSz="1272845" rtl="0" eaLnBrk="1" latinLnBrk="0" hangingPunct="1">
-      <a:defRPr sz="2506" kern="1200">
+    <a:lvl1pPr marL="0" algn="l" defTabSz="914400" rtl="0" eaLnBrk="1" latinLnBrk="0" hangingPunct="1">
+      <a:defRPr sz="1800" kern="1200">
         <a:solidFill>
           <a:schemeClr val="tx1"/>
         </a:solidFill>
@@ -34,8 +30,8 @@
         <a:cs typeface="+mn-cs"/>
       </a:defRPr>
     </a:lvl1pPr>
-    <a:lvl2pPr marL="636422" algn="l" defTabSz="1272845" rtl="0" eaLnBrk="1" latinLnBrk="0" hangingPunct="1">
-      <a:defRPr sz="2506" kern="1200">
+    <a:lvl2pPr marL="457200" algn="l" defTabSz="914400" rtl="0" eaLnBrk="1" latinLnBrk="0" hangingPunct="1">
+      <a:defRPr sz="1800" kern="1200">
         <a:solidFill>
           <a:schemeClr val="tx1"/>
         </a:solidFill>
@@ -44,8 +40,8 @@
         <a:cs typeface="+mn-cs"/>
       </a:defRPr>
     </a:lvl2pPr>
-    <a:lvl3pPr marL="1272845" algn="l" defTabSz="1272845" rtl="0" eaLnBrk="1" latinLnBrk="0" hangingPunct="1">
-      <a:defRPr sz="2506" kern="1200">
+    <a:lvl3pPr marL="914400" algn="l" defTabSz="914400" rtl="0" eaLnBrk="1" latinLnBrk="0" hangingPunct="1">
+      <a:defRPr sz="1800" kern="1200">
         <a:solidFill>
           <a:schemeClr val="tx1"/>
         </a:solidFill>
@@ -54,8 +50,8 @@
         <a:cs typeface="+mn-cs"/>
       </a:defRPr>
     </a:lvl3pPr>
-    <a:lvl4pPr marL="1909267" algn="l" defTabSz="1272845" rtl="0" eaLnBrk="1" latinLnBrk="0" hangingPunct="1">
-      <a:defRPr sz="2506" kern="1200">
+    <a:lvl4pPr marL="1371600" algn="l" defTabSz="914400" rtl="0" eaLnBrk="1" latinLnBrk="0" hangingPunct="1">
+      <a:defRPr sz="1800" kern="1200">
         <a:solidFill>
           <a:schemeClr val="tx1"/>
         </a:solidFill>
@@ -64,8 +60,8 @@
         <a:cs typeface="+mn-cs"/>
       </a:defRPr>
     </a:lvl4pPr>
-    <a:lvl5pPr marL="2545690" algn="l" defTabSz="1272845" rtl="0" eaLnBrk="1" latinLnBrk="0" hangingPunct="1">
-      <a:defRPr sz="2506" kern="1200">
+    <a:lvl5pPr marL="1828800" algn="l" defTabSz="914400" rtl="0" eaLnBrk="1" latinLnBrk="0" hangingPunct="1">
+      <a:defRPr sz="1800" kern="1200">
         <a:solidFill>
           <a:schemeClr val="tx1"/>
         </a:solidFill>
@@ -74,8 +70,8 @@
         <a:cs typeface="+mn-cs"/>
       </a:defRPr>
     </a:lvl5pPr>
-    <a:lvl6pPr marL="3182112" algn="l" defTabSz="1272845" rtl="0" eaLnBrk="1" latinLnBrk="0" hangingPunct="1">
-      <a:defRPr sz="2506" kern="1200">
+    <a:lvl6pPr marL="2286000" algn="l" defTabSz="914400" rtl="0" eaLnBrk="1" latinLnBrk="0" hangingPunct="1">
+      <a:defRPr sz="1800" kern="1200">
         <a:solidFill>
           <a:schemeClr val="tx1"/>
         </a:solidFill>
@@ -84,8 +80,8 @@
         <a:cs typeface="+mn-cs"/>
       </a:defRPr>
     </a:lvl6pPr>
-    <a:lvl7pPr marL="3818534" algn="l" defTabSz="1272845" rtl="0" eaLnBrk="1" latinLnBrk="0" hangingPunct="1">
-      <a:defRPr sz="2506" kern="1200">
+    <a:lvl7pPr marL="2743200" algn="l" defTabSz="914400" rtl="0" eaLnBrk="1" latinLnBrk="0" hangingPunct="1">
+      <a:defRPr sz="1800" kern="1200">
         <a:solidFill>
           <a:schemeClr val="tx1"/>
         </a:solidFill>
@@ -94,8 +90,8 @@
         <a:cs typeface="+mn-cs"/>
       </a:defRPr>
     </a:lvl7pPr>
-    <a:lvl8pPr marL="4454957" algn="l" defTabSz="1272845" rtl="0" eaLnBrk="1" latinLnBrk="0" hangingPunct="1">
-      <a:defRPr sz="2506" kern="1200">
+    <a:lvl8pPr marL="3200400" algn="l" defTabSz="914400" rtl="0" eaLnBrk="1" latinLnBrk="0" hangingPunct="1">
+      <a:defRPr sz="1800" kern="1200">
         <a:solidFill>
           <a:schemeClr val="tx1"/>
         </a:solidFill>
@@ -104,8 +100,8 @@
         <a:cs typeface="+mn-cs"/>
       </a:defRPr>
     </a:lvl8pPr>
-    <a:lvl9pPr marL="5091379" algn="l" defTabSz="1272845" rtl="0" eaLnBrk="1" latinLnBrk="0" hangingPunct="1">
-      <a:defRPr sz="2506" kern="1200">
+    <a:lvl9pPr marL="3657600" algn="l" defTabSz="914400" rtl="0" eaLnBrk="1" latinLnBrk="0" hangingPunct="1">
+      <a:defRPr sz="1800" kern="1200">
         <a:solidFill>
           <a:schemeClr val="tx1"/>
         </a:solidFill>
@@ -117,201 +113,17 @@
   </p:defaultTextStyle>
   <p:extLst>
     <p:ext uri="{EFAFB233-063F-42B5-8137-9DF3F51BA10A}">
-      <p15:sldGuideLst xmlns:p15="http://schemas.microsoft.com/office/powerpoint/2012/main">
-        <p15:guide id="1" orient="horz" pos="1216" userDrawn="1">
-          <p15:clr>
-            <a:srgbClr val="A4A3A4"/>
-          </p15:clr>
-        </p15:guide>
-        <p15:guide id="2" pos="410" userDrawn="1">
-          <p15:clr>
-            <a:srgbClr val="A4A3A4"/>
-          </p15:clr>
-        </p15:guide>
-      </p15:sldGuideLst>
-    </p:ext>
-    <p:ext uri="{2D200454-40CA-4A62-9FC3-DE9A4176ACB9}">
-      <p15:notesGuideLst xmlns:p15="http://schemas.microsoft.com/office/powerpoint/2012/main"/>
+      <p15:sldGuideLst xmlns:p15="http://schemas.microsoft.com/office/powerpoint/2012/main"/>
     </p:ext>
   </p:extLst>
 </p:presentation>
 </file>
 
-<file path=ppt/commentAuthors.xml><?xml version="1.0" encoding="utf-8"?>
-<p:cmAuthorLst xmlns:a="http://schemas.openxmlformats.org/drawingml/2006/main" xmlns:r="http://schemas.openxmlformats.org/officeDocument/2006/relationships" xmlns:p="http://schemas.openxmlformats.org/presentationml/2006/main">
-  <p:cmAuthor id="1" name="CRAWFORD, CORDELL Capt USAF AFPC AFPC/DP3" initials="CCCUAA" lastIdx="4" clrIdx="0">
-    <p:extLst>
-      <p:ext uri="{19B8F6BF-5375-455C-9EA6-DF929625EA0E}">
-        <p15:presenceInfo xmlns:p15="http://schemas.microsoft.com/office/powerpoint/2012/main" userId="S-1-5-21-1271409858-1095883707-2794662393-2309478" providerId="AD"/>
-      </p:ext>
-    </p:extLst>
-  </p:cmAuthor>
-</p:cmAuthorLst>
-</file>
-
-<file path=ppt/handoutMasters/handoutMaster1.xml><?xml version="1.0" encoding="utf-8"?>
-<p:handoutMaster xmlns:a="http://schemas.openxmlformats.org/drawingml/2006/main" xmlns:r="http://schemas.openxmlformats.org/officeDocument/2006/relationships" xmlns:p="http://schemas.openxmlformats.org/presentationml/2006/main">
-  <p:cSld>
-    <p:bg>
-      <p:bgRef idx="1001">
-        <a:schemeClr val="bg1"/>
-      </p:bgRef>
-    </p:bg>
-    <p:spTree>
-      <p:nvGrpSpPr>
-        <p:cNvPr id="1" name=""/>
-        <p:cNvGrpSpPr/>
-        <p:nvPr/>
-      </p:nvGrpSpPr>
-      <p:grpSpPr>
-        <a:xfrm>
-          <a:off x="0" y="0"/>
-          <a:ext cx="0" cy="0"/>
-          <a:chOff x="0" y="0"/>
-          <a:chExt cx="0" cy="0"/>
-        </a:xfrm>
-      </p:grpSpPr>
-      <p:sp>
-        <p:nvSpPr>
-          <p:cNvPr id="2" name="Header Placeholder 1"/>
-          <p:cNvSpPr>
-            <a:spLocks noGrp="1"/>
-          </p:cNvSpPr>
-          <p:nvPr>
-            <p:ph type="hdr" sz="quarter"/>
-          </p:nvPr>
-        </p:nvSpPr>
-        <p:spPr>
-          <a:xfrm>
-            <a:off x="1" y="1"/>
-            <a:ext cx="3038475" cy="466725"/>
-          </a:xfrm>
-          <a:prstGeom prst="rect">
-            <a:avLst/>
-          </a:prstGeom>
-        </p:spPr>
-        <p:txBody>
-          <a:bodyPr vert="horz" lIns="91430" tIns="45716" rIns="91430" bIns="45716" rtlCol="0"/>
-          <a:lstStyle>
-            <a:lvl1pPr algn="l">
-              <a:defRPr sz="1200"/>
-            </a:lvl1pPr>
-          </a:lstStyle>
-          <a:p>
-            <a:endParaRPr lang="en-US"/>
-          </a:p>
-        </p:txBody>
-      </p:sp>
-      <p:sp>
-        <p:nvSpPr>
-          <p:cNvPr id="3" name="Date Placeholder 2"/>
-          <p:cNvSpPr>
-            <a:spLocks noGrp="1"/>
-          </p:cNvSpPr>
-          <p:nvPr>
-            <p:ph type="dt" sz="quarter" idx="1"/>
-          </p:nvPr>
-        </p:nvSpPr>
-        <p:spPr>
-          <a:xfrm>
-            <a:off x="3970339" y="1"/>
-            <a:ext cx="3038475" cy="466725"/>
-          </a:xfrm>
-          <a:prstGeom prst="rect">
-            <a:avLst/>
-          </a:prstGeom>
-        </p:spPr>
-        <p:txBody>
-          <a:bodyPr vert="horz" lIns="91430" tIns="45716" rIns="91430" bIns="45716" rtlCol="0"/>
-          <a:lstStyle>
-            <a:lvl1pPr algn="r">
-              <a:defRPr sz="1200"/>
-            </a:lvl1pPr>
-          </a:lstStyle>
-          <a:p>
-            <a:fld id="{79DA5ED4-EB0C-4B4E-8C51-94A27C68E340}" type="datetimeFigureOut">
-              <a:rPr lang="en-US" smtClean="0"/>
-              <a:t>10/15/23</a:t>
-            </a:fld>
-            <a:endParaRPr lang="en-US"/>
-          </a:p>
-        </p:txBody>
-      </p:sp>
-      <p:sp>
-        <p:nvSpPr>
-          <p:cNvPr id="4" name="Footer Placeholder 3"/>
-          <p:cNvSpPr>
-            <a:spLocks noGrp="1"/>
-          </p:cNvSpPr>
-          <p:nvPr>
-            <p:ph type="ftr" sz="quarter" idx="2"/>
-          </p:nvPr>
-        </p:nvSpPr>
-        <p:spPr>
-          <a:xfrm>
-            <a:off x="1" y="8829676"/>
-            <a:ext cx="3038475" cy="466725"/>
-          </a:xfrm>
-          <a:prstGeom prst="rect">
-            <a:avLst/>
-          </a:prstGeom>
-        </p:spPr>
-        <p:txBody>
-          <a:bodyPr vert="horz" lIns="91430" tIns="45716" rIns="91430" bIns="45716" rtlCol="0" anchor="b"/>
-          <a:lstStyle>
-            <a:lvl1pPr algn="l">
-              <a:defRPr sz="1200"/>
-            </a:lvl1pPr>
-          </a:lstStyle>
-          <a:p>
-            <a:endParaRPr lang="en-US"/>
-          </a:p>
-        </p:txBody>
-      </p:sp>
-      <p:sp>
-        <p:nvSpPr>
-          <p:cNvPr id="5" name="Slide Number Placeholder 4"/>
-          <p:cNvSpPr>
-            <a:spLocks noGrp="1"/>
-          </p:cNvSpPr>
-          <p:nvPr>
-            <p:ph type="sldNum" sz="quarter" idx="3"/>
-          </p:nvPr>
-        </p:nvSpPr>
-        <p:spPr>
-          <a:xfrm>
-            <a:off x="3970339" y="8829676"/>
-            <a:ext cx="3038475" cy="466725"/>
-          </a:xfrm>
-          <a:prstGeom prst="rect">
-            <a:avLst/>
-          </a:prstGeom>
-        </p:spPr>
-        <p:txBody>
-          <a:bodyPr vert="horz" lIns="91430" tIns="45716" rIns="91430" bIns="45716" rtlCol="0" anchor="b"/>
-          <a:lstStyle>
-            <a:lvl1pPr algn="r">
-              <a:defRPr sz="1200"/>
-            </a:lvl1pPr>
-          </a:lstStyle>
-          <a:p>
-            <a:fld id="{EDA3CF76-CE61-4772-8BA7-874DA28C06CD}" type="slidenum">
-              <a:rPr lang="en-US" smtClean="0"/>
-              <a:t>‹#›</a:t>
-            </a:fld>
-            <a:endParaRPr lang="en-US"/>
-          </a:p>
-        </p:txBody>
-      </p:sp>
-    </p:spTree>
-    <p:extLst>
-      <p:ext uri="{BB962C8B-B14F-4D97-AF65-F5344CB8AC3E}">
-        <p14:creationId xmlns:p14="http://schemas.microsoft.com/office/powerpoint/2010/main" val="34758243"/>
-      </p:ext>
-    </p:extLst>
-  </p:cSld>
-  <p:clrMap bg1="lt1" tx1="dk1" bg2="lt2" tx2="dk2" accent1="accent1" accent2="accent2" accent3="accent3" accent4="accent4" accent5="accent5" accent6="accent6" hlink="hlink" folHlink="folHlink"/>
-</p:handoutMaster>
+<file path=ppt/authors.xml><?xml version="1.0" encoding="utf-8"?>
+<p188:authorLst xmlns:a="http://schemas.openxmlformats.org/drawingml/2006/main" xmlns:r="http://schemas.openxmlformats.org/officeDocument/2006/relationships" xmlns:p188="http://schemas.microsoft.com/office/powerpoint/2018/8/main">
+  <p188:author id="{3544F0CA-393E-957A-E989-AD8D8FE93BD1}" name="BRYANT, JACOB F Capt USAF AFPC AFPC/DSYA" initials="BA" userId="S::jacob.bryant.6@us.af.mil::42805d1b-1273-417c-b17d-184bc3aba260" providerId="AD"/>
+  <p188:author id="{6FD21AFD-9F60-58AE-85B5-FA7D6E6652DD}" name="KUMMER, MACKENZIE J 2d Lt USAF AFPC AFPC/DSYA" initials="KA" userId="S::mackenzie.kummer.1@us.af.mil::5ad04d3e-a5d8-4562-96ae-07e8a6afdfa0" providerId="AD"/>
+</p188:authorLst>
 </file>
 
 <file path=ppt/notesMasters/notesMaster1.xml><?xml version="1.0" encoding="utf-8"?>
@@ -348,15 +160,15 @@
         </p:nvSpPr>
         <p:spPr>
           <a:xfrm>
-            <a:off x="1" y="0"/>
-            <a:ext cx="3037840" cy="464820"/>
+            <a:off x="0" y="0"/>
+            <a:ext cx="3037840" cy="466434"/>
           </a:xfrm>
           <a:prstGeom prst="rect">
             <a:avLst/>
           </a:prstGeom>
         </p:spPr>
         <p:txBody>
-          <a:bodyPr vert="horz" lIns="93896" tIns="46948" rIns="93896" bIns="46948" rtlCol="0"/>
+          <a:bodyPr vert="horz" lIns="93177" tIns="46589" rIns="93177" bIns="46589" rtlCol="0"/>
           <a:lstStyle>
             <a:lvl1pPr algn="l">
               <a:defRPr sz="1200"/>
@@ -379,24 +191,24 @@
         </p:nvSpPr>
         <p:spPr>
           <a:xfrm>
-            <a:off x="3970940" y="0"/>
-            <a:ext cx="3037840" cy="464820"/>
+            <a:off x="3970938" y="0"/>
+            <a:ext cx="3037840" cy="466434"/>
           </a:xfrm>
           <a:prstGeom prst="rect">
             <a:avLst/>
           </a:prstGeom>
         </p:spPr>
         <p:txBody>
-          <a:bodyPr vert="horz" lIns="93896" tIns="46948" rIns="93896" bIns="46948" rtlCol="0"/>
+          <a:bodyPr vert="horz" lIns="93177" tIns="46589" rIns="93177" bIns="46589" rtlCol="0"/>
           <a:lstStyle>
             <a:lvl1pPr algn="r">
               <a:defRPr sz="1200"/>
             </a:lvl1pPr>
           </a:lstStyle>
           <a:p>
-            <a:fld id="{48D4C88B-B199-4F70-A6AF-3918D986A20D}" type="datetimeFigureOut">
+            <a:fld id="{F1FB89E9-A828-4633-A683-FD5E2772D2C2}" type="datetimeFigureOut">
               <a:rPr lang="en-US" smtClean="0"/>
-              <a:t>10/15/23</a:t>
+              <a:t>4/16/25</a:t>
             </a:fld>
             <a:endParaRPr lang="en-US"/>
           </a:p>
@@ -414,8 +226,8 @@
         </p:nvSpPr>
         <p:spPr>
           <a:xfrm>
-            <a:off x="193675" y="696913"/>
-            <a:ext cx="6623050" cy="3486150"/>
+            <a:off x="717550" y="1162050"/>
+            <a:ext cx="5575300" cy="3136900"/>
           </a:xfrm>
           <a:prstGeom prst="rect">
             <a:avLst/>
@@ -428,7 +240,7 @@
           </a:ln>
         </p:spPr>
         <p:txBody>
-          <a:bodyPr vert="horz" lIns="93896" tIns="46948" rIns="93896" bIns="46948" rtlCol="0" anchor="ctr"/>
+          <a:bodyPr vert="horz" lIns="93177" tIns="46589" rIns="93177" bIns="46589" rtlCol="0" anchor="ctr"/>
           <a:lstStyle/>
           <a:p>
             <a:endParaRPr lang="en-US"/>
@@ -447,15 +259,15 @@
         </p:nvSpPr>
         <p:spPr>
           <a:xfrm>
-            <a:off x="701040" y="4415791"/>
-            <a:ext cx="5608320" cy="4183380"/>
+            <a:off x="701040" y="4473892"/>
+            <a:ext cx="5608320" cy="3660458"/>
           </a:xfrm>
           <a:prstGeom prst="rect">
             <a:avLst/>
           </a:prstGeom>
         </p:spPr>
         <p:txBody>
-          <a:bodyPr vert="horz" lIns="93896" tIns="46948" rIns="93896" bIns="46948" rtlCol="0"/>
+          <a:bodyPr vert="horz" lIns="93177" tIns="46589" rIns="93177" bIns="46589" rtlCol="0"/>
           <a:lstStyle/>
           <a:p>
             <a:pPr lvl="0"/>
@@ -506,15 +318,15 @@
         </p:nvSpPr>
         <p:spPr>
           <a:xfrm>
-            <a:off x="1" y="8829968"/>
-            <a:ext cx="3037840" cy="464820"/>
+            <a:off x="0" y="8829967"/>
+            <a:ext cx="3037840" cy="466433"/>
           </a:xfrm>
           <a:prstGeom prst="rect">
             <a:avLst/>
           </a:prstGeom>
         </p:spPr>
         <p:txBody>
-          <a:bodyPr vert="horz" lIns="93896" tIns="46948" rIns="93896" bIns="46948" rtlCol="0" anchor="b"/>
+          <a:bodyPr vert="horz" lIns="93177" tIns="46589" rIns="93177" bIns="46589" rtlCol="0" anchor="b"/>
           <a:lstStyle>
             <a:lvl1pPr algn="l">
               <a:defRPr sz="1200"/>
@@ -537,22 +349,22 @@
         </p:nvSpPr>
         <p:spPr>
           <a:xfrm>
-            <a:off x="3970940" y="8829968"/>
-            <a:ext cx="3037840" cy="464820"/>
+            <a:off x="3970938" y="8829967"/>
+            <a:ext cx="3037840" cy="466433"/>
           </a:xfrm>
           <a:prstGeom prst="rect">
             <a:avLst/>
           </a:prstGeom>
         </p:spPr>
         <p:txBody>
-          <a:bodyPr vert="horz" lIns="93896" tIns="46948" rIns="93896" bIns="46948" rtlCol="0" anchor="b"/>
+          <a:bodyPr vert="horz" lIns="93177" tIns="46589" rIns="93177" bIns="46589" rtlCol="0" anchor="b"/>
           <a:lstStyle>
             <a:lvl1pPr algn="r">
               <a:defRPr sz="1200"/>
             </a:lvl1pPr>
           </a:lstStyle>
           <a:p>
-            <a:fld id="{231E98F9-45F7-4364-8D04-E6ED2AEB5B67}" type="slidenum">
+            <a:fld id="{7A4C0291-A1E1-4357-AC55-40FD262AF757}" type="slidenum">
               <a:rPr lang="en-US" smtClean="0"/>
               <a:t>‹#›</a:t>
             </a:fld>
@@ -563,14 +375,14 @@
     </p:spTree>
     <p:extLst>
       <p:ext uri="{BB962C8B-B14F-4D97-AF65-F5344CB8AC3E}">
-        <p14:creationId xmlns:p14="http://schemas.microsoft.com/office/powerpoint/2010/main" val="3805571045"/>
+        <p14:creationId xmlns:p14="http://schemas.microsoft.com/office/powerpoint/2010/main" val="3377134922"/>
       </p:ext>
     </p:extLst>
   </p:cSld>
   <p:clrMap bg1="lt1" tx1="dk1" bg2="lt2" tx2="dk2" accent1="accent1" accent2="accent2" accent3="accent3" accent4="accent4" accent5="accent5" accent6="accent6" hlink="hlink" folHlink="folHlink"/>
   <p:notesStyle>
-    <a:lvl1pPr marL="0" algn="l" defTabSz="1272845" rtl="0" eaLnBrk="1" latinLnBrk="0" hangingPunct="1">
-      <a:defRPr sz="1670" kern="1200">
+    <a:lvl1pPr marL="0" algn="l" defTabSz="914400" rtl="0" eaLnBrk="1" latinLnBrk="0" hangingPunct="1">
+      <a:defRPr sz="1200" kern="1200">
         <a:solidFill>
           <a:schemeClr val="tx1"/>
         </a:solidFill>
@@ -579,8 +391,8 @@
         <a:cs typeface="+mn-cs"/>
       </a:defRPr>
     </a:lvl1pPr>
-    <a:lvl2pPr marL="636422" algn="l" defTabSz="1272845" rtl="0" eaLnBrk="1" latinLnBrk="0" hangingPunct="1">
-      <a:defRPr sz="1670" kern="1200">
+    <a:lvl2pPr marL="457200" algn="l" defTabSz="914400" rtl="0" eaLnBrk="1" latinLnBrk="0" hangingPunct="1">
+      <a:defRPr sz="1200" kern="1200">
         <a:solidFill>
           <a:schemeClr val="tx1"/>
         </a:solidFill>
@@ -589,8 +401,8 @@
         <a:cs typeface="+mn-cs"/>
       </a:defRPr>
     </a:lvl2pPr>
-    <a:lvl3pPr marL="1272845" algn="l" defTabSz="1272845" rtl="0" eaLnBrk="1" latinLnBrk="0" hangingPunct="1">
-      <a:defRPr sz="1670" kern="1200">
+    <a:lvl3pPr marL="914400" algn="l" defTabSz="914400" rtl="0" eaLnBrk="1" latinLnBrk="0" hangingPunct="1">
+      <a:defRPr sz="1200" kern="1200">
         <a:solidFill>
           <a:schemeClr val="tx1"/>
         </a:solidFill>
@@ -599,8 +411,8 @@
         <a:cs typeface="+mn-cs"/>
       </a:defRPr>
     </a:lvl3pPr>
-    <a:lvl4pPr marL="1909267" algn="l" defTabSz="1272845" rtl="0" eaLnBrk="1" latinLnBrk="0" hangingPunct="1">
-      <a:defRPr sz="1670" kern="1200">
+    <a:lvl4pPr marL="1371600" algn="l" defTabSz="914400" rtl="0" eaLnBrk="1" latinLnBrk="0" hangingPunct="1">
+      <a:defRPr sz="1200" kern="1200">
         <a:solidFill>
           <a:schemeClr val="tx1"/>
         </a:solidFill>
@@ -609,8 +421,8 @@
         <a:cs typeface="+mn-cs"/>
       </a:defRPr>
     </a:lvl4pPr>
-    <a:lvl5pPr marL="2545690" algn="l" defTabSz="1272845" rtl="0" eaLnBrk="1" latinLnBrk="0" hangingPunct="1">
-      <a:defRPr sz="1670" kern="1200">
+    <a:lvl5pPr marL="1828800" algn="l" defTabSz="914400" rtl="0" eaLnBrk="1" latinLnBrk="0" hangingPunct="1">
+      <a:defRPr sz="1200" kern="1200">
         <a:solidFill>
           <a:schemeClr val="tx1"/>
         </a:solidFill>
@@ -619,8 +431,8 @@
         <a:cs typeface="+mn-cs"/>
       </a:defRPr>
     </a:lvl5pPr>
-    <a:lvl6pPr marL="3182112" algn="l" defTabSz="1272845" rtl="0" eaLnBrk="1" latinLnBrk="0" hangingPunct="1">
-      <a:defRPr sz="1670" kern="1200">
+    <a:lvl6pPr marL="2286000" algn="l" defTabSz="914400" rtl="0" eaLnBrk="1" latinLnBrk="0" hangingPunct="1">
+      <a:defRPr sz="1200" kern="1200">
         <a:solidFill>
           <a:schemeClr val="tx1"/>
         </a:solidFill>
@@ -629,8 +441,8 @@
         <a:cs typeface="+mn-cs"/>
       </a:defRPr>
     </a:lvl6pPr>
-    <a:lvl7pPr marL="3818534" algn="l" defTabSz="1272845" rtl="0" eaLnBrk="1" latinLnBrk="0" hangingPunct="1">
-      <a:defRPr sz="1670" kern="1200">
+    <a:lvl7pPr marL="2743200" algn="l" defTabSz="914400" rtl="0" eaLnBrk="1" latinLnBrk="0" hangingPunct="1">
+      <a:defRPr sz="1200" kern="1200">
         <a:solidFill>
           <a:schemeClr val="tx1"/>
         </a:solidFill>
@@ -639,8 +451,8 @@
         <a:cs typeface="+mn-cs"/>
       </a:defRPr>
     </a:lvl7pPr>
-    <a:lvl8pPr marL="4454957" algn="l" defTabSz="1272845" rtl="0" eaLnBrk="1" latinLnBrk="0" hangingPunct="1">
-      <a:defRPr sz="1670" kern="1200">
+    <a:lvl8pPr marL="3200400" algn="l" defTabSz="914400" rtl="0" eaLnBrk="1" latinLnBrk="0" hangingPunct="1">
+      <a:defRPr sz="1200" kern="1200">
         <a:solidFill>
           <a:schemeClr val="tx1"/>
         </a:solidFill>
@@ -649,8 +461,8 @@
         <a:cs typeface="+mn-cs"/>
       </a:defRPr>
     </a:lvl8pPr>
-    <a:lvl9pPr marL="5091379" algn="l" defTabSz="1272845" rtl="0" eaLnBrk="1" latinLnBrk="0" hangingPunct="1">
-      <a:defRPr sz="1670" kern="1200">
+    <a:lvl9pPr marL="3657600" algn="l" defTabSz="914400" rtl="0" eaLnBrk="1" latinLnBrk="0" hangingPunct="1">
+      <a:defRPr sz="1200" kern="1200">
         <a:solidFill>
           <a:schemeClr val="tx1"/>
         </a:solidFill>
@@ -682,9 +494,50 @@
       </p:grpSpPr>
       <p:sp>
         <p:nvSpPr>
-          <p:cNvPr id="2" name="Slide Image Placeholder 1"/>
+          <p:cNvPr id="40962" name="Rectangle 7"/>
           <p:cNvSpPr>
-            <a:spLocks noGrp="1" noRot="1" noChangeAspect="1"/>
+            <a:spLocks noGrp="1" noChangeArrowheads="1"/>
+          </p:cNvSpPr>
+          <p:nvPr>
+            <p:ph type="sldNum" sz="quarter" idx="5"/>
+          </p:nvPr>
+        </p:nvSpPr>
+        <p:spPr>
+          <a:noFill/>
+        </p:spPr>
+        <p:txBody>
+          <a:bodyPr/>
+          <a:lstStyle/>
+          <a:p>
+            <a:pPr defTabSz="931774">
+              <a:defRPr/>
+            </a:pPr>
+            <a:fld id="{E3FB7272-D954-4397-B612-A34B18275158}" type="slidenum">
+              <a:rPr lang="en-US">
+                <a:solidFill>
+                  <a:srgbClr val="000000"/>
+                </a:solidFill>
+                <a:latin typeface="Arial" pitchFamily="34" charset="0"/>
+              </a:rPr>
+              <a:pPr defTabSz="931774">
+                <a:defRPr/>
+              </a:pPr>
+              <a:t>1</a:t>
+            </a:fld>
+            <a:endParaRPr lang="en-US">
+              <a:solidFill>
+                <a:srgbClr val="000000"/>
+              </a:solidFill>
+              <a:latin typeface="Arial" pitchFamily="34" charset="0"/>
+            </a:endParaRPr>
+          </a:p>
+        </p:txBody>
+      </p:sp>
+      <p:sp>
+        <p:nvSpPr>
+          <p:cNvPr id="40963" name="Rectangle 2"/>
+          <p:cNvSpPr>
+            <a:spLocks noGrp="1" noRot="1" noChangeAspect="1" noChangeArrowheads="1" noTextEdit="1"/>
           </p:cNvSpPr>
           <p:nvPr>
             <p:ph type="sldImg"/>
@@ -692,16 +545,17 @@
         </p:nvSpPr>
         <p:spPr>
           <a:xfrm>
-            <a:off x="193675" y="696913"/>
-            <a:ext cx="6623050" cy="3486150"/>
+            <a:off x="430213" y="706438"/>
+            <a:ext cx="6292850" cy="3540125"/>
           </a:xfrm>
+          <a:ln/>
         </p:spPr>
       </p:sp>
       <p:sp>
         <p:nvSpPr>
-          <p:cNvPr id="3" name="Notes Placeholder 2"/>
+          <p:cNvPr id="40964" name="Rectangle 3"/>
           <p:cNvSpPr>
-            <a:spLocks noGrp="1"/>
+            <a:spLocks noGrp="1" noChangeArrowheads="1"/>
           </p:cNvSpPr>
           <p:nvPr>
             <p:ph type="body" idx="1"/>
@@ -709,46 +563,24 @@
         </p:nvSpPr>
         <p:spPr>
           <a:xfrm>
-            <a:off x="405665" y="4410402"/>
-            <a:ext cx="6186393" cy="4177356"/>
+            <a:off x="414680" y="4483909"/>
+            <a:ext cx="6323868" cy="4246979"/>
           </a:xfrm>
+          <a:noFill/>
+          <a:ln/>
         </p:spPr>
         <p:txBody>
           <a:bodyPr/>
           <a:lstStyle/>
           <a:p>
-            <a:endParaRPr lang="en-US" dirty="0"/>
-          </a:p>
-        </p:txBody>
-      </p:sp>
-      <p:sp>
-        <p:nvSpPr>
-          <p:cNvPr id="4" name="Slide Number Placeholder 3"/>
-          <p:cNvSpPr>
-            <a:spLocks noGrp="1"/>
-          </p:cNvSpPr>
-          <p:nvPr>
-            <p:ph type="sldNum" sz="quarter" idx="10"/>
-          </p:nvPr>
-        </p:nvSpPr>
-        <p:spPr/>
-        <p:txBody>
-          <a:bodyPr/>
-          <a:lstStyle/>
-          <a:p>
-            <a:fld id="{5D00C90A-46E3-4F6E-95A0-391D41793F45}" type="slidenum">
-              <a:rPr lang="en-US" smtClean="0"/>
-              <a:pPr/>
-              <a:t>2</a:t>
-            </a:fld>
-            <a:endParaRPr lang="en-US"/>
+            <a:endParaRPr lang="ru-RU"/>
           </a:p>
         </p:txBody>
       </p:sp>
     </p:spTree>
     <p:extLst>
       <p:ext uri="{BB962C8B-B14F-4D97-AF65-F5344CB8AC3E}">
-        <p14:creationId xmlns:p14="http://schemas.microsoft.com/office/powerpoint/2010/main" val="1924392106"/>
+        <p14:creationId xmlns:p14="http://schemas.microsoft.com/office/powerpoint/2010/main" val="3146099115"/>
       </p:ext>
     </p:extLst>
   </p:cSld>
@@ -785,12 +617,7 @@
             <p:ph type="sldImg"/>
           </p:nvPr>
         </p:nvSpPr>
-        <p:spPr>
-          <a:xfrm>
-            <a:off x="193675" y="696913"/>
-            <a:ext cx="6623050" cy="3486150"/>
-          </a:xfrm>
-        </p:spPr>
+        <p:spPr/>
       </p:sp>
       <p:sp>
         <p:nvSpPr>
@@ -802,12 +629,17 @@
             <p:ph type="body" idx="1"/>
           </p:nvPr>
         </p:nvSpPr>
-        <p:spPr/>
+        <p:spPr>
+          <a:xfrm>
+            <a:off x="414680" y="4483909"/>
+            <a:ext cx="6323868" cy="4246979"/>
+          </a:xfrm>
+        </p:spPr>
         <p:txBody>
           <a:bodyPr/>
           <a:lstStyle/>
           <a:p>
-            <a:endParaRPr lang="en-US" dirty="0"/>
+            <a:endParaRPr lang="en-US"/>
           </a:p>
         </p:txBody>
       </p:sp>
@@ -826,9 +658,10 @@
           <a:bodyPr/>
           <a:lstStyle/>
           <a:p>
-            <a:fld id="{231E98F9-45F7-4364-8D04-E6ED2AEB5B67}" type="slidenum">
+            <a:fld id="{5D00C90A-46E3-4F6E-95A0-391D41793F45}" type="slidenum">
               <a:rPr lang="en-US" smtClean="0"/>
-              <a:t>3</a:t>
+              <a:pPr/>
+              <a:t>2</a:t>
             </a:fld>
             <a:endParaRPr lang="en-US"/>
           </a:p>
@@ -837,100 +670,7 @@
     </p:spTree>
     <p:extLst>
       <p:ext uri="{BB962C8B-B14F-4D97-AF65-F5344CB8AC3E}">
-        <p14:creationId xmlns:p14="http://schemas.microsoft.com/office/powerpoint/2010/main" val="2616304433"/>
-      </p:ext>
-    </p:extLst>
-  </p:cSld>
-  <p:clrMapOvr>
-    <a:masterClrMapping/>
-  </p:clrMapOvr>
-</p:notes>
-</file>
-
-<file path=ppt/notesSlides/notesSlide3.xml><?xml version="1.0" encoding="utf-8"?>
-<p:notes xmlns:a="http://schemas.openxmlformats.org/drawingml/2006/main" xmlns:r="http://schemas.openxmlformats.org/officeDocument/2006/relationships" xmlns:p="http://schemas.openxmlformats.org/presentationml/2006/main">
-  <p:cSld>
-    <p:spTree>
-      <p:nvGrpSpPr>
-        <p:cNvPr id="1" name=""/>
-        <p:cNvGrpSpPr/>
-        <p:nvPr/>
-      </p:nvGrpSpPr>
-      <p:grpSpPr>
-        <a:xfrm>
-          <a:off x="0" y="0"/>
-          <a:ext cx="0" cy="0"/>
-          <a:chOff x="0" y="0"/>
-          <a:chExt cx="0" cy="0"/>
-        </a:xfrm>
-      </p:grpSpPr>
-      <p:sp>
-        <p:nvSpPr>
-          <p:cNvPr id="2" name="Slide Image Placeholder 1"/>
-          <p:cNvSpPr>
-            <a:spLocks noGrp="1" noRot="1" noChangeAspect="1"/>
-          </p:cNvSpPr>
-          <p:nvPr>
-            <p:ph type="sldImg"/>
-          </p:nvPr>
-        </p:nvSpPr>
-        <p:spPr>
-          <a:xfrm>
-            <a:off x="193675" y="696913"/>
-            <a:ext cx="6623050" cy="3486150"/>
-          </a:xfrm>
-        </p:spPr>
-      </p:sp>
-      <p:sp>
-        <p:nvSpPr>
-          <p:cNvPr id="3" name="Notes Placeholder 2"/>
-          <p:cNvSpPr>
-            <a:spLocks noGrp="1"/>
-          </p:cNvSpPr>
-          <p:nvPr>
-            <p:ph type="body" idx="1"/>
-          </p:nvPr>
-        </p:nvSpPr>
-        <p:spPr/>
-        <p:txBody>
-          <a:bodyPr/>
-          <a:lstStyle/>
-          <a:p>
-            <a:pPr marL="171176" indent="-171176">
-              <a:buFontTx/>
-              <a:buChar char="-"/>
-            </a:pPr>
-            <a:endParaRPr lang="en-US" dirty="0"/>
-          </a:p>
-        </p:txBody>
-      </p:sp>
-      <p:sp>
-        <p:nvSpPr>
-          <p:cNvPr id="4" name="Slide Number Placeholder 3"/>
-          <p:cNvSpPr>
-            <a:spLocks noGrp="1"/>
-          </p:cNvSpPr>
-          <p:nvPr>
-            <p:ph type="sldNum" sz="quarter" idx="10"/>
-          </p:nvPr>
-        </p:nvSpPr>
-        <p:spPr/>
-        <p:txBody>
-          <a:bodyPr/>
-          <a:lstStyle/>
-          <a:p>
-            <a:fld id="{231E98F9-45F7-4364-8D04-E6ED2AEB5B67}" type="slidenum">
-              <a:rPr lang="en-US" smtClean="0"/>
-              <a:t>6</a:t>
-            </a:fld>
-            <a:endParaRPr lang="en-US"/>
-          </a:p>
-        </p:txBody>
-      </p:sp>
-    </p:spTree>
-    <p:extLst>
-      <p:ext uri="{BB962C8B-B14F-4D97-AF65-F5344CB8AC3E}">
-        <p14:creationId xmlns:p14="http://schemas.microsoft.com/office/powerpoint/2010/main" val="816133007"/>
+        <p14:creationId xmlns:p14="http://schemas.microsoft.com/office/powerpoint/2010/main" val="803933513"/>
       </p:ext>
     </p:extLst>
   </p:cSld>
@@ -941,7 +681,7 @@
 </file>
 
 <file path=ppt/slideLayouts/slideLayout1.xml><?xml version="1.0" encoding="utf-8"?>
-<p:sldLayout xmlns:a="http://schemas.openxmlformats.org/drawingml/2006/main" xmlns:r="http://schemas.openxmlformats.org/officeDocument/2006/relationships" xmlns:p="http://schemas.openxmlformats.org/presentationml/2006/main" showMasterSp="0" preserve="1" userDrawn="1">
+<p:sldLayout xmlns:a="http://schemas.openxmlformats.org/drawingml/2006/main" xmlns:r="http://schemas.openxmlformats.org/officeDocument/2006/relationships" xmlns:p="http://schemas.openxmlformats.org/presentationml/2006/main" showMasterSp="0" type="title" preserve="1">
   <p:cSld name="Title Slide">
     <p:spTree>
       <p:nvGrpSpPr>
@@ -959,46 +699,7 @@
       </p:grpSpPr>
       <p:sp>
         <p:nvSpPr>
-          <p:cNvPr id="13" name="Content Placeholder 12">
-            <a:extLst>
-              <a:ext uri="{FF2B5EF4-FFF2-40B4-BE49-F238E27FC236}">
-                <a16:creationId xmlns:a16="http://schemas.microsoft.com/office/drawing/2014/main" id="{FBA50BA9-2AD0-3BE1-8988-7C5AE9431A9B}"/>
-              </a:ext>
-            </a:extLst>
-          </p:cNvPr>
-          <p:cNvSpPr>
-            <a:spLocks noGrp="1"/>
-          </p:cNvSpPr>
-          <p:nvPr>
-            <p:ph sz="quarter" idx="12"/>
-          </p:nvPr>
-        </p:nvSpPr>
-        <p:spPr>
-          <a:xfrm>
-            <a:off x="7975600" y="6648451"/>
-            <a:ext cx="8128000" cy="1323631"/>
-          </a:xfrm>
-        </p:spPr>
-        <p:txBody>
-          <a:bodyPr/>
-          <a:lstStyle>
-            <a:lvl1pPr marL="0" indent="0" algn="r">
-              <a:spcBef>
-                <a:spcPts val="0"/>
-              </a:spcBef>
-              <a:buNone/>
-              <a:defRPr/>
-            </a:lvl1pPr>
-          </a:lstStyle>
-          <a:p>
-            <a:pPr lvl="0"/>
-            <a:endParaRPr lang="en-US" dirty="0"/>
-          </a:p>
-        </p:txBody>
-      </p:sp>
-      <p:sp>
-        <p:nvSpPr>
-          <p:cNvPr id="3" name="Line 2"/>
+          <p:cNvPr id="5" name="Line 5"/>
           <p:cNvSpPr>
             <a:spLocks noChangeShapeType="1"/>
           </p:cNvSpPr>
@@ -1006,8 +707,8 @@
         </p:nvSpPr>
         <p:spPr bwMode="auto">
           <a:xfrm>
-            <a:off x="723900" y="8602133"/>
-            <a:ext cx="15925800" cy="0"/>
+            <a:off x="508000" y="1231900"/>
+            <a:ext cx="11176000" cy="0"/>
           </a:xfrm>
           <a:prstGeom prst="line">
             <a:avLst/>
@@ -1040,22 +741,377 @@
           <a:bodyPr wrap="none" anchor="ctr"/>
           <a:lstStyle/>
           <a:p>
-            <a:endParaRPr lang="en-US" sz="2400"/>
+            <a:endParaRPr lang="en-US" sz="1800"/>
           </a:p>
         </p:txBody>
       </p:sp>
       <p:sp>
         <p:nvSpPr>
-          <p:cNvPr id="5" name="Line 5"/>
-          <p:cNvSpPr>
-            <a:spLocks noChangeShapeType="1"/>
+          <p:cNvPr id="6" name="Text Box 14"/>
+          <p:cNvSpPr txBox="1">
+            <a:spLocks noChangeArrowheads="1"/>
           </p:cNvSpPr>
           <p:nvPr/>
         </p:nvSpPr>
         <p:spPr bwMode="auto">
           <a:xfrm>
-            <a:off x="723900" y="1642533"/>
-            <a:ext cx="15925800" cy="0"/>
+            <a:off x="2454688" y="500067"/>
+            <a:ext cx="7468904" cy="646331"/>
+          </a:xfrm>
+          <a:prstGeom prst="rect">
+            <a:avLst/>
+          </a:prstGeom>
+          <a:noFill/>
+          <a:ln>
+            <a:noFill/>
+          </a:ln>
+          <a:extLst>
+            <a:ext uri="{909E8E84-426E-40DD-AFC4-6F175D3DCCD1}">
+              <a14:hiddenFill xmlns:a14="http://schemas.microsoft.com/office/drawing/2010/main">
+                <a:solidFill>
+                  <a:srgbClr val="FFFFFF"/>
+                </a:solidFill>
+              </a14:hiddenFill>
+            </a:ext>
+            <a:ext uri="{91240B29-F687-4F45-9708-019B960494DF}">
+              <a14:hiddenLine xmlns:a14="http://schemas.microsoft.com/office/drawing/2010/main" w="9525">
+                <a:solidFill>
+                  <a:srgbClr val="000000"/>
+                </a:solidFill>
+                <a:miter lim="800000"/>
+                <a:headEnd/>
+                <a:tailEnd/>
+              </a14:hiddenLine>
+            </a:ext>
+          </a:extLst>
+        </p:spPr>
+        <p:txBody>
+          <a:bodyPr wrap="none">
+            <a:spAutoFit/>
+          </a:bodyPr>
+          <a:lstStyle>
+            <a:lvl1pPr eaLnBrk="0" hangingPunct="0">
+              <a:defRPr sz="1400">
+                <a:solidFill>
+                  <a:schemeClr val="tx1"/>
+                </a:solidFill>
+                <a:latin typeface="Arial" charset="0"/>
+                <a:cs typeface="Arial" charset="0"/>
+              </a:defRPr>
+            </a:lvl1pPr>
+            <a:lvl2pPr marL="742950" indent="-285750" eaLnBrk="0" hangingPunct="0">
+              <a:defRPr sz="1400">
+                <a:solidFill>
+                  <a:schemeClr val="tx1"/>
+                </a:solidFill>
+                <a:latin typeface="Arial" charset="0"/>
+                <a:cs typeface="Arial" charset="0"/>
+              </a:defRPr>
+            </a:lvl2pPr>
+            <a:lvl3pPr marL="1143000" indent="-228600" eaLnBrk="0" hangingPunct="0">
+              <a:defRPr sz="1400">
+                <a:solidFill>
+                  <a:schemeClr val="tx1"/>
+                </a:solidFill>
+                <a:latin typeface="Arial" charset="0"/>
+                <a:cs typeface="Arial" charset="0"/>
+              </a:defRPr>
+            </a:lvl3pPr>
+            <a:lvl4pPr marL="1600200" indent="-228600" eaLnBrk="0" hangingPunct="0">
+              <a:defRPr sz="1400">
+                <a:solidFill>
+                  <a:schemeClr val="tx1"/>
+                </a:solidFill>
+                <a:latin typeface="Arial" charset="0"/>
+                <a:cs typeface="Arial" charset="0"/>
+              </a:defRPr>
+            </a:lvl4pPr>
+            <a:lvl5pPr marL="2057400" indent="-228600" eaLnBrk="0" hangingPunct="0">
+              <a:defRPr sz="1400">
+                <a:solidFill>
+                  <a:schemeClr val="tx1"/>
+                </a:solidFill>
+                <a:latin typeface="Arial" charset="0"/>
+                <a:cs typeface="Arial" charset="0"/>
+              </a:defRPr>
+            </a:lvl5pPr>
+            <a:lvl6pPr marL="2514600" indent="-228600" eaLnBrk="0" fontAlgn="base" hangingPunct="0">
+              <a:spcBef>
+                <a:spcPct val="0"/>
+              </a:spcBef>
+              <a:spcAft>
+                <a:spcPct val="0"/>
+              </a:spcAft>
+              <a:defRPr sz="1400">
+                <a:solidFill>
+                  <a:schemeClr val="tx1"/>
+                </a:solidFill>
+                <a:latin typeface="Arial" charset="0"/>
+                <a:cs typeface="Arial" charset="0"/>
+              </a:defRPr>
+            </a:lvl6pPr>
+            <a:lvl7pPr marL="2971800" indent="-228600" eaLnBrk="0" fontAlgn="base" hangingPunct="0">
+              <a:spcBef>
+                <a:spcPct val="0"/>
+              </a:spcBef>
+              <a:spcAft>
+                <a:spcPct val="0"/>
+              </a:spcAft>
+              <a:defRPr sz="1400">
+                <a:solidFill>
+                  <a:schemeClr val="tx1"/>
+                </a:solidFill>
+                <a:latin typeface="Arial" charset="0"/>
+                <a:cs typeface="Arial" charset="0"/>
+              </a:defRPr>
+            </a:lvl7pPr>
+            <a:lvl8pPr marL="3429000" indent="-228600" eaLnBrk="0" fontAlgn="base" hangingPunct="0">
+              <a:spcBef>
+                <a:spcPct val="0"/>
+              </a:spcBef>
+              <a:spcAft>
+                <a:spcPct val="0"/>
+              </a:spcAft>
+              <a:defRPr sz="1400">
+                <a:solidFill>
+                  <a:schemeClr val="tx1"/>
+                </a:solidFill>
+                <a:latin typeface="Arial" charset="0"/>
+                <a:cs typeface="Arial" charset="0"/>
+              </a:defRPr>
+            </a:lvl8pPr>
+            <a:lvl9pPr marL="3886200" indent="-228600" eaLnBrk="0" fontAlgn="base" hangingPunct="0">
+              <a:spcBef>
+                <a:spcPct val="0"/>
+              </a:spcBef>
+              <a:spcAft>
+                <a:spcPct val="0"/>
+              </a:spcAft>
+              <a:defRPr sz="1400">
+                <a:solidFill>
+                  <a:schemeClr val="tx1"/>
+                </a:solidFill>
+                <a:latin typeface="Arial" charset="0"/>
+                <a:cs typeface="Arial" charset="0"/>
+              </a:defRPr>
+            </a:lvl9pPr>
+          </a:lstStyle>
+          <a:p>
+            <a:pPr algn="ctr">
+              <a:defRPr/>
+            </a:pPr>
+            <a:r>
+              <a:rPr lang="en-US" altLang="en-US" sz="3600" b="1" i="1">
+                <a:solidFill>
+                  <a:srgbClr val="000000"/>
+                </a:solidFill>
+              </a:rPr>
+              <a:t>The Air Force’s Personnel Center</a:t>
+            </a:r>
+          </a:p>
+        </p:txBody>
+      </p:sp>
+      <p:sp>
+        <p:nvSpPr>
+          <p:cNvPr id="50191" name="Rectangle 15"/>
+          <p:cNvSpPr>
+            <a:spLocks noGrp="1" noChangeArrowheads="1"/>
+          </p:cNvSpPr>
+          <p:nvPr>
+            <p:ph type="ctrTitle"/>
+          </p:nvPr>
+        </p:nvSpPr>
+        <p:spPr>
+          <a:xfrm>
+            <a:off x="368303" y="1962150"/>
+            <a:ext cx="11315700" cy="1600200"/>
+          </a:xfrm>
+        </p:spPr>
+        <p:txBody>
+          <a:bodyPr/>
+          <a:lstStyle>
+            <a:lvl1pPr>
+              <a:defRPr sz="4400" i="0"/>
+            </a:lvl1pPr>
+          </a:lstStyle>
+          <a:p>
+            <a:r>
+              <a:rPr lang="en-US"/>
+              <a:t>Click to edit Master title style</a:t>
+            </a:r>
+          </a:p>
+        </p:txBody>
+      </p:sp>
+      <p:sp>
+        <p:nvSpPr>
+          <p:cNvPr id="7" name="Rectangle 6"/>
+          <p:cNvSpPr>
+            <a:spLocks noGrp="1" noChangeArrowheads="1"/>
+          </p:cNvSpPr>
+          <p:nvPr>
+            <p:ph type="dt" sz="half" idx="10"/>
+          </p:nvPr>
+        </p:nvSpPr>
+        <p:spPr/>
+        <p:txBody>
+          <a:bodyPr/>
+          <a:lstStyle>
+            <a:lvl1pPr>
+              <a:defRPr/>
+            </a:lvl1pPr>
+          </a:lstStyle>
+          <a:p>
+            <a:pPr>
+              <a:defRPr/>
+            </a:pPr>
+            <a:r>
+              <a:rPr lang="en-US"/>
+              <a:t>As of: </a:t>
+            </a:r>
+          </a:p>
+        </p:txBody>
+      </p:sp>
+      <p:pic>
+        <p:nvPicPr>
+          <p:cNvPr id="2" name="Picture 1">
+            <a:extLst>
+              <a:ext uri="{FF2B5EF4-FFF2-40B4-BE49-F238E27FC236}">
+                <a16:creationId xmlns:a16="http://schemas.microsoft.com/office/drawing/2014/main" id="{5C66FCF7-3BCD-4695-880A-2DA6BCE66B87}"/>
+              </a:ext>
+            </a:extLst>
+          </p:cNvPr>
+          <p:cNvPicPr>
+            <a:picLocks noChangeAspect="1"/>
+          </p:cNvPicPr>
+          <p:nvPr userDrawn="1"/>
+        </p:nvPicPr>
+        <p:blipFill>
+          <a:blip r:embed="rId2" cstate="print">
+            <a:extLst>
+              <a:ext uri="{28A0092B-C50C-407E-A947-70E740481C1C}">
+                <a14:useLocalDpi xmlns:a14="http://schemas.microsoft.com/office/drawing/2010/main"/>
+              </a:ext>
+            </a:extLst>
+          </a:blip>
+          <a:stretch>
+            <a:fillRect/>
+          </a:stretch>
+        </p:blipFill>
+        <p:spPr>
+          <a:xfrm>
+            <a:off x="899122" y="2512002"/>
+            <a:ext cx="2023161" cy="2033758"/>
+          </a:xfrm>
+          <a:prstGeom prst="rect">
+            <a:avLst/>
+          </a:prstGeom>
+          <a:effectLst>
+            <a:glow rad="431800">
+              <a:srgbClr val="FFFFFF">
+                <a:alpha val="72000"/>
+              </a:srgbClr>
+            </a:glow>
+          </a:effectLst>
+        </p:spPr>
+      </p:pic>
+      <p:pic>
+        <p:nvPicPr>
+          <p:cNvPr id="4" name="Picture 33" descr="USAF_BLUE_CHROME_WINGS">
+            <a:extLst>
+              <a:ext uri="{FF2B5EF4-FFF2-40B4-BE49-F238E27FC236}">
+                <a16:creationId xmlns:a16="http://schemas.microsoft.com/office/drawing/2014/main" id="{D90A3D6A-4E1A-0227-1F85-AC09FC7FD5F8}"/>
+              </a:ext>
+            </a:extLst>
+          </p:cNvPr>
+          <p:cNvPicPr>
+            <a:picLocks noChangeAspect="1" noChangeArrowheads="1"/>
+          </p:cNvPicPr>
+          <p:nvPr userDrawn="1"/>
+        </p:nvPicPr>
+        <p:blipFill>
+          <a:blip r:embed="rId3" cstate="print"/>
+          <a:srcRect/>
+          <a:stretch>
+            <a:fillRect/>
+          </a:stretch>
+        </p:blipFill>
+        <p:spPr bwMode="auto">
+          <a:xfrm>
+            <a:off x="613516" y="247785"/>
+            <a:ext cx="909680" cy="846944"/>
+          </a:xfrm>
+          <a:prstGeom prst="rect">
+            <a:avLst/>
+          </a:prstGeom>
+          <a:noFill/>
+          <a:ln w="9525">
+            <a:noFill/>
+            <a:miter lim="800000"/>
+            <a:headEnd/>
+            <a:tailEnd/>
+          </a:ln>
+        </p:spPr>
+      </p:pic>
+      <p:pic>
+        <p:nvPicPr>
+          <p:cNvPr id="8" name="Picture 33">
+            <a:extLst>
+              <a:ext uri="{FF2B5EF4-FFF2-40B4-BE49-F238E27FC236}">
+                <a16:creationId xmlns:a16="http://schemas.microsoft.com/office/drawing/2014/main" id="{D3B95154-29AC-BC99-C5DD-56E1213BBAA8}"/>
+              </a:ext>
+            </a:extLst>
+          </p:cNvPr>
+          <p:cNvPicPr>
+            <a:picLocks noChangeAspect="1" noChangeArrowheads="1"/>
+          </p:cNvPicPr>
+          <p:nvPr userDrawn="1"/>
+        </p:nvPicPr>
+        <p:blipFill rotWithShape="1">
+          <a:blip r:embed="rId4" cstate="print">
+            <a:extLst>
+              <a:ext uri="{28A0092B-C50C-407E-A947-70E740481C1C}">
+                <a14:useLocalDpi xmlns:a14="http://schemas.microsoft.com/office/drawing/2010/main" val="0"/>
+              </a:ext>
+            </a:extLst>
+          </a:blip>
+          <a:srcRect b="25103"/>
+          <a:stretch/>
+        </p:blipFill>
+        <p:spPr bwMode="auto">
+          <a:xfrm>
+            <a:off x="10660430" y="142225"/>
+            <a:ext cx="1023570" cy="975789"/>
+          </a:xfrm>
+          <a:prstGeom prst="rect">
+            <a:avLst/>
+          </a:prstGeom>
+          <a:noFill/>
+          <a:ln w="9525">
+            <a:noFill/>
+            <a:miter lim="800000"/>
+            <a:headEnd/>
+            <a:tailEnd/>
+          </a:ln>
+        </p:spPr>
+      </p:pic>
+      <p:sp>
+        <p:nvSpPr>
+          <p:cNvPr id="10" name="Line 2">
+            <a:extLst>
+              <a:ext uri="{FF2B5EF4-FFF2-40B4-BE49-F238E27FC236}">
+                <a16:creationId xmlns:a16="http://schemas.microsoft.com/office/drawing/2014/main" id="{669F6DE3-8052-6B0E-1C31-6A8622DB5B8E}"/>
+              </a:ext>
+            </a:extLst>
+          </p:cNvPr>
+          <p:cNvSpPr>
+            <a:spLocks noChangeShapeType="1"/>
+          </p:cNvSpPr>
+          <p:nvPr userDrawn="1"/>
+        </p:nvSpPr>
+        <p:spPr bwMode="auto">
+          <a:xfrm>
+            <a:off x="508000" y="6451600"/>
+            <a:ext cx="11176000" cy="0"/>
           </a:xfrm>
           <a:prstGeom prst="line">
             <a:avLst/>
@@ -1088,22 +1144,28 @@
           <a:bodyPr wrap="none" anchor="ctr"/>
           <a:lstStyle/>
           <a:p>
-            <a:endParaRPr lang="en-US" sz="2400"/>
+            <a:endParaRPr lang="en-US" sz="1800"/>
           </a:p>
         </p:txBody>
       </p:sp>
       <p:sp>
         <p:nvSpPr>
-          <p:cNvPr id="6" name="Text Box 14"/>
+          <p:cNvPr id="11" name="Text Box 1029">
+            <a:extLst>
+              <a:ext uri="{FF2B5EF4-FFF2-40B4-BE49-F238E27FC236}">
+                <a16:creationId xmlns:a16="http://schemas.microsoft.com/office/drawing/2014/main" id="{75C95275-8902-48DF-486D-F84F31416E8A}"/>
+              </a:ext>
+            </a:extLst>
+          </p:cNvPr>
           <p:cNvSpPr txBox="1">
             <a:spLocks noChangeArrowheads="1"/>
           </p:cNvSpPr>
-          <p:nvPr/>
+          <p:nvPr userDrawn="1"/>
         </p:nvSpPr>
         <p:spPr bwMode="auto">
           <a:xfrm>
-            <a:off x="3863809" y="666757"/>
-            <a:ext cx="9911431" cy="830997"/>
+            <a:off x="1727200" y="6491289"/>
+            <a:ext cx="8737600" cy="369332"/>
           </a:xfrm>
           <a:prstGeom prst="rect">
             <a:avLst/>
@@ -1133,7 +1195,7 @@
           </a:extLst>
         </p:spPr>
         <p:txBody>
-          <a:bodyPr wrap="none">
+          <a:bodyPr>
             <a:spAutoFit/>
           </a:bodyPr>
           <a:lstStyle>
@@ -1245,152 +1307,54 @@
           </a:lstStyle>
           <a:p>
             <a:pPr algn="ctr">
+              <a:spcBef>
+                <a:spcPct val="50000"/>
+              </a:spcBef>
               <a:defRPr/>
             </a:pPr>
             <a:r>
-              <a:rPr lang="en-US" altLang="en-US" sz="4800" b="1" i="1" dirty="0">
+              <a:rPr lang="en-US" altLang="en-US" sz="1800" b="1" i="1">
                 <a:solidFill>
                   <a:srgbClr val="000000"/>
                 </a:solidFill>
+                <a:latin typeface="+mj-lt"/>
               </a:rPr>
-              <a:t>The Air Force’s Personnel Center</a:t>
+              <a:t>Care </a:t>
+            </a:r>
+            <a:r>
+              <a:rPr lang="en-US" altLang="en-US" sz="1800" b="1" i="0">
+                <a:solidFill>
+                  <a:srgbClr val="000000"/>
+                </a:solidFill>
+                <a:latin typeface="+mj-lt"/>
+              </a:rPr>
+              <a:t>that Connects</a:t>
+            </a:r>
+            <a:r>
+              <a:rPr lang="en-US" altLang="en-US" sz="1800" b="1" i="1">
+                <a:solidFill>
+                  <a:srgbClr val="000000"/>
+                </a:solidFill>
+                <a:latin typeface="+mj-lt"/>
+              </a:rPr>
+              <a:t>…Talent </a:t>
+            </a:r>
+            <a:r>
+              <a:rPr lang="en-US" altLang="en-US" sz="1800" b="1" i="0">
+                <a:solidFill>
+                  <a:srgbClr val="000000"/>
+                </a:solidFill>
+                <a:latin typeface="+mj-lt"/>
+              </a:rPr>
+              <a:t>that Transforms</a:t>
             </a:r>
           </a:p>
         </p:txBody>
       </p:sp>
-      <p:sp>
-        <p:nvSpPr>
-          <p:cNvPr id="50191" name="Rectangle 15"/>
-          <p:cNvSpPr>
-            <a:spLocks noGrp="1" noChangeArrowheads="1"/>
-          </p:cNvSpPr>
-          <p:nvPr>
-            <p:ph type="ctrTitle"/>
-          </p:nvPr>
-        </p:nvSpPr>
-        <p:spPr>
-          <a:xfrm>
-            <a:off x="524832" y="2616200"/>
-            <a:ext cx="16124873" cy="2133600"/>
-          </a:xfrm>
-        </p:spPr>
-        <p:txBody>
-          <a:bodyPr/>
-          <a:lstStyle>
-            <a:lvl1pPr>
-              <a:defRPr sz="5867" i="0"/>
-            </a:lvl1pPr>
-          </a:lstStyle>
-          <a:p>
-            <a:r>
-              <a:rPr lang="en-US"/>
-              <a:t>Click to edit Master title style</a:t>
-            </a:r>
-          </a:p>
-        </p:txBody>
-      </p:sp>
-      <p:sp>
-        <p:nvSpPr>
-          <p:cNvPr id="7" name="Rectangle 6"/>
-          <p:cNvSpPr>
-            <a:spLocks noGrp="1" noChangeArrowheads="1"/>
-          </p:cNvSpPr>
-          <p:nvPr>
-            <p:ph type="dt" sz="half" idx="10"/>
-          </p:nvPr>
-        </p:nvSpPr>
-        <p:spPr/>
-        <p:txBody>
-          <a:bodyPr/>
-          <a:lstStyle>
-            <a:lvl1pPr>
-              <a:defRPr/>
-            </a:lvl1pPr>
-          </a:lstStyle>
-          <a:p>
-            <a:pPr>
-              <a:defRPr/>
-            </a:pPr>
-            <a:r>
-              <a:rPr lang="en-US"/>
-              <a:t>As of: </a:t>
-            </a:r>
-          </a:p>
-        </p:txBody>
-      </p:sp>
-      <p:pic>
-        <p:nvPicPr>
-          <p:cNvPr id="12" name="Picture 33" descr="USAF_BLUE_CHROME_WINGS"/>
-          <p:cNvPicPr>
-            <a:picLocks noChangeAspect="1" noChangeArrowheads="1"/>
-          </p:cNvPicPr>
-          <p:nvPr userDrawn="1"/>
-        </p:nvPicPr>
-        <p:blipFill>
-          <a:blip r:embed="rId2" cstate="print"/>
-          <a:srcRect/>
-          <a:stretch>
-            <a:fillRect/>
-          </a:stretch>
-        </p:blipFill>
-        <p:spPr bwMode="auto">
-          <a:xfrm>
-            <a:off x="1085851" y="4876801"/>
-            <a:ext cx="4067413" cy="3543300"/>
-          </a:xfrm>
-          <a:prstGeom prst="rect">
-            <a:avLst/>
-          </a:prstGeom>
-          <a:noFill/>
-          <a:ln w="9525">
-            <a:noFill/>
-            <a:miter lim="800000"/>
-            <a:headEnd/>
-            <a:tailEnd/>
-          </a:ln>
-        </p:spPr>
-      </p:pic>
-      <p:pic>
-        <p:nvPicPr>
-          <p:cNvPr id="14" name="Picture 13"/>
-          <p:cNvPicPr>
-            <a:picLocks noChangeAspect="1"/>
-          </p:cNvPicPr>
-          <p:nvPr userDrawn="1"/>
-        </p:nvPicPr>
-        <p:blipFill>
-          <a:blip r:embed="rId3" cstate="print">
-            <a:extLst>
-              <a:ext uri="{28A0092B-C50C-407E-A947-70E740481C1C}">
-                <a14:useLocalDpi xmlns:a14="http://schemas.microsoft.com/office/drawing/2010/main"/>
-              </a:ext>
-            </a:extLst>
-          </a:blip>
-          <a:stretch>
-            <a:fillRect/>
-          </a:stretch>
-        </p:blipFill>
-        <p:spPr>
-          <a:xfrm>
-            <a:off x="1963200" y="3819125"/>
-            <a:ext cx="2312711" cy="2175275"/>
-          </a:xfrm>
-          <a:prstGeom prst="rect">
-            <a:avLst/>
-          </a:prstGeom>
-          <a:effectLst>
-            <a:glow rad="431800">
-              <a:srgbClr val="FFFFFF">
-                <a:alpha val="72000"/>
-              </a:srgbClr>
-            </a:glow>
-          </a:effectLst>
-        </p:spPr>
-      </p:pic>
     </p:spTree>
     <p:extLst>
       <p:ext uri="{BB962C8B-B14F-4D97-AF65-F5344CB8AC3E}">
-        <p14:creationId xmlns:p14="http://schemas.microsoft.com/office/powerpoint/2010/main" val="1939584424"/>
+        <p14:creationId xmlns:p14="http://schemas.microsoft.com/office/powerpoint/2010/main" val="783012501"/>
       </p:ext>
     </p:extLst>
   </p:cSld>
@@ -1436,7 +1400,6 @@
               <a:rPr lang="en-US"/>
               <a:t>Click to edit Master title style</a:t>
             </a:r>
-            <a:endParaRPr lang="en-US" dirty="0"/>
           </a:p>
         </p:txBody>
       </p:sp>
@@ -1452,8 +1415,8 @@
         </p:nvSpPr>
         <p:spPr>
           <a:xfrm>
-            <a:off x="651511" y="2006600"/>
-            <a:ext cx="16082645" cy="6324600"/>
+            <a:off x="457200" y="1504950"/>
+            <a:ext cx="11286067" cy="4743450"/>
           </a:xfrm>
         </p:spPr>
         <p:txBody>
@@ -1462,35 +1425,35 @@
           <a:p>
             <a:pPr lvl="0"/>
             <a:r>
-              <a:rPr lang="en-US" dirty="0"/>
+              <a:rPr lang="en-US"/>
               <a:t>Click to edit Master text styles</a:t>
             </a:r>
           </a:p>
           <a:p>
             <a:pPr lvl="1"/>
             <a:r>
-              <a:rPr lang="en-US" dirty="0"/>
+              <a:rPr lang="en-US"/>
               <a:t>Second level</a:t>
             </a:r>
           </a:p>
           <a:p>
             <a:pPr lvl="2"/>
             <a:r>
-              <a:rPr lang="en-US" dirty="0"/>
+              <a:rPr lang="en-US"/>
               <a:t>Third level</a:t>
             </a:r>
           </a:p>
           <a:p>
             <a:pPr lvl="3"/>
             <a:r>
-              <a:rPr lang="en-US" dirty="0"/>
+              <a:rPr lang="en-US"/>
               <a:t>Fourth level</a:t>
             </a:r>
           </a:p>
           <a:p>
             <a:pPr lvl="4"/>
             <a:r>
-              <a:rPr lang="en-US" dirty="0"/>
+              <a:rPr lang="en-US"/>
               <a:t>Fifth level</a:t>
             </a:r>
           </a:p>
@@ -1558,7 +1521,7 @@
               </a:pPr>
               <a:t>‹#›</a:t>
             </a:fld>
-            <a:endParaRPr lang="en-US" dirty="0">
+            <a:endParaRPr lang="en-US">
               <a:solidFill>
                 <a:srgbClr val="808080"/>
               </a:solidFill>
@@ -1569,7 +1532,7 @@
     </p:spTree>
     <p:extLst>
       <p:ext uri="{BB962C8B-B14F-4D97-AF65-F5344CB8AC3E}">
-        <p14:creationId xmlns:p14="http://schemas.microsoft.com/office/powerpoint/2010/main" val="514386184"/>
+        <p14:creationId xmlns:p14="http://schemas.microsoft.com/office/powerpoint/2010/main" val="932041120"/>
       </p:ext>
     </p:extLst>
   </p:cSld>
@@ -1598,40 +1561,10 @@
       </p:grpSpPr>
       <p:sp>
         <p:nvSpPr>
-          <p:cNvPr id="6" name="Picture Placeholder 5">
-            <a:extLst>
-              <a:ext uri="{FF2B5EF4-FFF2-40B4-BE49-F238E27FC236}">
-                <a16:creationId xmlns:a16="http://schemas.microsoft.com/office/drawing/2014/main" id="{7959C778-4A6D-63EC-FCA8-7B97C0496621}"/>
-              </a:ext>
-            </a:extLst>
-          </p:cNvPr>
-          <p:cNvSpPr>
-            <a:spLocks noGrp="1"/>
-          </p:cNvSpPr>
-          <p:nvPr>
-            <p:ph type="pic" sz="quarter" idx="12"/>
-          </p:nvPr>
-        </p:nvSpPr>
-        <p:spPr>
-          <a:xfrm>
-            <a:off x="651510" y="1993899"/>
-            <a:ext cx="16082645" cy="6337300"/>
-          </a:xfrm>
-        </p:spPr>
-        <p:txBody>
-          <a:bodyPr/>
-          <a:lstStyle/>
-          <a:p>
-            <a:endParaRPr lang="en-US"/>
-          </a:p>
-        </p:txBody>
-      </p:sp>
-      <p:sp>
-        <p:nvSpPr>
           <p:cNvPr id="2" name="Title 1">
             <a:extLst>
               <a:ext uri="{FF2B5EF4-FFF2-40B4-BE49-F238E27FC236}">
-                <a16:creationId xmlns:a16="http://schemas.microsoft.com/office/drawing/2014/main" id="{4176D2B9-0D8E-0BAA-489A-D48DA167B91C}"/>
+                <a16:creationId xmlns:a16="http://schemas.microsoft.com/office/drawing/2014/main" id="{CB735F87-8101-CE4B-A69E-AECBE01209C0}"/>
               </a:ext>
             </a:extLst>
           </p:cNvPr>
@@ -1659,7 +1592,7 @@
           <p:cNvPr id="3" name="Date Placeholder 2">
             <a:extLst>
               <a:ext uri="{FF2B5EF4-FFF2-40B4-BE49-F238E27FC236}">
-                <a16:creationId xmlns:a16="http://schemas.microsoft.com/office/drawing/2014/main" id="{08959D35-954D-852A-3CD4-A945642D5479}"/>
+                <a16:creationId xmlns:a16="http://schemas.microsoft.com/office/drawing/2014/main" id="{DCE7E149-C674-A5A1-A192-D219B4521354}"/>
               </a:ext>
             </a:extLst>
           </p:cNvPr>
@@ -1690,7 +1623,7 @@
           <p:cNvPr id="4" name="Slide Number Placeholder 3">
             <a:extLst>
               <a:ext uri="{FF2B5EF4-FFF2-40B4-BE49-F238E27FC236}">
-                <a16:creationId xmlns:a16="http://schemas.microsoft.com/office/drawing/2014/main" id="{5F452676-0DD0-54E2-FBB9-56077AE379DC}"/>
+                <a16:creationId xmlns:a16="http://schemas.microsoft.com/office/drawing/2014/main" id="{3C66DEDE-4A7E-B3E7-E05D-56C6EE6769FC}"/>
               </a:ext>
             </a:extLst>
           </p:cNvPr>
@@ -1716,14 +1649,44 @@
               </a:pPr>
               <a:t>‹#›</a:t>
             </a:fld>
-            <a:endParaRPr lang="en-US" dirty="0"/>
+            <a:endParaRPr lang="en-US"/>
+          </a:p>
+        </p:txBody>
+      </p:sp>
+      <p:sp>
+        <p:nvSpPr>
+          <p:cNvPr id="6" name="Picture Placeholder 5">
+            <a:extLst>
+              <a:ext uri="{FF2B5EF4-FFF2-40B4-BE49-F238E27FC236}">
+                <a16:creationId xmlns:a16="http://schemas.microsoft.com/office/drawing/2014/main" id="{4DC7D754-4B67-3BFE-02C7-3C7F150345C3}"/>
+              </a:ext>
+            </a:extLst>
+          </p:cNvPr>
+          <p:cNvSpPr>
+            <a:spLocks noGrp="1"/>
+          </p:cNvSpPr>
+          <p:nvPr>
+            <p:ph type="pic" sz="quarter" idx="12"/>
+          </p:nvPr>
+        </p:nvSpPr>
+        <p:spPr>
+          <a:xfrm>
+            <a:off x="496510" y="1349830"/>
+            <a:ext cx="11198981" cy="5029200"/>
+          </a:xfrm>
+        </p:spPr>
+        <p:txBody>
+          <a:bodyPr/>
+          <a:lstStyle/>
+          <a:p>
+            <a:endParaRPr lang="en-US"/>
           </a:p>
         </p:txBody>
       </p:sp>
     </p:spTree>
     <p:extLst>
       <p:ext uri="{BB962C8B-B14F-4D97-AF65-F5344CB8AC3E}">
-        <p14:creationId xmlns:p14="http://schemas.microsoft.com/office/powerpoint/2010/main" val="1198049898"/>
+        <p14:creationId xmlns:p14="http://schemas.microsoft.com/office/powerpoint/2010/main" val="4220838946"/>
       </p:ext>
     </p:extLst>
   </p:cSld>
@@ -1734,7 +1697,7 @@
 </file>
 
 <file path=ppt/slideLayouts/slideLayout4.xml><?xml version="1.0" encoding="utf-8"?>
-<p:sldLayout xmlns:a="http://schemas.openxmlformats.org/drawingml/2006/main" xmlns:r="http://schemas.openxmlformats.org/officeDocument/2006/relationships" xmlns:p="http://schemas.openxmlformats.org/presentationml/2006/main" showMasterSp="0" preserve="1" userDrawn="1">
+<p:sldLayout xmlns:a="http://schemas.openxmlformats.org/drawingml/2006/main" xmlns:r="http://schemas.openxmlformats.org/officeDocument/2006/relationships" xmlns:p="http://schemas.openxmlformats.org/presentationml/2006/main" showMasterSp="0" userDrawn="1">
   <p:cSld name="Black Picture">
     <p:bg>
       <p:bgRef idx="1001">
@@ -1774,7 +1737,7 @@
         <p:spPr>
           <a:xfrm>
             <a:off x="0" y="0"/>
-            <a:ext cx="17373600" cy="9144000"/>
+            <a:ext cx="12192000" cy="6858000"/>
           </a:xfrm>
         </p:spPr>
         <p:txBody>
@@ -1788,7 +1751,7 @@
     </p:spTree>
     <p:extLst>
       <p:ext uri="{BB962C8B-B14F-4D97-AF65-F5344CB8AC3E}">
-        <p14:creationId xmlns:p14="http://schemas.microsoft.com/office/powerpoint/2010/main" val="62298914"/>
+        <p14:creationId xmlns:p14="http://schemas.microsoft.com/office/powerpoint/2010/main" val="3398388642"/>
       </p:ext>
     </p:extLst>
   </p:cSld>
@@ -1865,7 +1828,7 @@
               </a:pPr>
               <a:t>‹#›</a:t>
             </a:fld>
-            <a:endParaRPr lang="en-US" dirty="0"/>
+            <a:endParaRPr lang="en-US"/>
           </a:p>
         </p:txBody>
       </p:sp>
@@ -1879,8 +1842,8 @@
         </p:nvSpPr>
         <p:spPr bwMode="auto">
           <a:xfrm>
-            <a:off x="723900" y="8602133"/>
-            <a:ext cx="15925800" cy="0"/>
+            <a:off x="508000" y="6451600"/>
+            <a:ext cx="11176000" cy="0"/>
           </a:xfrm>
           <a:prstGeom prst="line">
             <a:avLst/>
@@ -1913,7 +1876,7 @@
           <a:bodyPr wrap="none" anchor="ctr"/>
           <a:lstStyle/>
           <a:p>
-            <a:endParaRPr lang="en-US" sz="2400"/>
+            <a:endParaRPr lang="en-US" sz="1800"/>
           </a:p>
         </p:txBody>
       </p:sp>
@@ -1927,8 +1890,8 @@
         </p:nvSpPr>
         <p:spPr bwMode="auto">
           <a:xfrm>
-            <a:off x="723900" y="1642533"/>
-            <a:ext cx="15925800" cy="0"/>
+            <a:off x="508000" y="1231900"/>
+            <a:ext cx="11176000" cy="0"/>
           </a:xfrm>
           <a:prstGeom prst="line">
             <a:avLst/>
@@ -1961,7 +1924,7 @@
           <a:bodyPr wrap="none" anchor="ctr"/>
           <a:lstStyle/>
           <a:p>
-            <a:endParaRPr lang="en-US" sz="2400"/>
+            <a:endParaRPr lang="en-US" sz="1800"/>
           </a:p>
         </p:txBody>
       </p:sp>
@@ -1975,8 +1938,8 @@
         </p:nvSpPr>
         <p:spPr bwMode="auto">
           <a:xfrm>
-            <a:off x="3863809" y="666757"/>
-            <a:ext cx="9911431" cy="830997"/>
+            <a:off x="2454688" y="500067"/>
+            <a:ext cx="7468904" cy="646331"/>
           </a:xfrm>
           <a:prstGeom prst="rect">
             <a:avLst/>
@@ -2121,7 +2084,7 @@
               <a:defRPr/>
             </a:pPr>
             <a:r>
-              <a:rPr lang="en-US" altLang="en-US" sz="4800" b="1" i="1" dirty="0">
+              <a:rPr lang="en-US" altLang="en-US" sz="3600" b="1" i="1">
                 <a:solidFill>
                   <a:srgbClr val="000000"/>
                 </a:solidFill>
@@ -2141,8 +2104,8 @@
         </p:nvSpPr>
         <p:spPr bwMode="auto">
           <a:xfrm>
-            <a:off x="2461260" y="8655053"/>
-            <a:ext cx="12451080" cy="461665"/>
+            <a:off x="1727200" y="6491289"/>
+            <a:ext cx="8737600" cy="369332"/>
           </a:xfrm>
           <a:prstGeom prst="rect">
             <a:avLst/>
@@ -2290,29 +2253,41 @@
               <a:defRPr/>
             </a:pPr>
             <a:r>
-              <a:rPr lang="en-US" altLang="en-US" sz="2400" b="1" i="1" dirty="0">
+              <a:rPr lang="en-US" altLang="en-US" sz="1800" b="1" i="1">
                 <a:solidFill>
                   <a:srgbClr val="000000"/>
                 </a:solidFill>
                 <a:latin typeface="+mj-lt"/>
               </a:rPr>
-              <a:t>Agile, Innovative,</a:t>
+              <a:t>Care </a:t>
             </a:r>
             <a:r>
-              <a:rPr lang="en-US" altLang="en-US" sz="2400" b="1" i="1" baseline="0" dirty="0">
+              <a:rPr lang="en-US" altLang="en-US" sz="1800" b="1" i="0">
                 <a:solidFill>
                   <a:srgbClr val="000000"/>
                 </a:solidFill>
                 <a:latin typeface="+mj-lt"/>
               </a:rPr>
-              <a:t> and Responsive…Fueling the Fight!</a:t>
+              <a:t>that Connects</a:t>
             </a:r>
-            <a:endParaRPr lang="en-US" altLang="en-US" sz="2400" b="1" i="1" dirty="0">
-              <a:solidFill>
-                <a:srgbClr val="000000"/>
-              </a:solidFill>
-              <a:latin typeface="+mj-lt"/>
-            </a:endParaRPr>
+            <a:r>
+              <a:rPr lang="en-US" altLang="en-US" sz="1800" b="1" i="1">
+                <a:solidFill>
+                  <a:srgbClr val="000000"/>
+                </a:solidFill>
+                <a:latin typeface="+mj-lt"/>
+              </a:rPr>
+              <a:t>…Talent </a:t>
+            </a:r>
+            <a:r>
+              <a:rPr lang="en-US" altLang="en-US" sz="1800" b="1" i="0">
+                <a:solidFill>
+                  <a:srgbClr val="000000"/>
+                </a:solidFill>
+                <a:latin typeface="+mj-lt"/>
+              </a:rPr>
+              <a:t>that Transforms</a:t>
+            </a:r>
           </a:p>
         </p:txBody>
       </p:sp>
@@ -2338,18 +2313,98 @@
         </p:blipFill>
         <p:spPr>
           <a:xfrm>
-            <a:off x="5820157" y="2621280"/>
-            <a:ext cx="5755588" cy="5254232"/>
+            <a:off x="4084320" y="1965960"/>
+            <a:ext cx="4039009" cy="3940674"/>
           </a:xfrm>
           <a:prstGeom prst="rect">
             <a:avLst/>
           </a:prstGeom>
         </p:spPr>
       </p:pic>
+      <p:pic>
+        <p:nvPicPr>
+          <p:cNvPr id="10" name="Picture 33" descr="USAF_BLUE_CHROME_WINGS">
+            <a:extLst>
+              <a:ext uri="{FF2B5EF4-FFF2-40B4-BE49-F238E27FC236}">
+                <a16:creationId xmlns:a16="http://schemas.microsoft.com/office/drawing/2014/main" id="{DC2298B6-1956-E833-0856-6CAE79F1E2E7}"/>
+              </a:ext>
+            </a:extLst>
+          </p:cNvPr>
+          <p:cNvPicPr>
+            <a:picLocks noChangeAspect="1" noChangeArrowheads="1"/>
+          </p:cNvPicPr>
+          <p:nvPr userDrawn="1"/>
+        </p:nvPicPr>
+        <p:blipFill>
+          <a:blip r:embed="rId3" cstate="print"/>
+          <a:srcRect/>
+          <a:stretch>
+            <a:fillRect/>
+          </a:stretch>
+        </p:blipFill>
+        <p:spPr bwMode="auto">
+          <a:xfrm>
+            <a:off x="613516" y="247785"/>
+            <a:ext cx="909680" cy="846944"/>
+          </a:xfrm>
+          <a:prstGeom prst="rect">
+            <a:avLst/>
+          </a:prstGeom>
+          <a:noFill/>
+          <a:ln w="9525">
+            <a:noFill/>
+            <a:miter lim="800000"/>
+            <a:headEnd/>
+            <a:tailEnd/>
+          </a:ln>
+        </p:spPr>
+      </p:pic>
+      <p:pic>
+        <p:nvPicPr>
+          <p:cNvPr id="11" name="Picture 33">
+            <a:extLst>
+              <a:ext uri="{FF2B5EF4-FFF2-40B4-BE49-F238E27FC236}">
+                <a16:creationId xmlns:a16="http://schemas.microsoft.com/office/drawing/2014/main" id="{10038945-F876-F310-FC56-E8D5D7700A59}"/>
+              </a:ext>
+            </a:extLst>
+          </p:cNvPr>
+          <p:cNvPicPr>
+            <a:picLocks noChangeAspect="1" noChangeArrowheads="1"/>
+          </p:cNvPicPr>
+          <p:nvPr userDrawn="1"/>
+        </p:nvPicPr>
+        <p:blipFill rotWithShape="1">
+          <a:blip r:embed="rId4" cstate="print">
+            <a:extLst>
+              <a:ext uri="{28A0092B-C50C-407E-A947-70E740481C1C}">
+                <a14:useLocalDpi xmlns:a14="http://schemas.microsoft.com/office/drawing/2010/main" val="0"/>
+              </a:ext>
+            </a:extLst>
+          </a:blip>
+          <a:srcRect b="25103"/>
+          <a:stretch/>
+        </p:blipFill>
+        <p:spPr bwMode="auto">
+          <a:xfrm>
+            <a:off x="10660430" y="142225"/>
+            <a:ext cx="1023570" cy="975789"/>
+          </a:xfrm>
+          <a:prstGeom prst="rect">
+            <a:avLst/>
+          </a:prstGeom>
+          <a:noFill/>
+          <a:ln w="9525">
+            <a:noFill/>
+            <a:miter lim="800000"/>
+            <a:headEnd/>
+            <a:tailEnd/>
+          </a:ln>
+        </p:spPr>
+      </p:pic>
     </p:spTree>
     <p:extLst>
       <p:ext uri="{BB962C8B-B14F-4D97-AF65-F5344CB8AC3E}">
-        <p14:creationId xmlns:p14="http://schemas.microsoft.com/office/powerpoint/2010/main" val="3666440157"/>
+        <p14:creationId xmlns:p14="http://schemas.microsoft.com/office/powerpoint/2010/main" val="2026816982"/>
       </p:ext>
     </p:extLst>
   </p:cSld>
@@ -2396,8 +2451,8 @@
         </p:nvSpPr>
         <p:spPr bwMode="auto">
           <a:xfrm>
-            <a:off x="0" y="8699500"/>
-            <a:ext cx="2316480" cy="406400"/>
+            <a:off x="0" y="6524625"/>
+            <a:ext cx="1625600" cy="304800"/>
           </a:xfrm>
           <a:prstGeom prst="rect">
             <a:avLst/>
@@ -2419,7 +2474,7 @@
           </a:bodyPr>
           <a:lstStyle>
             <a:lvl1pPr algn="l" eaLnBrk="0" hangingPunct="0">
-              <a:defRPr sz="1333">
+              <a:defRPr sz="1000">
                 <a:solidFill>
                   <a:srgbClr val="969696"/>
                 </a:solidFill>
@@ -2449,8 +2504,8 @@
         </p:nvSpPr>
         <p:spPr bwMode="auto">
           <a:xfrm>
-            <a:off x="15177770" y="8699500"/>
-            <a:ext cx="2171700" cy="406400"/>
+            <a:off x="10651067" y="6524625"/>
+            <a:ext cx="1524000" cy="304800"/>
           </a:xfrm>
           <a:prstGeom prst="rect">
             <a:avLst/>
@@ -2472,7 +2527,7 @@
           </a:bodyPr>
           <a:lstStyle>
             <a:lvl1pPr algn="r" eaLnBrk="0" hangingPunct="0">
-              <a:defRPr sz="2400" b="1" i="1">
+              <a:defRPr sz="1800" b="1" i="1">
                 <a:solidFill>
                   <a:schemeClr val="tx1"/>
                 </a:solidFill>
@@ -2490,7 +2545,7 @@
               </a:pPr>
               <a:t>‹#›</a:t>
             </a:fld>
-            <a:endParaRPr lang="en-US" dirty="0"/>
+            <a:endParaRPr lang="en-US"/>
           </a:p>
         </p:txBody>
       </p:sp>
@@ -2506,8 +2561,8 @@
         </p:nvSpPr>
         <p:spPr bwMode="auto">
           <a:xfrm>
-            <a:off x="3161030" y="101600"/>
-            <a:ext cx="13573125" cy="1524000"/>
+            <a:off x="2218267" y="76200"/>
+            <a:ext cx="9525000" cy="1143000"/>
           </a:xfrm>
           <a:prstGeom prst="rect">
             <a:avLst/>
@@ -2554,7 +2609,7 @@
       </p:sp>
       <p:sp>
         <p:nvSpPr>
-          <p:cNvPr id="1030" name="Line 1035"/>
+          <p:cNvPr id="1031" name="Line 1036"/>
           <p:cNvSpPr>
             <a:spLocks noChangeShapeType="1"/>
           </p:cNvSpPr>
@@ -2562,8 +2617,8 @@
         </p:nvSpPr>
         <p:spPr bwMode="auto">
           <a:xfrm>
-            <a:off x="723900" y="8602133"/>
-            <a:ext cx="15925800" cy="0"/>
+            <a:off x="508000" y="1231900"/>
+            <a:ext cx="11176000" cy="0"/>
           </a:xfrm>
           <a:prstGeom prst="line">
             <a:avLst/>
@@ -2596,22 +2651,145 @@
           <a:bodyPr wrap="none" anchor="ctr"/>
           <a:lstStyle/>
           <a:p>
-            <a:endParaRPr lang="en-US" sz="2400"/>
+            <a:endParaRPr lang="en-US" sz="1800"/>
           </a:p>
         </p:txBody>
       </p:sp>
       <p:sp>
         <p:nvSpPr>
-          <p:cNvPr id="1031" name="Line 1036"/>
+          <p:cNvPr id="1032" name="Rectangle 1040"/>
+          <p:cNvSpPr>
+            <a:spLocks noGrp="1" noChangeArrowheads="1"/>
+          </p:cNvSpPr>
+          <p:nvPr>
+            <p:ph type="body" idx="1"/>
+          </p:nvPr>
+        </p:nvSpPr>
+        <p:spPr bwMode="auto">
+          <a:xfrm>
+            <a:off x="368303" y="1504950"/>
+            <a:ext cx="11197167" cy="4743450"/>
+          </a:xfrm>
+          <a:prstGeom prst="rect">
+            <a:avLst/>
+          </a:prstGeom>
+          <a:noFill/>
+          <a:ln>
+            <a:noFill/>
+          </a:ln>
+          <a:extLst>
+            <a:ext uri="{909E8E84-426E-40DD-AFC4-6F175D3DCCD1}">
+              <a14:hiddenFill xmlns:a14="http://schemas.microsoft.com/office/drawing/2010/main">
+                <a:solidFill>
+                  <a:srgbClr val="FFFFFF"/>
+                </a:solidFill>
+              </a14:hiddenFill>
+            </a:ext>
+            <a:ext uri="{91240B29-F687-4F45-9708-019B960494DF}">
+              <a14:hiddenLine xmlns:a14="http://schemas.microsoft.com/office/drawing/2010/main" w="9525">
+                <a:solidFill>
+                  <a:srgbClr val="000000"/>
+                </a:solidFill>
+                <a:miter lim="800000"/>
+                <a:headEnd/>
+                <a:tailEnd/>
+              </a14:hiddenLine>
+            </a:ext>
+          </a:extLst>
+        </p:spPr>
+        <p:txBody>
+          <a:bodyPr vert="horz" wrap="square" lIns="91440" tIns="45720" rIns="91440" bIns="45720" numCol="1" anchor="t" anchorCtr="0" compatLnSpc="1">
+            <a:prstTxWarp prst="textNoShape">
+              <a:avLst/>
+            </a:prstTxWarp>
+          </a:bodyPr>
+          <a:lstStyle/>
+          <a:p>
+            <a:pPr lvl="0"/>
+            <a:r>
+              <a:rPr lang="en-US" altLang="en-US"/>
+              <a:t>Click to edit Master text styles</a:t>
+            </a:r>
+          </a:p>
+          <a:p>
+            <a:pPr lvl="1"/>
+            <a:r>
+              <a:rPr lang="en-US" altLang="en-US"/>
+              <a:t>Second level</a:t>
+            </a:r>
+          </a:p>
+          <a:p>
+            <a:pPr lvl="2"/>
+            <a:r>
+              <a:rPr lang="en-US" altLang="en-US"/>
+              <a:t>Third level</a:t>
+            </a:r>
+          </a:p>
+          <a:p>
+            <a:pPr lvl="3"/>
+            <a:r>
+              <a:rPr lang="en-US" altLang="en-US"/>
+              <a:t>Fourth level</a:t>
+            </a:r>
+          </a:p>
+          <a:p>
+            <a:pPr lvl="0"/>
+            <a:r>
+              <a:rPr lang="en-US" altLang="en-US"/>
+              <a:t>2nd Bullet</a:t>
+            </a:r>
+          </a:p>
+        </p:txBody>
+      </p:sp>
+      <p:pic>
+        <p:nvPicPr>
+          <p:cNvPr id="11" name="Picture 10"/>
+          <p:cNvPicPr>
+            <a:picLocks noChangeAspect="1"/>
+          </p:cNvPicPr>
+          <p:nvPr userDrawn="1"/>
+        </p:nvPicPr>
+        <p:blipFill>
+          <a:blip r:embed="rId7" cstate="print">
+            <a:extLst>
+              <a:ext uri="{28A0092B-C50C-407E-A947-70E740481C1C}">
+                <a14:useLocalDpi xmlns:a14="http://schemas.microsoft.com/office/drawing/2010/main"/>
+              </a:ext>
+            </a:extLst>
+          </a:blip>
+          <a:stretch>
+            <a:fillRect/>
+          </a:stretch>
+        </p:blipFill>
+        <p:spPr>
+          <a:xfrm>
+            <a:off x="638866" y="90489"/>
+            <a:ext cx="1113734" cy="1119568"/>
+          </a:xfrm>
+          <a:prstGeom prst="rect">
+            <a:avLst/>
+          </a:prstGeom>
+          <a:effectLst/>
+        </p:spPr>
+      </p:pic>
+      <p:sp>
+        <p:nvSpPr>
+          <p:cNvPr id="4" name="Line 2">
+            <a:extLst>
+              <a:ext uri="{FF2B5EF4-FFF2-40B4-BE49-F238E27FC236}">
+                <a16:creationId xmlns:a16="http://schemas.microsoft.com/office/drawing/2014/main" id="{E4D5C857-F2C1-4DBA-9999-E2C9E30D3BC8}"/>
+              </a:ext>
+            </a:extLst>
+          </p:cNvPr>
           <p:cNvSpPr>
             <a:spLocks noChangeShapeType="1"/>
           </p:cNvSpPr>
-          <p:nvPr/>
+          <p:nvPr userDrawn="1"/>
         </p:nvSpPr>
         <p:spPr bwMode="auto">
           <a:xfrm>
-            <a:off x="723900" y="1642533"/>
-            <a:ext cx="15925800" cy="0"/>
+            <a:off x="508000" y="6451600"/>
+            <a:ext cx="11176000" cy="0"/>
           </a:xfrm>
           <a:prstGeom prst="line">
             <a:avLst/>
@@ -2644,24 +2822,28 @@
           <a:bodyPr wrap="none" anchor="ctr"/>
           <a:lstStyle/>
           <a:p>
-            <a:endParaRPr lang="en-US" sz="2400"/>
+            <a:endParaRPr lang="en-US" sz="1800"/>
           </a:p>
         </p:txBody>
       </p:sp>
       <p:sp>
         <p:nvSpPr>
-          <p:cNvPr id="1032" name="Rectangle 1040"/>
-          <p:cNvSpPr>
-            <a:spLocks noGrp="1" noChangeArrowheads="1"/>
+          <p:cNvPr id="5" name="Text Box 1029">
+            <a:extLst>
+              <a:ext uri="{FF2B5EF4-FFF2-40B4-BE49-F238E27FC236}">
+                <a16:creationId xmlns:a16="http://schemas.microsoft.com/office/drawing/2014/main" id="{229A6C66-8CBF-B98F-C2C1-46A7C0D37ED9}"/>
+              </a:ext>
+            </a:extLst>
+          </p:cNvPr>
+          <p:cNvSpPr txBox="1">
+            <a:spLocks noChangeArrowheads="1"/>
           </p:cNvSpPr>
-          <p:nvPr>
-            <p:ph type="body" idx="1"/>
-          </p:nvPr>
+          <p:nvPr userDrawn="1"/>
         </p:nvSpPr>
         <p:spPr bwMode="auto">
           <a:xfrm>
-            <a:off x="524832" y="2006600"/>
-            <a:ext cx="15955963" cy="6324600"/>
+            <a:off x="1727200" y="6491289"/>
+            <a:ext cx="8737600" cy="369332"/>
           </a:xfrm>
           <a:prstGeom prst="rect">
             <a:avLst/>
@@ -2691,94 +2873,176 @@
           </a:extLst>
         </p:spPr>
         <p:txBody>
-          <a:bodyPr vert="horz" wrap="square" lIns="91440" tIns="45720" rIns="91440" bIns="45720" numCol="1" anchor="t" anchorCtr="0" compatLnSpc="1">
-            <a:prstTxWarp prst="textNoShape">
-              <a:avLst/>
-            </a:prstTxWarp>
+          <a:bodyPr>
+            <a:spAutoFit/>
           </a:bodyPr>
-          <a:lstStyle/>
-          <a:p>
-            <a:pPr lvl="0"/>
+          <a:lstStyle>
+            <a:lvl1pPr eaLnBrk="0" hangingPunct="0">
+              <a:defRPr sz="1400">
+                <a:solidFill>
+                  <a:schemeClr val="tx1"/>
+                </a:solidFill>
+                <a:latin typeface="Arial" charset="0"/>
+                <a:cs typeface="Arial" charset="0"/>
+              </a:defRPr>
+            </a:lvl1pPr>
+            <a:lvl2pPr marL="742950" indent="-285750" eaLnBrk="0" hangingPunct="0">
+              <a:defRPr sz="1400">
+                <a:solidFill>
+                  <a:schemeClr val="tx1"/>
+                </a:solidFill>
+                <a:latin typeface="Arial" charset="0"/>
+                <a:cs typeface="Arial" charset="0"/>
+              </a:defRPr>
+            </a:lvl2pPr>
+            <a:lvl3pPr marL="1143000" indent="-228600" eaLnBrk="0" hangingPunct="0">
+              <a:defRPr sz="1400">
+                <a:solidFill>
+                  <a:schemeClr val="tx1"/>
+                </a:solidFill>
+                <a:latin typeface="Arial" charset="0"/>
+                <a:cs typeface="Arial" charset="0"/>
+              </a:defRPr>
+            </a:lvl3pPr>
+            <a:lvl4pPr marL="1600200" indent="-228600" eaLnBrk="0" hangingPunct="0">
+              <a:defRPr sz="1400">
+                <a:solidFill>
+                  <a:schemeClr val="tx1"/>
+                </a:solidFill>
+                <a:latin typeface="Arial" charset="0"/>
+                <a:cs typeface="Arial" charset="0"/>
+              </a:defRPr>
+            </a:lvl4pPr>
+            <a:lvl5pPr marL="2057400" indent="-228600" eaLnBrk="0" hangingPunct="0">
+              <a:defRPr sz="1400">
+                <a:solidFill>
+                  <a:schemeClr val="tx1"/>
+                </a:solidFill>
+                <a:latin typeface="Arial" charset="0"/>
+                <a:cs typeface="Arial" charset="0"/>
+              </a:defRPr>
+            </a:lvl5pPr>
+            <a:lvl6pPr marL="2514600" indent="-228600" eaLnBrk="0" fontAlgn="base" hangingPunct="0">
+              <a:spcBef>
+                <a:spcPct val="0"/>
+              </a:spcBef>
+              <a:spcAft>
+                <a:spcPct val="0"/>
+              </a:spcAft>
+              <a:defRPr sz="1400">
+                <a:solidFill>
+                  <a:schemeClr val="tx1"/>
+                </a:solidFill>
+                <a:latin typeface="Arial" charset="0"/>
+                <a:cs typeface="Arial" charset="0"/>
+              </a:defRPr>
+            </a:lvl6pPr>
+            <a:lvl7pPr marL="2971800" indent="-228600" eaLnBrk="0" fontAlgn="base" hangingPunct="0">
+              <a:spcBef>
+                <a:spcPct val="0"/>
+              </a:spcBef>
+              <a:spcAft>
+                <a:spcPct val="0"/>
+              </a:spcAft>
+              <a:defRPr sz="1400">
+                <a:solidFill>
+                  <a:schemeClr val="tx1"/>
+                </a:solidFill>
+                <a:latin typeface="Arial" charset="0"/>
+                <a:cs typeface="Arial" charset="0"/>
+              </a:defRPr>
+            </a:lvl7pPr>
+            <a:lvl8pPr marL="3429000" indent="-228600" eaLnBrk="0" fontAlgn="base" hangingPunct="0">
+              <a:spcBef>
+                <a:spcPct val="0"/>
+              </a:spcBef>
+              <a:spcAft>
+                <a:spcPct val="0"/>
+              </a:spcAft>
+              <a:defRPr sz="1400">
+                <a:solidFill>
+                  <a:schemeClr val="tx1"/>
+                </a:solidFill>
+                <a:latin typeface="Arial" charset="0"/>
+                <a:cs typeface="Arial" charset="0"/>
+              </a:defRPr>
+            </a:lvl8pPr>
+            <a:lvl9pPr marL="3886200" indent="-228600" eaLnBrk="0" fontAlgn="base" hangingPunct="0">
+              <a:spcBef>
+                <a:spcPct val="0"/>
+              </a:spcBef>
+              <a:spcAft>
+                <a:spcPct val="0"/>
+              </a:spcAft>
+              <a:defRPr sz="1400">
+                <a:solidFill>
+                  <a:schemeClr val="tx1"/>
+                </a:solidFill>
+                <a:latin typeface="Arial" charset="0"/>
+                <a:cs typeface="Arial" charset="0"/>
+              </a:defRPr>
+            </a:lvl9pPr>
+          </a:lstStyle>
+          <a:p>
+            <a:pPr algn="ctr">
+              <a:spcBef>
+                <a:spcPct val="50000"/>
+              </a:spcBef>
+              <a:defRPr/>
+            </a:pPr>
             <a:r>
-              <a:rPr lang="en-US" altLang="en-US" dirty="0"/>
-              <a:t>Click to edit Master text styles</a:t>
+              <a:rPr lang="en-US" altLang="en-US" sz="1800" b="1" i="1">
+                <a:solidFill>
+                  <a:srgbClr val="000000"/>
+                </a:solidFill>
+                <a:latin typeface="+mj-lt"/>
+              </a:rPr>
+              <a:t>Care </a:t>
             </a:r>
-          </a:p>
-          <a:p>
-            <a:pPr lvl="1"/>
             <a:r>
-              <a:rPr lang="en-US" altLang="en-US" dirty="0"/>
-              <a:t>Second level</a:t>
+              <a:rPr lang="en-US" altLang="en-US" sz="1800" b="1" i="0">
+                <a:solidFill>
+                  <a:srgbClr val="000000"/>
+                </a:solidFill>
+                <a:latin typeface="+mj-lt"/>
+              </a:rPr>
+              <a:t>that Connects</a:t>
             </a:r>
-          </a:p>
-          <a:p>
-            <a:pPr lvl="2"/>
             <a:r>
-              <a:rPr lang="en-US" altLang="en-US" dirty="0"/>
-              <a:t>Third level</a:t>
+              <a:rPr lang="en-US" altLang="en-US" sz="1800" b="1" i="1">
+                <a:solidFill>
+                  <a:srgbClr val="000000"/>
+                </a:solidFill>
+                <a:latin typeface="+mj-lt"/>
+              </a:rPr>
+              <a:t>…Talent </a:t>
             </a:r>
-          </a:p>
-          <a:p>
-            <a:pPr lvl="3"/>
             <a:r>
-              <a:rPr lang="en-US" altLang="en-US" dirty="0"/>
-              <a:t>Fourth level</a:t>
-            </a:r>
-          </a:p>
-          <a:p>
-            <a:pPr lvl="0"/>
-            <a:r>
-              <a:rPr lang="en-US" altLang="en-US" dirty="0"/>
-              <a:t>2nd Bullet</a:t>
+              <a:rPr lang="en-US" altLang="en-US" sz="1800" b="1" i="0">
+                <a:solidFill>
+                  <a:srgbClr val="000000"/>
+                </a:solidFill>
+                <a:latin typeface="+mj-lt"/>
+              </a:rPr>
+              <a:t>that Transforms</a:t>
             </a:r>
           </a:p>
         </p:txBody>
       </p:sp>
-      <p:pic>
-        <p:nvPicPr>
-          <p:cNvPr id="11" name="Picture 10"/>
-          <p:cNvPicPr>
-            <a:picLocks noChangeAspect="1"/>
-          </p:cNvPicPr>
-          <p:nvPr userDrawn="1"/>
-        </p:nvPicPr>
-        <p:blipFill>
-          <a:blip r:embed="rId7" cstate="print">
-            <a:extLst>
-              <a:ext uri="{28A0092B-C50C-407E-A947-70E740481C1C}">
-                <a14:useLocalDpi xmlns:a14="http://schemas.microsoft.com/office/drawing/2010/main"/>
-              </a:ext>
-            </a:extLst>
-          </a:blip>
-          <a:stretch>
-            <a:fillRect/>
-          </a:stretch>
-        </p:blipFill>
-        <p:spPr>
-          <a:xfrm>
-            <a:off x="910384" y="120652"/>
-            <a:ext cx="1587071" cy="1492757"/>
-          </a:xfrm>
-          <a:prstGeom prst="rect">
-            <a:avLst/>
-          </a:prstGeom>
-          <a:effectLst/>
-        </p:spPr>
-      </p:pic>
     </p:spTree>
     <p:extLst>
       <p:ext uri="{BB962C8B-B14F-4D97-AF65-F5344CB8AC3E}">
-        <p14:creationId xmlns:p14="http://schemas.microsoft.com/office/powerpoint/2010/main" val="1480826731"/>
+        <p14:creationId xmlns:p14="http://schemas.microsoft.com/office/powerpoint/2010/main" val="3868595674"/>
       </p:ext>
     </p:extLst>
   </p:cSld>
   <p:clrMap bg1="lt1" tx1="dk1" bg2="lt2" tx2="dk2" accent1="accent1" accent2="accent2" accent3="accent3" accent4="accent4" accent5="accent5" accent6="accent6" hlink="hlink" folHlink="folHlink"/>
   <p:sldLayoutIdLst>
-    <p:sldLayoutId id="2147483668" r:id="rId1"/>
-    <p:sldLayoutId id="2147483669" r:id="rId2"/>
+    <p:sldLayoutId id="2147483666" r:id="rId1"/>
+    <p:sldLayoutId id="2147483667" r:id="rId2"/>
     <p:sldLayoutId id="2147483671" r:id="rId3"/>
-    <p:sldLayoutId id="2147483672" r:id="rId4"/>
-    <p:sldLayoutId id="2147483670" r:id="rId5"/>
+    <p:sldLayoutId id="2147483670" r:id="rId4"/>
+    <p:sldLayoutId id="2147483668" r:id="rId5"/>
   </p:sldLayoutIdLst>
   <p:hf hdr="0" ftr="0" dt="0"/>
   <p:txStyles>
@@ -2790,7 +3054,7 @@
         <a:spcAft>
           <a:spcPct val="0"/>
         </a:spcAft>
-        <a:defRPr sz="4800" b="1" i="1">
+        <a:defRPr sz="3600" b="1" i="1">
           <a:solidFill>
             <a:srgbClr val="151C77"/>
           </a:solidFill>
@@ -2806,7 +3070,7 @@
         <a:spcAft>
           <a:spcPct val="0"/>
         </a:spcAft>
-        <a:defRPr sz="4800" b="1" i="1">
+        <a:defRPr sz="3600" b="1" i="1">
           <a:solidFill>
             <a:srgbClr val="151C77"/>
           </a:solidFill>
@@ -2820,7 +3084,7 @@
         <a:spcAft>
           <a:spcPct val="0"/>
         </a:spcAft>
-        <a:defRPr sz="4800" b="1" i="1">
+        <a:defRPr sz="3600" b="1" i="1">
           <a:solidFill>
             <a:srgbClr val="151C77"/>
           </a:solidFill>
@@ -2834,7 +3098,7 @@
         <a:spcAft>
           <a:spcPct val="0"/>
         </a:spcAft>
-        <a:defRPr sz="4800" b="1" i="1">
+        <a:defRPr sz="3600" b="1" i="1">
           <a:solidFill>
             <a:srgbClr val="151C77"/>
           </a:solidFill>
@@ -2848,63 +3112,63 @@
         <a:spcAft>
           <a:spcPct val="0"/>
         </a:spcAft>
-        <a:defRPr sz="4800" b="1" i="1">
+        <a:defRPr sz="3600" b="1" i="1">
           <a:solidFill>
             <a:srgbClr val="151C77"/>
           </a:solidFill>
           <a:latin typeface="Arial" charset="0"/>
         </a:defRPr>
       </a:lvl5pPr>
-      <a:lvl6pPr marL="609570" algn="r" rtl="0" eaLnBrk="1" fontAlgn="base" hangingPunct="1">
+      <a:lvl6pPr marL="457189" algn="r" rtl="0" eaLnBrk="1" fontAlgn="base" hangingPunct="1">
         <a:spcBef>
           <a:spcPct val="0"/>
         </a:spcBef>
         <a:spcAft>
           <a:spcPct val="0"/>
         </a:spcAft>
-        <a:defRPr sz="4800" b="1" i="1">
+        <a:defRPr sz="3600" b="1" i="1">
           <a:solidFill>
             <a:srgbClr val="151C77"/>
           </a:solidFill>
           <a:latin typeface="Arial" charset="0"/>
         </a:defRPr>
       </a:lvl6pPr>
-      <a:lvl7pPr marL="1219139" algn="r" rtl="0" eaLnBrk="1" fontAlgn="base" hangingPunct="1">
+      <a:lvl7pPr marL="914377" algn="r" rtl="0" eaLnBrk="1" fontAlgn="base" hangingPunct="1">
         <a:spcBef>
           <a:spcPct val="0"/>
         </a:spcBef>
         <a:spcAft>
           <a:spcPct val="0"/>
         </a:spcAft>
-        <a:defRPr sz="4800" b="1" i="1">
+        <a:defRPr sz="3600" b="1" i="1">
           <a:solidFill>
             <a:srgbClr val="151C77"/>
           </a:solidFill>
           <a:latin typeface="Arial" charset="0"/>
         </a:defRPr>
       </a:lvl7pPr>
-      <a:lvl8pPr marL="1828709" algn="r" rtl="0" eaLnBrk="1" fontAlgn="base" hangingPunct="1">
+      <a:lvl8pPr marL="1371566" algn="r" rtl="0" eaLnBrk="1" fontAlgn="base" hangingPunct="1">
         <a:spcBef>
           <a:spcPct val="0"/>
         </a:spcBef>
         <a:spcAft>
           <a:spcPct val="0"/>
         </a:spcAft>
-        <a:defRPr sz="4800" b="1" i="1">
+        <a:defRPr sz="3600" b="1" i="1">
           <a:solidFill>
             <a:srgbClr val="151C77"/>
           </a:solidFill>
           <a:latin typeface="Arial" charset="0"/>
         </a:defRPr>
       </a:lvl8pPr>
-      <a:lvl9pPr marL="2438278" algn="r" rtl="0" eaLnBrk="1" fontAlgn="base" hangingPunct="1">
+      <a:lvl9pPr marL="1828754" algn="r" rtl="0" eaLnBrk="1" fontAlgn="base" hangingPunct="1">
         <a:spcBef>
           <a:spcPct val="0"/>
         </a:spcBef>
         <a:spcAft>
           <a:spcPct val="0"/>
         </a:spcAft>
-        <a:defRPr sz="4800" b="1" i="1">
+        <a:defRPr sz="3600" b="1" i="1">
           <a:solidFill>
             <a:srgbClr val="151C77"/>
           </a:solidFill>
@@ -2913,7 +3177,7 @@
       </a:lvl9pPr>
     </p:titleStyle>
     <p:bodyStyle>
-      <a:lvl1pPr marL="378875" indent="-378875" algn="l" rtl="0" eaLnBrk="0" fontAlgn="base" hangingPunct="0">
+      <a:lvl1pPr marL="284163" indent="-284163" algn="l" rtl="0" eaLnBrk="0" fontAlgn="base" hangingPunct="0">
         <a:spcBef>
           <a:spcPct val="50000"/>
         </a:spcBef>
@@ -2926,7 +3190,7 @@
         <a:buSzPct val="80000"/>
         <a:buFont typeface="Wingdings" pitchFamily="2" charset="2"/>
         <a:buChar char="n"/>
-        <a:defRPr sz="2667" b="1">
+        <a:defRPr sz="2000" b="1">
           <a:solidFill>
             <a:schemeClr val="tx1"/>
           </a:solidFill>
@@ -2935,7 +3199,7 @@
           <a:cs typeface="+mn-cs"/>
         </a:defRPr>
       </a:lvl1pPr>
-      <a:lvl2pPr marL="918586" indent="-376748" algn="l" rtl="0" eaLnBrk="0" fontAlgn="base" hangingPunct="0">
+      <a:lvl2pPr marL="688957" indent="-282568" algn="l" rtl="0" eaLnBrk="0" fontAlgn="base" hangingPunct="0">
         <a:spcBef>
           <a:spcPct val="25000"/>
         </a:spcBef>
@@ -2948,14 +3212,14 @@
         <a:buSzPct val="80000"/>
         <a:buFont typeface="Wingdings" pitchFamily="2" charset="2"/>
         <a:buChar char="n"/>
-        <a:defRPr sz="2667" b="1">
+        <a:defRPr sz="2000" b="1">
           <a:solidFill>
             <a:schemeClr val="tx1"/>
           </a:solidFill>
           <a:latin typeface="+mn-lt"/>
         </a:defRPr>
       </a:lvl2pPr>
-      <a:lvl3pPr marL="1369416" indent="-298437" algn="l" rtl="0" eaLnBrk="0" fontAlgn="base" hangingPunct="0">
+      <a:lvl3pPr marL="1027088" indent="-223833" algn="l" rtl="0" eaLnBrk="0" fontAlgn="base" hangingPunct="0">
         <a:spcBef>
           <a:spcPct val="25000"/>
         </a:spcBef>
@@ -2968,14 +3232,14 @@
         <a:buSzPct val="80000"/>
         <a:buFont typeface="Wingdings" pitchFamily="2" charset="2"/>
         <a:buChar char="n"/>
-        <a:defRPr sz="2667" b="1">
+        <a:defRPr sz="2000" b="1">
           <a:solidFill>
             <a:schemeClr val="tx1"/>
           </a:solidFill>
           <a:latin typeface="+mn-lt"/>
         </a:defRPr>
       </a:lvl3pPr>
-      <a:lvl4pPr marL="2133493" indent="-304784" algn="l" rtl="0" eaLnBrk="0" fontAlgn="base" hangingPunct="0">
+      <a:lvl4pPr marL="1600160" indent="-228594" algn="l" rtl="0" eaLnBrk="0" fontAlgn="base" hangingPunct="0">
         <a:spcBef>
           <a:spcPct val="25000"/>
         </a:spcBef>
@@ -2988,14 +3252,14 @@
         <a:buSzPct val="80000"/>
         <a:buFont typeface="Wingdings" pitchFamily="2" charset="2"/>
         <a:buChar char="n"/>
-        <a:defRPr sz="2667" b="1">
+        <a:defRPr sz="2000" b="1">
           <a:solidFill>
             <a:schemeClr val="tx1"/>
           </a:solidFill>
           <a:latin typeface="+mn-lt"/>
         </a:defRPr>
       </a:lvl4pPr>
-      <a:lvl5pPr marL="2743063" indent="-304784" algn="l" rtl="0" eaLnBrk="0" fontAlgn="base" hangingPunct="0">
+      <a:lvl5pPr marL="2057349" indent="-228594" algn="l" rtl="0" eaLnBrk="0" fontAlgn="base" hangingPunct="0">
         <a:spcBef>
           <a:spcPct val="20000"/>
         </a:spcBef>
@@ -3008,14 +3272,14 @@
         <a:buSzPct val="80000"/>
         <a:buFont typeface="Wingdings" pitchFamily="2" charset="2"/>
         <a:buChar char="n"/>
-        <a:defRPr sz="2667">
+        <a:defRPr sz="2000">
           <a:solidFill>
             <a:schemeClr val="tx1"/>
           </a:solidFill>
           <a:latin typeface="+mn-lt"/>
         </a:defRPr>
       </a:lvl5pPr>
-      <a:lvl6pPr marL="3352632" indent="-304784" algn="l" rtl="0" eaLnBrk="1" fontAlgn="base" hangingPunct="1">
+      <a:lvl6pPr marL="2514537" indent="-228594" algn="l" rtl="0" eaLnBrk="1" fontAlgn="base" hangingPunct="1">
         <a:spcBef>
           <a:spcPct val="20000"/>
         </a:spcBef>
@@ -3028,14 +3292,14 @@
         <a:buSzPct val="80000"/>
         <a:buFont typeface="Wingdings" pitchFamily="2" charset="2"/>
         <a:buChar char="n"/>
-        <a:defRPr sz="2667">
+        <a:defRPr sz="2000">
           <a:solidFill>
             <a:schemeClr val="tx1"/>
           </a:solidFill>
           <a:latin typeface="+mn-lt"/>
         </a:defRPr>
       </a:lvl6pPr>
-      <a:lvl7pPr marL="3962202" indent="-304784" algn="l" rtl="0" eaLnBrk="1" fontAlgn="base" hangingPunct="1">
+      <a:lvl7pPr marL="2971726" indent="-228594" algn="l" rtl="0" eaLnBrk="1" fontAlgn="base" hangingPunct="1">
         <a:spcBef>
           <a:spcPct val="20000"/>
         </a:spcBef>
@@ -3048,14 +3312,14 @@
         <a:buSzPct val="80000"/>
         <a:buFont typeface="Wingdings" pitchFamily="2" charset="2"/>
         <a:buChar char="n"/>
-        <a:defRPr sz="2667">
+        <a:defRPr sz="2000">
           <a:solidFill>
             <a:schemeClr val="tx1"/>
           </a:solidFill>
           <a:latin typeface="+mn-lt"/>
         </a:defRPr>
       </a:lvl7pPr>
-      <a:lvl8pPr marL="4571771" indent="-304784" algn="l" rtl="0" eaLnBrk="1" fontAlgn="base" hangingPunct="1">
+      <a:lvl8pPr marL="3428914" indent="-228594" algn="l" rtl="0" eaLnBrk="1" fontAlgn="base" hangingPunct="1">
         <a:spcBef>
           <a:spcPct val="20000"/>
         </a:spcBef>
@@ -3068,14 +3332,14 @@
         <a:buSzPct val="80000"/>
         <a:buFont typeface="Wingdings" pitchFamily="2" charset="2"/>
         <a:buChar char="n"/>
-        <a:defRPr sz="2667">
+        <a:defRPr sz="2000">
           <a:solidFill>
             <a:schemeClr val="tx1"/>
           </a:solidFill>
           <a:latin typeface="+mn-lt"/>
         </a:defRPr>
       </a:lvl8pPr>
-      <a:lvl9pPr marL="5181341" indent="-304784" algn="l" rtl="0" eaLnBrk="1" fontAlgn="base" hangingPunct="1">
+      <a:lvl9pPr marL="3886103" indent="-228594" algn="l" rtl="0" eaLnBrk="1" fontAlgn="base" hangingPunct="1">
         <a:spcBef>
           <a:spcPct val="20000"/>
         </a:spcBef>
@@ -3088,7 +3352,7 @@
         <a:buSzPct val="80000"/>
         <a:buFont typeface="Wingdings" pitchFamily="2" charset="2"/>
         <a:buChar char="n"/>
-        <a:defRPr sz="2667">
+        <a:defRPr sz="2000">
           <a:solidFill>
             <a:schemeClr val="tx1"/>
           </a:solidFill>
@@ -3100,8 +3364,8 @@
       <a:defPPr>
         <a:defRPr lang="en-US"/>
       </a:defPPr>
-      <a:lvl1pPr marL="0" algn="l" defTabSz="1219139" rtl="0" eaLnBrk="1" latinLnBrk="0" hangingPunct="1">
-        <a:defRPr sz="2400" kern="1200">
+      <a:lvl1pPr marL="0" algn="l" defTabSz="914377" rtl="0" eaLnBrk="1" latinLnBrk="0" hangingPunct="1">
+        <a:defRPr sz="1800" kern="1200">
           <a:solidFill>
             <a:schemeClr val="tx1"/>
           </a:solidFill>
@@ -3110,8 +3374,8 @@
           <a:cs typeface="+mn-cs"/>
         </a:defRPr>
       </a:lvl1pPr>
-      <a:lvl2pPr marL="609570" algn="l" defTabSz="1219139" rtl="0" eaLnBrk="1" latinLnBrk="0" hangingPunct="1">
-        <a:defRPr sz="2400" kern="1200">
+      <a:lvl2pPr marL="457189" algn="l" defTabSz="914377" rtl="0" eaLnBrk="1" latinLnBrk="0" hangingPunct="1">
+        <a:defRPr sz="1800" kern="1200">
           <a:solidFill>
             <a:schemeClr val="tx1"/>
           </a:solidFill>
@@ -3120,8 +3384,8 @@
           <a:cs typeface="+mn-cs"/>
         </a:defRPr>
       </a:lvl2pPr>
-      <a:lvl3pPr marL="1219139" algn="l" defTabSz="1219139" rtl="0" eaLnBrk="1" latinLnBrk="0" hangingPunct="1">
-        <a:defRPr sz="2400" kern="1200">
+      <a:lvl3pPr marL="914377" algn="l" defTabSz="914377" rtl="0" eaLnBrk="1" latinLnBrk="0" hangingPunct="1">
+        <a:defRPr sz="1800" kern="1200">
           <a:solidFill>
             <a:schemeClr val="tx1"/>
           </a:solidFill>
@@ -3130,8 +3394,8 @@
           <a:cs typeface="+mn-cs"/>
         </a:defRPr>
       </a:lvl3pPr>
-      <a:lvl4pPr marL="1828709" algn="l" defTabSz="1219139" rtl="0" eaLnBrk="1" latinLnBrk="0" hangingPunct="1">
-        <a:defRPr sz="2400" kern="1200">
+      <a:lvl4pPr marL="1371566" algn="l" defTabSz="914377" rtl="0" eaLnBrk="1" latinLnBrk="0" hangingPunct="1">
+        <a:defRPr sz="1800" kern="1200">
           <a:solidFill>
             <a:schemeClr val="tx1"/>
           </a:solidFill>
@@ -3140,8 +3404,8 @@
           <a:cs typeface="+mn-cs"/>
         </a:defRPr>
       </a:lvl4pPr>
-      <a:lvl5pPr marL="2438278" algn="l" defTabSz="1219139" rtl="0" eaLnBrk="1" latinLnBrk="0" hangingPunct="1">
-        <a:defRPr sz="2400" kern="1200">
+      <a:lvl5pPr marL="1828754" algn="l" defTabSz="914377" rtl="0" eaLnBrk="1" latinLnBrk="0" hangingPunct="1">
+        <a:defRPr sz="1800" kern="1200">
           <a:solidFill>
             <a:schemeClr val="tx1"/>
           </a:solidFill>
@@ -3150,8 +3414,8 @@
           <a:cs typeface="+mn-cs"/>
         </a:defRPr>
       </a:lvl5pPr>
-      <a:lvl6pPr marL="3047848" algn="l" defTabSz="1219139" rtl="0" eaLnBrk="1" latinLnBrk="0" hangingPunct="1">
-        <a:defRPr sz="2400" kern="1200">
+      <a:lvl6pPr marL="2285943" algn="l" defTabSz="914377" rtl="0" eaLnBrk="1" latinLnBrk="0" hangingPunct="1">
+        <a:defRPr sz="1800" kern="1200">
           <a:solidFill>
             <a:schemeClr val="tx1"/>
           </a:solidFill>
@@ -3160,8 +3424,8 @@
           <a:cs typeface="+mn-cs"/>
         </a:defRPr>
       </a:lvl6pPr>
-      <a:lvl7pPr marL="3657417" algn="l" defTabSz="1219139" rtl="0" eaLnBrk="1" latinLnBrk="0" hangingPunct="1">
-        <a:defRPr sz="2400" kern="1200">
+      <a:lvl7pPr marL="2743131" algn="l" defTabSz="914377" rtl="0" eaLnBrk="1" latinLnBrk="0" hangingPunct="1">
+        <a:defRPr sz="1800" kern="1200">
           <a:solidFill>
             <a:schemeClr val="tx1"/>
           </a:solidFill>
@@ -3170,8 +3434,8 @@
           <a:cs typeface="+mn-cs"/>
         </a:defRPr>
       </a:lvl7pPr>
-      <a:lvl8pPr marL="4266987" algn="l" defTabSz="1219139" rtl="0" eaLnBrk="1" latinLnBrk="0" hangingPunct="1">
-        <a:defRPr sz="2400" kern="1200">
+      <a:lvl8pPr marL="3200320" algn="l" defTabSz="914377" rtl="0" eaLnBrk="1" latinLnBrk="0" hangingPunct="1">
+        <a:defRPr sz="1800" kern="1200">
           <a:solidFill>
             <a:schemeClr val="tx1"/>
           </a:solidFill>
@@ -3180,8 +3444,8 @@
           <a:cs typeface="+mn-cs"/>
         </a:defRPr>
       </a:lvl8pPr>
-      <a:lvl9pPr marL="4876557" algn="l" defTabSz="1219139" rtl="0" eaLnBrk="1" latinLnBrk="0" hangingPunct="1">
-        <a:defRPr sz="2400" kern="1200">
+      <a:lvl9pPr marL="3657509" algn="l" defTabSz="914377" rtl="0" eaLnBrk="1" latinLnBrk="0" hangingPunct="1">
+        <a:defRPr sz="1800" kern="1200">
           <a:solidFill>
             <a:schemeClr val="tx1"/>
           </a:solidFill>
@@ -3214,50 +3478,109 @@
       </p:grpSpPr>
       <p:sp>
         <p:nvSpPr>
-          <p:cNvPr id="2" name="Content Placeholder 1">
-            <a:extLst>
-              <a:ext uri="{FF2B5EF4-FFF2-40B4-BE49-F238E27FC236}">
-                <a16:creationId xmlns:a16="http://schemas.microsoft.com/office/drawing/2014/main" id="{013106F5-7D85-3B96-1492-0E090608238D}"/>
-              </a:ext>
-            </a:extLst>
-          </p:cNvPr>
+          <p:cNvPr id="15363" name="Rectangle 3"/>
           <p:cNvSpPr>
-            <a:spLocks noGrp="1"/>
+            <a:spLocks noChangeArrowheads="1"/>
           </p:cNvSpPr>
-          <p:nvPr>
-            <p:ph sz="quarter" idx="12"/>
-          </p:nvPr>
+          <p:nvPr/>
         </p:nvSpPr>
-        <p:spPr/>
+        <p:spPr bwMode="auto">
+          <a:xfrm>
+            <a:off x="3143015" y="1905000"/>
+            <a:ext cx="8508240" cy="4423192"/>
+          </a:xfrm>
+          <a:prstGeom prst="rect">
+            <a:avLst/>
+          </a:prstGeom>
+          <a:noFill/>
+          <a:ln w="9525">
+            <a:noFill/>
+            <a:miter lim="800000"/>
+            <a:headEnd/>
+            <a:tailEnd/>
+          </a:ln>
+        </p:spPr>
         <p:txBody>
-          <a:bodyPr/>
+          <a:bodyPr lIns="91440" tIns="45720" rIns="91440" bIns="45720" anchor="t"/>
           <a:lstStyle/>
           <a:p>
-            <a:endParaRPr lang="en-US"/>
-          </a:p>
-        </p:txBody>
-      </p:sp>
-      <p:sp>
-        <p:nvSpPr>
-          <p:cNvPr id="3" name="Title 2">
-            <a:extLst>
-              <a:ext uri="{FF2B5EF4-FFF2-40B4-BE49-F238E27FC236}">
-                <a16:creationId xmlns:a16="http://schemas.microsoft.com/office/drawing/2014/main" id="{8F11F6DF-E72E-FA18-7772-4EBC112AB718}"/>
-              </a:ext>
-            </a:extLst>
-          </p:cNvPr>
-          <p:cNvSpPr>
-            <a:spLocks noGrp="1"/>
-          </p:cNvSpPr>
-          <p:nvPr>
-            <p:ph type="ctrTitle"/>
-          </p:nvPr>
-        </p:nvSpPr>
-        <p:spPr/>
-        <p:txBody>
-          <a:bodyPr/>
-          <a:lstStyle/>
-          <a:p>
+            <a:pPr marL="0" marR="0" lvl="0" indent="0" algn="r" defTabSz="914400" rtl="0" eaLnBrk="0" fontAlgn="auto" latinLnBrk="0" hangingPunct="0">
+              <a:lnSpc>
+                <a:spcPct val="100000"/>
+              </a:lnSpc>
+              <a:spcBef>
+                <a:spcPts val="0"/>
+              </a:spcBef>
+              <a:spcAft>
+                <a:spcPts val="0"/>
+              </a:spcAft>
+              <a:buClrTx/>
+              <a:buSzTx/>
+              <a:buFontTx/>
+              <a:buNone/>
+              <a:tabLst/>
+              <a:defRPr/>
+            </a:pPr>
+            <a:endParaRPr kumimoji="0" lang="en-US" sz="3200" b="1" i="0" u="none" strike="noStrike" kern="1200" cap="none" spc="0" normalizeH="0" baseline="0" noProof="0">
+              <a:ln>
+                <a:noFill/>
+              </a:ln>
+              <a:solidFill>
+                <a:srgbClr val="151C77"/>
+              </a:solidFill>
+              <a:effectLst/>
+              <a:uLnTx/>
+              <a:uFillTx/>
+              <a:latin typeface="Arial" pitchFamily="34" charset="0"/>
+              <a:ea typeface="+mn-ea"/>
+              <a:cs typeface="Arial" pitchFamily="34" charset="0"/>
+            </a:endParaRPr>
+          </a:p>
+          <a:p>
+            <a:pPr algn="r" eaLnBrk="0" hangingPunct="0">
+              <a:defRPr/>
+            </a:pPr>
+            <a:r>
+              <a:rPr lang="en-US" sz="4400" b="1">
+                <a:solidFill>
+                  <a:srgbClr val="151C77"/>
+                </a:solidFill>
+                <a:latin typeface="Arial"/>
+                <a:cs typeface="Arial"/>
+              </a:rPr>
+              <a:t>FY2026 Officer Classification:</a:t>
+            </a:r>
+          </a:p>
+          <a:p>
+            <a:pPr algn="r">
+              <a:defRPr/>
+            </a:pPr>
+            <a:r>
+              <a:rPr lang="en-US" sz="4400" b="1">
+                <a:solidFill>
+                  <a:srgbClr val="151C77"/>
+                </a:solidFill>
+                <a:latin typeface="Arial"/>
+                <a:cs typeface="Arial"/>
+              </a:rPr>
+              <a:t>Decision</a:t>
+            </a:r>
+            <a:r>
+              <a:rPr kumimoji="0" lang="en-US" sz="4400" b="1" i="0" u="none" strike="noStrike" kern="1200" cap="none" spc="0" normalizeH="0" baseline="0" noProof="0">
+                <a:ln>
+                  <a:noFill/>
+                </a:ln>
+                <a:solidFill>
+                  <a:srgbClr val="151C77"/>
+                </a:solidFill>
+                <a:effectLst/>
+                <a:uLnTx/>
+                <a:uFillTx/>
+                <a:latin typeface="Arial"/>
+                <a:cs typeface="Arial"/>
+              </a:rPr>
+              <a:t> Briefing</a:t>
+            </a:r>
             <a:endParaRPr lang="en-US"/>
           </a:p>
         </p:txBody>
@@ -3265,7 +3588,7 @@
     </p:spTree>
     <p:extLst>
       <p:ext uri="{BB962C8B-B14F-4D97-AF65-F5344CB8AC3E}">
-        <p14:creationId xmlns:p14="http://schemas.microsoft.com/office/powerpoint/2010/main" val="1714053145"/>
+        <p14:creationId xmlns:p14="http://schemas.microsoft.com/office/powerpoint/2010/main" val="1849413882"/>
       </p:ext>
     </p:extLst>
   </p:cSld>
@@ -3294,6 +3617,28 @@
       </p:grpSpPr>
       <p:sp>
         <p:nvSpPr>
+          <p:cNvPr id="2" name="Title 1"/>
+          <p:cNvSpPr>
+            <a:spLocks noGrp="1"/>
+          </p:cNvSpPr>
+          <p:nvPr>
+            <p:ph type="title"/>
+          </p:nvPr>
+        </p:nvSpPr>
+        <p:spPr/>
+        <p:txBody>
+          <a:bodyPr/>
+          <a:lstStyle/>
+          <a:p>
+            <a:r>
+              <a:rPr lang="en-US"/>
+              <a:t>Overview</a:t>
+            </a:r>
+          </a:p>
+        </p:txBody>
+      </p:sp>
+      <p:sp>
+        <p:nvSpPr>
           <p:cNvPr id="4" name="Slide Number Placeholder 3"/>
           <p:cNvSpPr>
             <a:spLocks noGrp="1"/>
@@ -3321,7 +3666,7 @@
               </a:pPr>
               <a:t>2</a:t>
             </a:fld>
-            <a:endParaRPr lang="en-US" dirty="0"/>
+            <a:endParaRPr lang="en-US"/>
           </a:p>
         </p:txBody>
       </p:sp>
@@ -3335,8 +3680,8 @@
         </p:nvSpPr>
         <p:spPr bwMode="auto">
           <a:xfrm>
-            <a:off x="1168400" y="1930400"/>
-            <a:ext cx="15145456" cy="6324600"/>
+            <a:off x="457200" y="1447800"/>
+            <a:ext cx="11359092" cy="4743450"/>
           </a:xfrm>
           <a:prstGeom prst="rect">
             <a:avLst/>
@@ -3366,7 +3711,7 @@
           </a:extLst>
         </p:spPr>
         <p:txBody>
-          <a:bodyPr vert="horz" wrap="square" lIns="121920" tIns="60960" rIns="121920" bIns="60960" numCol="1" anchor="t" anchorCtr="0" compatLnSpc="1">
+          <a:bodyPr vert="horz" wrap="square" lIns="91440" tIns="45720" rIns="91440" bIns="45720" numCol="1" anchor="t" anchorCtr="0" compatLnSpc="1">
             <a:prstTxWarp prst="textNoShape">
               <a:avLst/>
             </a:prstTxWarp>
@@ -3556,129 +3901,90 @@
             </a:lvl9pPr>
           </a:lstStyle>
           <a:p>
+            <a:pPr marL="285115" indent="-285115"/>
             <a:r>
-              <a:rPr lang="en-US" altLang="en-US" sz="2667" kern="0" dirty="0"/>
-              <a:t>All slides will be in widescreen format (use this template to start new slide builds)</a:t>
+              <a:rPr lang="en-US" altLang="en-US" kern="0" dirty="0"/>
+              <a:t>Model Overview</a:t>
             </a:r>
-          </a:p>
-          <a:p>
+            <a:endParaRPr lang="en-US" dirty="0"/>
+          </a:p>
+          <a:p>
+            <a:pPr marL="285115" indent="-285115"/>
             <a:r>
-              <a:rPr lang="en-US" altLang="en-US" sz="2667" kern="0" dirty="0"/>
-              <a:t>The title slide (see previous slide) should be in Arial, bold, 44 point and the standard blue</a:t>
+              <a:rPr lang="en-US" altLang="en-US" kern="0" dirty="0"/>
+              <a:t>FY26 Results – CASTLE Method</a:t>
             </a:r>
-          </a:p>
-          <a:p>
-            <a:pPr lvl="1"/>
+            <a:endParaRPr lang="en-US" altLang="en-US" kern="0" dirty="0">
+              <a:cs typeface="Arial"/>
+            </a:endParaRPr>
+          </a:p>
+          <a:p>
+            <a:pPr marL="688340" lvl="1" indent="-281940"/>
             <a:r>
-              <a:rPr lang="en-US" altLang="en-US" sz="2667" kern="0" dirty="0"/>
-              <a:t>The AF standard blue is:  Hue 167, Sat 179, </a:t>
+              <a:rPr lang="en-US" altLang="en-US" kern="0" dirty="0"/>
+              <a:t>Key Pacing Metrics</a:t>
             </a:r>
+            <a:endParaRPr lang="en-US" altLang="en-US" kern="0" dirty="0">
+              <a:cs typeface="Arial"/>
+            </a:endParaRPr>
+          </a:p>
+          <a:p>
+            <a:pPr marL="285115" indent="-285115"/>
             <a:r>
-              <a:rPr lang="en-US" altLang="en-US" sz="2667" kern="0" dirty="0" err="1"/>
-              <a:t>Lum</a:t>
+              <a:rPr lang="en-US" altLang="en-US" kern="0" dirty="0"/>
+              <a:t>Surplus Allocation</a:t>
             </a:r>
+            <a:endParaRPr lang="en-US" altLang="en-US" kern="0" dirty="0">
+              <a:cs typeface="Arial"/>
+            </a:endParaRPr>
+          </a:p>
+          <a:p>
+            <a:pPr marL="285115" indent="-285115"/>
             <a:r>
-              <a:rPr lang="en-US" altLang="en-US" sz="2667" kern="0" dirty="0"/>
-              <a:t> 70, Red 21, Green 28, and Blue 119</a:t>
+              <a:rPr lang="en-US" kern="0" dirty="0">
+                <a:cs typeface="Arial"/>
+              </a:rPr>
+              <a:t>62EXE Shortage</a:t>
             </a:r>
           </a:p>
           <a:p>
+            <a:pPr marL="285115" indent="-285115"/>
+            <a:endParaRPr lang="en-US" kern="0" dirty="0">
+              <a:cs typeface="Arial"/>
+            </a:endParaRPr>
+          </a:p>
+          <a:p>
+            <a:pPr marL="285115" indent="-285115"/>
             <a:r>
-              <a:rPr lang="en-US" altLang="en-US" sz="2667" kern="0" dirty="0"/>
-              <a:t>Aligned with the top of the AF symbol star should be</a:t>
+              <a:rPr lang="en-US" altLang="en-US" kern="0" dirty="0">
+                <a:cs typeface="Arial"/>
+              </a:rPr>
+              <a:t>AFSC Satisfaction Breakdown</a:t>
             </a:r>
-          </a:p>
-          <a:p>
-            <a:pPr lvl="1"/>
+            <a:endParaRPr lang="en-US" altLang="en-US" kern="0" dirty="0"/>
+          </a:p>
+          <a:p>
+            <a:pPr marL="285115" indent="-285115"/>
             <a:r>
-              <a:rPr lang="en-US" altLang="en-US" sz="2667" kern="0" dirty="0"/>
-              <a:t>Rank, Name of briefer</a:t>
+              <a:rPr lang="en-US" altLang="en-US" kern="0" dirty="0"/>
+              <a:t>Cadet Preference Breakdown</a:t>
             </a:r>
-          </a:p>
-          <a:p>
-            <a:pPr lvl="1"/>
-            <a:r>
-              <a:rPr lang="en-US" altLang="en-US" sz="2667" kern="0" dirty="0"/>
-              <a:t>Office symbol should be on the line below</a:t>
-            </a:r>
-          </a:p>
-          <a:p>
-            <a:pPr lvl="1"/>
-            <a:r>
-              <a:rPr lang="en-US" altLang="en-US" sz="2667" kern="0" dirty="0"/>
-              <a:t>Date the briefing is given</a:t>
-            </a:r>
-          </a:p>
-          <a:p>
-            <a:pPr lvl="1"/>
-            <a:r>
-              <a:rPr lang="en-US" altLang="en-US" sz="2667" kern="0" dirty="0"/>
-              <a:t>All will be black, bold, 20 point Arial, and right justified</a:t>
-            </a:r>
+            <a:endParaRPr lang="en-US" altLang="en-US" kern="0" dirty="0">
+              <a:cs typeface="Arial"/>
+            </a:endParaRPr>
+          </a:p>
+          <a:p>
+            <a:pPr marL="285115" indent="-285115"/>
+            <a:endParaRPr lang="en-US" altLang="en-US" kern="0" dirty="0">
+              <a:cs typeface="Arial"/>
+            </a:endParaRPr>
           </a:p>
         </p:txBody>
       </p:sp>
-      <p:sp>
-        <p:nvSpPr>
-          <p:cNvPr id="2" name="Title 1"/>
-          <p:cNvSpPr>
-            <a:spLocks noGrp="1"/>
-          </p:cNvSpPr>
-          <p:nvPr>
-            <p:ph type="title"/>
-          </p:nvPr>
-        </p:nvSpPr>
-        <p:spPr/>
-        <p:txBody>
-          <a:bodyPr/>
-          <a:lstStyle/>
-          <a:p>
-            <a:r>
-              <a:rPr lang="en-US" dirty="0"/>
-              <a:t>Title Slide Details</a:t>
-            </a:r>
-          </a:p>
-        </p:txBody>
-      </p:sp>
-      <p:pic>
-        <p:nvPicPr>
-          <p:cNvPr id="3" name="Picture 2"/>
-          <p:cNvPicPr>
-            <a:picLocks noChangeAspect="1"/>
-          </p:cNvPicPr>
-          <p:nvPr/>
-        </p:nvPicPr>
-        <p:blipFill>
-          <a:blip r:embed="rId3">
-            <a:extLst>
-              <a:ext uri="{28A0092B-C50C-407E-A947-70E740481C1C}">
-                <a14:useLocalDpi xmlns:a14="http://schemas.microsoft.com/office/drawing/2010/main" val="0"/>
-              </a:ext>
-            </a:extLst>
-          </a:blip>
-          <a:stretch>
-            <a:fillRect/>
-          </a:stretch>
-        </p:blipFill>
-        <p:spPr>
-          <a:xfrm>
-            <a:off x="11938000" y="3556001"/>
-            <a:ext cx="3251200" cy="3600255"/>
-          </a:xfrm>
-          <a:prstGeom prst="rect">
-            <a:avLst/>
-          </a:prstGeom>
-          <a:ln>
-            <a:solidFill>
-              <a:schemeClr val="tx1"/>
-            </a:solidFill>
-          </a:ln>
-        </p:spPr>
-      </p:pic>
     </p:spTree>
     <p:extLst>
       <p:ext uri="{BB962C8B-B14F-4D97-AF65-F5344CB8AC3E}">
-        <p14:creationId xmlns:p14="http://schemas.microsoft.com/office/powerpoint/2010/main" val="1032290178"/>
+        <p14:creationId xmlns:p14="http://schemas.microsoft.com/office/powerpoint/2010/main" val="2278931405"/>
       </p:ext>
     </p:extLst>
   </p:cSld>
@@ -3707,12 +4013,18 @@
       </p:grpSpPr>
       <p:sp>
         <p:nvSpPr>
-          <p:cNvPr id="4" name="Slide Number Placeholder 3"/>
+          <p:cNvPr id="3" name="Picture Placeholder 2">
+            <a:extLst>
+              <a:ext uri="{FF2B5EF4-FFF2-40B4-BE49-F238E27FC236}">
+                <a16:creationId xmlns:a16="http://schemas.microsoft.com/office/drawing/2014/main" id="{20391EBF-1F30-D99B-3EB3-78A297997DBE}"/>
+              </a:ext>
+            </a:extLst>
+          </p:cNvPr>
           <p:cNvSpPr>
             <a:spLocks noGrp="1"/>
           </p:cNvSpPr>
           <p:nvPr>
-            <p:ph type="sldNum" sz="quarter" idx="11"/>
+            <p:ph type="pic" sz="quarter" idx="10"/>
           </p:nvPr>
         </p:nvSpPr>
         <p:spPr/>
@@ -3720,538 +4032,14 @@
           <a:bodyPr/>
           <a:lstStyle/>
           <a:p>
-            <a:pPr>
-              <a:defRPr/>
-            </a:pPr>
-            <a:fld id="{8742E453-760C-45C9-8C05-6ED692EDA49B}" type="slidenum">
-              <a:rPr lang="en-US" smtClean="0"/>
-              <a:pPr>
-                <a:defRPr/>
-              </a:pPr>
-              <a:t>3</a:t>
-            </a:fld>
-            <a:endParaRPr lang="en-US" dirty="0">
-              <a:solidFill>
-                <a:srgbClr val="808080"/>
-              </a:solidFill>
-            </a:endParaRPr>
-          </a:p>
-        </p:txBody>
-      </p:sp>
-      <p:sp>
-        <p:nvSpPr>
-          <p:cNvPr id="3" name="Title 2"/>
-          <p:cNvSpPr>
-            <a:spLocks noGrp="1"/>
-          </p:cNvSpPr>
-          <p:nvPr>
-            <p:ph type="title"/>
-          </p:nvPr>
-        </p:nvSpPr>
-        <p:spPr/>
-        <p:txBody>
-          <a:bodyPr/>
-          <a:lstStyle/>
-          <a:p>
-            <a:r>
-              <a:rPr lang="en-US" dirty="0"/>
-              <a:t>Other Details</a:t>
-            </a:r>
-          </a:p>
-        </p:txBody>
-      </p:sp>
-      <p:sp>
-        <p:nvSpPr>
-          <p:cNvPr id="11" name="Rectangle 3"/>
-          <p:cNvSpPr txBox="1">
-            <a:spLocks noChangeArrowheads="1"/>
-          </p:cNvSpPr>
-          <p:nvPr/>
-        </p:nvSpPr>
-        <p:spPr bwMode="auto">
-          <a:xfrm>
-            <a:off x="1168401" y="1930400"/>
-            <a:ext cx="15149689" cy="6324600"/>
-          </a:xfrm>
-          <a:prstGeom prst="rect">
-            <a:avLst/>
-          </a:prstGeom>
-          <a:noFill/>
-          <a:ln>
-            <a:noFill/>
-          </a:ln>
-          <a:extLst>
-            <a:ext uri="{909E8E84-426E-40DD-AFC4-6F175D3DCCD1}">
-              <a14:hiddenFill xmlns:a14="http://schemas.microsoft.com/office/drawing/2010/main">
-                <a:solidFill>
-                  <a:srgbClr val="FFFFFF"/>
-                </a:solidFill>
-              </a14:hiddenFill>
-            </a:ext>
-            <a:ext uri="{91240B29-F687-4F45-9708-019B960494DF}">
-              <a14:hiddenLine xmlns:a14="http://schemas.microsoft.com/office/drawing/2010/main" w="9525">
-                <a:solidFill>
-                  <a:srgbClr val="000000"/>
-                </a:solidFill>
-                <a:miter lim="800000"/>
-                <a:headEnd/>
-                <a:tailEnd/>
-              </a14:hiddenLine>
-            </a:ext>
-          </a:extLst>
-        </p:spPr>
-        <p:txBody>
-          <a:bodyPr vert="horz" wrap="square" lIns="121920" tIns="60960" rIns="121920" bIns="60960" numCol="1" anchor="t" anchorCtr="0" compatLnSpc="1">
-            <a:prstTxWarp prst="textNoShape">
-              <a:avLst/>
-            </a:prstTxWarp>
-          </a:bodyPr>
-          <a:lstStyle>
-            <a:lvl1pPr marL="285744" indent="-285744" algn="l" rtl="0" eaLnBrk="0" fontAlgn="base" hangingPunct="0">
-              <a:spcBef>
-                <a:spcPct val="50000"/>
-              </a:spcBef>
-              <a:spcAft>
-                <a:spcPct val="0"/>
-              </a:spcAft>
-              <a:buClr>
-                <a:srgbClr val="151C77"/>
-              </a:buClr>
-              <a:buSzPct val="80000"/>
-              <a:buFont typeface="Wingdings" pitchFamily="2" charset="2"/>
-              <a:buChar char="n"/>
-              <a:defRPr sz="2000" b="1">
-                <a:solidFill>
-                  <a:schemeClr val="tx1"/>
-                </a:solidFill>
-                <a:latin typeface="+mn-lt"/>
-                <a:ea typeface="+mn-ea"/>
-                <a:cs typeface="+mn-cs"/>
-              </a:defRPr>
-            </a:lvl1pPr>
-            <a:lvl2pPr marL="688957" indent="-282568" algn="l" rtl="0" eaLnBrk="0" fontAlgn="base" hangingPunct="0">
-              <a:spcBef>
-                <a:spcPct val="25000"/>
-              </a:spcBef>
-              <a:spcAft>
-                <a:spcPct val="0"/>
-              </a:spcAft>
-              <a:buClr>
-                <a:srgbClr val="151C77"/>
-              </a:buClr>
-              <a:buSzPct val="80000"/>
-              <a:buFont typeface="Wingdings" pitchFamily="2" charset="2"/>
-              <a:buChar char="n"/>
-              <a:defRPr sz="2000" b="1">
-                <a:solidFill>
-                  <a:schemeClr val="tx1"/>
-                </a:solidFill>
-                <a:latin typeface="+mn-lt"/>
-              </a:defRPr>
-            </a:lvl2pPr>
-            <a:lvl3pPr marL="1027088" indent="-223833" algn="l" rtl="0" eaLnBrk="0" fontAlgn="base" hangingPunct="0">
-              <a:spcBef>
-                <a:spcPct val="25000"/>
-              </a:spcBef>
-              <a:spcAft>
-                <a:spcPct val="0"/>
-              </a:spcAft>
-              <a:buClr>
-                <a:srgbClr val="151C77"/>
-              </a:buClr>
-              <a:buSzPct val="80000"/>
-              <a:buFont typeface="Wingdings" pitchFamily="2" charset="2"/>
-              <a:buChar char="n"/>
-              <a:defRPr sz="2000" b="1">
-                <a:solidFill>
-                  <a:schemeClr val="tx1"/>
-                </a:solidFill>
-                <a:latin typeface="+mn-lt"/>
-              </a:defRPr>
-            </a:lvl3pPr>
-            <a:lvl4pPr marL="1600160" indent="-228594" algn="l" rtl="0" eaLnBrk="0" fontAlgn="base" hangingPunct="0">
-              <a:spcBef>
-                <a:spcPct val="25000"/>
-              </a:spcBef>
-              <a:spcAft>
-                <a:spcPct val="0"/>
-              </a:spcAft>
-              <a:buClr>
-                <a:srgbClr val="151C77"/>
-              </a:buClr>
-              <a:buSzPct val="80000"/>
-              <a:buFont typeface="Wingdings" pitchFamily="2" charset="2"/>
-              <a:buChar char="n"/>
-              <a:defRPr sz="2000" b="1">
-                <a:solidFill>
-                  <a:schemeClr val="tx1"/>
-                </a:solidFill>
-                <a:latin typeface="+mn-lt"/>
-              </a:defRPr>
-            </a:lvl4pPr>
-            <a:lvl5pPr marL="2057349" indent="-228594" algn="l" rtl="0" eaLnBrk="0" fontAlgn="base" hangingPunct="0">
-              <a:spcBef>
-                <a:spcPct val="20000"/>
-              </a:spcBef>
-              <a:spcAft>
-                <a:spcPct val="0"/>
-              </a:spcAft>
-              <a:buClr>
-                <a:srgbClr val="003399"/>
-              </a:buClr>
-              <a:buSzPct val="80000"/>
-              <a:buFont typeface="Wingdings" pitchFamily="2" charset="2"/>
-              <a:buChar char="n"/>
-              <a:defRPr sz="2000">
-                <a:solidFill>
-                  <a:schemeClr val="tx1"/>
-                </a:solidFill>
-                <a:latin typeface="+mn-lt"/>
-              </a:defRPr>
-            </a:lvl5pPr>
-            <a:lvl6pPr marL="2514537" indent="-228594" algn="l" rtl="0" eaLnBrk="1" fontAlgn="base" hangingPunct="1">
-              <a:spcBef>
-                <a:spcPct val="20000"/>
-              </a:spcBef>
-              <a:spcAft>
-                <a:spcPct val="0"/>
-              </a:spcAft>
-              <a:buClr>
-                <a:srgbClr val="003399"/>
-              </a:buClr>
-              <a:buSzPct val="80000"/>
-              <a:buFont typeface="Wingdings" pitchFamily="2" charset="2"/>
-              <a:buChar char="n"/>
-              <a:defRPr sz="2000">
-                <a:solidFill>
-                  <a:schemeClr val="tx1"/>
-                </a:solidFill>
-                <a:latin typeface="+mn-lt"/>
-              </a:defRPr>
-            </a:lvl6pPr>
-            <a:lvl7pPr marL="2971726" indent="-228594" algn="l" rtl="0" eaLnBrk="1" fontAlgn="base" hangingPunct="1">
-              <a:spcBef>
-                <a:spcPct val="20000"/>
-              </a:spcBef>
-              <a:spcAft>
-                <a:spcPct val="0"/>
-              </a:spcAft>
-              <a:buClr>
-                <a:srgbClr val="003399"/>
-              </a:buClr>
-              <a:buSzPct val="80000"/>
-              <a:buFont typeface="Wingdings" pitchFamily="2" charset="2"/>
-              <a:buChar char="n"/>
-              <a:defRPr sz="2000">
-                <a:solidFill>
-                  <a:schemeClr val="tx1"/>
-                </a:solidFill>
-                <a:latin typeface="+mn-lt"/>
-              </a:defRPr>
-            </a:lvl7pPr>
-            <a:lvl8pPr marL="3428914" indent="-228594" algn="l" rtl="0" eaLnBrk="1" fontAlgn="base" hangingPunct="1">
-              <a:spcBef>
-                <a:spcPct val="20000"/>
-              </a:spcBef>
-              <a:spcAft>
-                <a:spcPct val="0"/>
-              </a:spcAft>
-              <a:buClr>
-                <a:srgbClr val="003399"/>
-              </a:buClr>
-              <a:buSzPct val="80000"/>
-              <a:buFont typeface="Wingdings" pitchFamily="2" charset="2"/>
-              <a:buChar char="n"/>
-              <a:defRPr sz="2000">
-                <a:solidFill>
-                  <a:schemeClr val="tx1"/>
-                </a:solidFill>
-                <a:latin typeface="+mn-lt"/>
-              </a:defRPr>
-            </a:lvl8pPr>
-            <a:lvl9pPr marL="3886103" indent="-228594" algn="l" rtl="0" eaLnBrk="1" fontAlgn="base" hangingPunct="1">
-              <a:spcBef>
-                <a:spcPct val="20000"/>
-              </a:spcBef>
-              <a:spcAft>
-                <a:spcPct val="0"/>
-              </a:spcAft>
-              <a:buClr>
-                <a:srgbClr val="003399"/>
-              </a:buClr>
-              <a:buSzPct val="80000"/>
-              <a:buFont typeface="Wingdings" pitchFamily="2" charset="2"/>
-              <a:buChar char="n"/>
-              <a:defRPr sz="2000">
-                <a:solidFill>
-                  <a:schemeClr val="tx1"/>
-                </a:solidFill>
-                <a:latin typeface="+mn-lt"/>
-              </a:defRPr>
-            </a:lvl9pPr>
-          </a:lstStyle>
-          <a:p>
-            <a:r>
-              <a:rPr lang="en-US" altLang="en-US" sz="2667" kern="0" dirty="0"/>
-              <a:t>Slides should always be in narrative format and self-explanatory</a:t>
-            </a:r>
-          </a:p>
-          <a:p>
-            <a:r>
-              <a:rPr lang="en-US" altLang="en-US" sz="2667" kern="0" dirty="0"/>
-              <a:t>Bullets and sub-bullets should not end in periods</a:t>
-            </a:r>
-          </a:p>
-          <a:p>
-            <a:r>
-              <a:rPr lang="en-US" altLang="en-US" sz="2667" kern="0" dirty="0"/>
-              <a:t>An orphan is a single word on its own line</a:t>
-            </a:r>
-          </a:p>
-          <a:p>
-            <a:pPr lvl="1"/>
-            <a:r>
-              <a:rPr lang="en-US" altLang="en-US" sz="2667" kern="0" dirty="0"/>
-              <a:t>This sub-bullet is added here for the purpose of demonstrating what is meant by an orphan</a:t>
-            </a:r>
-          </a:p>
-          <a:p>
-            <a:pPr lvl="1"/>
-            <a:r>
-              <a:rPr lang="en-US" altLang="en-US" sz="2667" kern="0" dirty="0"/>
-              <a:t>Ensure slides do not have orphans</a:t>
-            </a:r>
-          </a:p>
-          <a:p>
-            <a:r>
-              <a:rPr lang="en-US" altLang="en-US" sz="2667" kern="0" dirty="0"/>
-              <a:t>Limit abbreviations</a:t>
-            </a:r>
-          </a:p>
-          <a:p>
-            <a:r>
-              <a:rPr lang="en-US" altLang="en-US" sz="2667" kern="0" dirty="0"/>
-              <a:t>Standardize dates (e.g. 11 Jul 19)</a:t>
-            </a:r>
-          </a:p>
-          <a:p>
-            <a:r>
-              <a:rPr lang="en-US" altLang="en-US" sz="2667" kern="0" dirty="0"/>
-              <a:t>Page numbers should be displayed on all slides, after the Title slide, in the lower         right-hand corner</a:t>
-            </a:r>
-          </a:p>
-        </p:txBody>
-      </p:sp>
-      <p:sp>
-        <p:nvSpPr>
-          <p:cNvPr id="5" name="Content Placeholder 4"/>
-          <p:cNvSpPr txBox="1">
-            <a:spLocks/>
-          </p:cNvSpPr>
-          <p:nvPr/>
-        </p:nvSpPr>
-        <p:spPr bwMode="auto">
-          <a:xfrm>
-            <a:off x="1270000" y="7697709"/>
-            <a:ext cx="14833600" cy="836691"/>
-          </a:xfrm>
-          <a:prstGeom prst="rect">
-            <a:avLst/>
-          </a:prstGeom>
-          <a:solidFill>
-            <a:srgbClr val="002060"/>
-          </a:solidFill>
-          <a:ln w="25400" cap="flat" cmpd="sng" algn="ctr">
-            <a:solidFill>
-              <a:srgbClr val="4F81BD">
-                <a:shade val="50000"/>
-              </a:srgbClr>
-            </a:solidFill>
-            <a:prstDash val="solid"/>
-            <a:miter lim="800000"/>
-            <a:headEnd/>
-            <a:tailEnd/>
-          </a:ln>
-          <a:effectLst/>
-          <a:scene3d>
-            <a:camera prst="orthographicFront"/>
-            <a:lightRig rig="threePt" dir="t"/>
-          </a:scene3d>
-          <a:sp3d>
-            <a:bevelT w="190500"/>
-          </a:sp3d>
-        </p:spPr>
-        <p:txBody>
-          <a:bodyPr anchor="ctr"/>
-          <a:lstStyle>
-            <a:lvl1pPr marL="0" indent="0" algn="ctr" eaLnBrk="0" hangingPunct="0">
-              <a:spcBef>
-                <a:spcPts val="0"/>
-              </a:spcBef>
-              <a:spcAft>
-                <a:spcPts val="0"/>
-              </a:spcAft>
-              <a:buClr>
-                <a:srgbClr val="151C77"/>
-              </a:buClr>
-              <a:buSzPct val="80000"/>
-              <a:buFont typeface="Wingdings" pitchFamily="2" charset="2"/>
-              <a:buNone/>
-              <a:defRPr sz="1800" b="1">
-                <a:solidFill>
-                  <a:srgbClr val="FFFFFF"/>
-                </a:solidFill>
-                <a:latin typeface="+mj-lt"/>
-                <a:ea typeface="Times New Roman" panose="02020603050405020304" pitchFamily="18" charset="0"/>
-              </a:defRPr>
-            </a:lvl1pPr>
-            <a:lvl2pPr marL="688975" indent="-282575" eaLnBrk="0" hangingPunct="0">
-              <a:spcBef>
-                <a:spcPct val="25000"/>
-              </a:spcBef>
-              <a:buClr>
-                <a:srgbClr val="151C77"/>
-              </a:buClr>
-              <a:buSzPct val="80000"/>
-              <a:buFont typeface="Wingdings" pitchFamily="2" charset="2"/>
-              <a:buChar char="n"/>
-              <a:defRPr sz="2000" b="1">
-                <a:latin typeface="+mn-lt"/>
-              </a:defRPr>
-            </a:lvl2pPr>
-            <a:lvl3pPr marL="1027113" indent="-223838" eaLnBrk="0" hangingPunct="0">
-              <a:spcBef>
-                <a:spcPct val="25000"/>
-              </a:spcBef>
-              <a:buClr>
-                <a:srgbClr val="151C77"/>
-              </a:buClr>
-              <a:buSzPct val="80000"/>
-              <a:buFont typeface="Wingdings" pitchFamily="2" charset="2"/>
-              <a:buChar char="n"/>
-              <a:defRPr sz="2000" b="1">
-                <a:latin typeface="+mn-lt"/>
-              </a:defRPr>
-            </a:lvl3pPr>
-            <a:lvl4pPr marL="1600200" indent="-228600" eaLnBrk="0" hangingPunct="0">
-              <a:spcBef>
-                <a:spcPct val="25000"/>
-              </a:spcBef>
-              <a:buClr>
-                <a:srgbClr val="151C77"/>
-              </a:buClr>
-              <a:buSzPct val="80000"/>
-              <a:buFont typeface="Wingdings" pitchFamily="2" charset="2"/>
-              <a:buChar char="n"/>
-              <a:defRPr sz="2000" b="1">
-                <a:latin typeface="+mn-lt"/>
-              </a:defRPr>
-            </a:lvl4pPr>
-            <a:lvl5pPr marL="2057400" indent="-228600" eaLnBrk="0" hangingPunct="0">
-              <a:spcBef>
-                <a:spcPct val="20000"/>
-              </a:spcBef>
-              <a:buClr>
-                <a:srgbClr val="003399"/>
-              </a:buClr>
-              <a:buSzPct val="80000"/>
-              <a:buFont typeface="Wingdings" pitchFamily="2" charset="2"/>
-              <a:buChar char="n"/>
-              <a:defRPr sz="2000">
-                <a:latin typeface="+mn-lt"/>
-              </a:defRPr>
-            </a:lvl5pPr>
-            <a:lvl6pPr marL="2514600" indent="-228600" eaLnBrk="0" fontAlgn="base" hangingPunct="0">
-              <a:spcBef>
-                <a:spcPct val="20000"/>
-              </a:spcBef>
-              <a:spcAft>
-                <a:spcPct val="0"/>
-              </a:spcAft>
-              <a:buClr>
-                <a:srgbClr val="003399"/>
-              </a:buClr>
-              <a:buSzPct val="80000"/>
-              <a:buFont typeface="Wingdings" pitchFamily="2" charset="2"/>
-              <a:buChar char="n"/>
-              <a:defRPr sz="2000">
-                <a:latin typeface="+mn-lt"/>
-              </a:defRPr>
-            </a:lvl6pPr>
-            <a:lvl7pPr marL="2971800" indent="-228600" eaLnBrk="0" fontAlgn="base" hangingPunct="0">
-              <a:spcBef>
-                <a:spcPct val="20000"/>
-              </a:spcBef>
-              <a:spcAft>
-                <a:spcPct val="0"/>
-              </a:spcAft>
-              <a:buClr>
-                <a:srgbClr val="003399"/>
-              </a:buClr>
-              <a:buSzPct val="80000"/>
-              <a:buFont typeface="Wingdings" pitchFamily="2" charset="2"/>
-              <a:buChar char="n"/>
-              <a:defRPr sz="2000">
-                <a:latin typeface="+mn-lt"/>
-              </a:defRPr>
-            </a:lvl7pPr>
-            <a:lvl8pPr marL="3429000" indent="-228600" eaLnBrk="0" fontAlgn="base" hangingPunct="0">
-              <a:spcBef>
-                <a:spcPct val="20000"/>
-              </a:spcBef>
-              <a:spcAft>
-                <a:spcPct val="0"/>
-              </a:spcAft>
-              <a:buClr>
-                <a:srgbClr val="003399"/>
-              </a:buClr>
-              <a:buSzPct val="80000"/>
-              <a:buFont typeface="Wingdings" pitchFamily="2" charset="2"/>
-              <a:buChar char="n"/>
-              <a:defRPr sz="2000">
-                <a:latin typeface="+mn-lt"/>
-              </a:defRPr>
-            </a:lvl8pPr>
-            <a:lvl9pPr marL="3886200" indent="-228600" eaLnBrk="0" fontAlgn="base" hangingPunct="0">
-              <a:spcBef>
-                <a:spcPct val="20000"/>
-              </a:spcBef>
-              <a:spcAft>
-                <a:spcPct val="0"/>
-              </a:spcAft>
-              <a:buClr>
-                <a:srgbClr val="003399"/>
-              </a:buClr>
-              <a:buSzPct val="80000"/>
-              <a:buFont typeface="Wingdings" pitchFamily="2" charset="2"/>
-              <a:buChar char="n"/>
-              <a:defRPr sz="2000">
-                <a:latin typeface="+mn-lt"/>
-              </a:defRPr>
-            </a:lvl9pPr>
-          </a:lstStyle>
-          <a:p>
-            <a:pPr defTabSz="1219170">
-              <a:spcBef>
-                <a:spcPct val="0"/>
-              </a:spcBef>
-              <a:buClrTx/>
-              <a:buSzTx/>
-              <a:defRPr/>
-            </a:pPr>
-            <a:r>
-              <a:rPr lang="en-US" altLang="en-US" sz="2400" dirty="0">
-                <a:latin typeface="Arial"/>
-              </a:rPr>
-              <a:t>Utilize this box for the slide’s main take-away</a:t>
-            </a:r>
+            <a:endParaRPr lang="en-US"/>
           </a:p>
         </p:txBody>
       </p:sp>
     </p:spTree>
     <p:extLst>
       <p:ext uri="{BB962C8B-B14F-4D97-AF65-F5344CB8AC3E}">
-        <p14:creationId xmlns:p14="http://schemas.microsoft.com/office/powerpoint/2010/main" val="1713522437"/>
+        <p14:creationId xmlns:p14="http://schemas.microsoft.com/office/powerpoint/2010/main" val="1956197998"/>
       </p:ext>
     </p:extLst>
   </p:cSld>
@@ -4283,7 +4071,7 @@
           <p:cNvPr id="2" name="Title 1">
             <a:extLst>
               <a:ext uri="{FF2B5EF4-FFF2-40B4-BE49-F238E27FC236}">
-                <a16:creationId xmlns:a16="http://schemas.microsoft.com/office/drawing/2014/main" id="{03B7AEB3-5388-E684-416C-3BA10E7F773F}"/>
+                <a16:creationId xmlns:a16="http://schemas.microsoft.com/office/drawing/2014/main" id="{13C7A683-082D-C537-DB9B-973EA1F3BA4D}"/>
               </a:ext>
             </a:extLst>
           </p:cNvPr>
@@ -4291,86 +4079,33 @@
             <a:spLocks noGrp="1"/>
           </p:cNvSpPr>
           <p:nvPr>
-            <p:ph type="title"/>
+            <p:ph type="ctrTitle"/>
           </p:nvPr>
         </p:nvSpPr>
-        <p:spPr/>
+        <p:spPr>
+          <a:xfrm>
+            <a:off x="3613859" y="2413706"/>
+            <a:ext cx="4965700" cy="1600200"/>
+          </a:xfrm>
+        </p:spPr>
         <p:txBody>
           <a:bodyPr/>
           <a:lstStyle/>
           <a:p>
-            <a:endParaRPr lang="en-US"/>
-          </a:p>
-        </p:txBody>
-      </p:sp>
-      <p:sp>
-        <p:nvSpPr>
-          <p:cNvPr id="3" name="Content Placeholder 2">
-            <a:extLst>
-              <a:ext uri="{FF2B5EF4-FFF2-40B4-BE49-F238E27FC236}">
-                <a16:creationId xmlns:a16="http://schemas.microsoft.com/office/drawing/2014/main" id="{E05541F9-4D81-EFD8-C421-13E090BD6CF9}"/>
-              </a:ext>
-            </a:extLst>
-          </p:cNvPr>
-          <p:cNvSpPr>
-            <a:spLocks noGrp="1"/>
-          </p:cNvSpPr>
-          <p:nvPr>
-            <p:ph idx="1"/>
-          </p:nvPr>
-        </p:nvSpPr>
-        <p:spPr/>
-        <p:txBody>
-          <a:bodyPr/>
-          <a:lstStyle/>
-          <a:p>
-            <a:endParaRPr lang="en-US" dirty="0"/>
-          </a:p>
-        </p:txBody>
-      </p:sp>
-      <p:sp>
-        <p:nvSpPr>
-          <p:cNvPr id="4" name="Slide Number Placeholder 3">
-            <a:extLst>
-              <a:ext uri="{FF2B5EF4-FFF2-40B4-BE49-F238E27FC236}">
-                <a16:creationId xmlns:a16="http://schemas.microsoft.com/office/drawing/2014/main" id="{969E0B98-5C31-BF82-12D4-05946EE65B51}"/>
-              </a:ext>
-            </a:extLst>
-          </p:cNvPr>
-          <p:cNvSpPr>
-            <a:spLocks noGrp="1"/>
-          </p:cNvSpPr>
-          <p:nvPr>
-            <p:ph type="sldNum" sz="quarter" idx="11"/>
-          </p:nvPr>
-        </p:nvSpPr>
-        <p:spPr/>
-        <p:txBody>
-          <a:bodyPr/>
-          <a:lstStyle/>
-          <a:p>
-            <a:pPr>
-              <a:defRPr/>
-            </a:pPr>
-            <a:fld id="{8742E453-760C-45C9-8C05-6ED692EDA49B}" type="slidenum">
-              <a:rPr lang="en-US" smtClean="0"/>
-              <a:pPr>
-                <a:defRPr/>
-              </a:pPr>
-              <a:t>4</a:t>
-            </a:fld>
-            <a:endParaRPr lang="en-US" dirty="0">
-              <a:solidFill>
-                <a:srgbClr val="808080"/>
-              </a:solidFill>
-            </a:endParaRPr>
+            <a:pPr algn="ctr"/>
+            <a:r>
+              <a:rPr lang="en-US" dirty="0">
+                <a:cs typeface="Arial"/>
+              </a:rPr>
+              <a:t>Questions?</a:t>
+            </a:r>
           </a:p>
         </p:txBody>
       </p:sp>
     </p:spTree>
     <p:extLst>
       <p:ext uri="{BB962C8B-B14F-4D97-AF65-F5344CB8AC3E}">
-        <p14:creationId xmlns:p14="http://schemas.microsoft.com/office/powerpoint/2010/main" val="2058843355"/>
+        <p14:creationId xmlns:p14="http://schemas.microsoft.com/office/powerpoint/2010/main" val="1225676374"/>
       </p:ext>
     </p:extLst>
   </p:cSld>
@@ -4399,55 +4134,13 @@
       </p:grpSpPr>
       <p:sp>
         <p:nvSpPr>
-          <p:cNvPr id="2" name="Picture Placeholder 1">
+          <p:cNvPr id="4" name="Slide Number Placeholder 3">
             <a:extLst>
               <a:ext uri="{FF2B5EF4-FFF2-40B4-BE49-F238E27FC236}">
-                <a16:creationId xmlns:a16="http://schemas.microsoft.com/office/drawing/2014/main" id="{94760925-6A73-A06F-35A0-602FF4787243}"/>
+                <a16:creationId xmlns:a16="http://schemas.microsoft.com/office/drawing/2014/main" id="{328991AE-C5E2-41BD-5CDE-FA6A931FC01D}"/>
               </a:ext>
             </a:extLst>
           </p:cNvPr>
-          <p:cNvSpPr>
-            <a:spLocks noGrp="1"/>
-          </p:cNvSpPr>
-          <p:nvPr>
-            <p:ph type="pic" sz="quarter" idx="10"/>
-          </p:nvPr>
-        </p:nvSpPr>
-        <p:spPr/>
-      </p:sp>
-    </p:spTree>
-    <p:extLst>
-      <p:ext uri="{BB962C8B-B14F-4D97-AF65-F5344CB8AC3E}">
-        <p14:creationId xmlns:p14="http://schemas.microsoft.com/office/powerpoint/2010/main" val="1235855463"/>
-      </p:ext>
-    </p:extLst>
-  </p:cSld>
-  <p:clrMapOvr>
-    <a:masterClrMapping/>
-  </p:clrMapOvr>
-</p:sld>
-</file>
-
-<file path=ppt/slides/slide6.xml><?xml version="1.0" encoding="utf-8"?>
-<p:sld xmlns:a="http://schemas.openxmlformats.org/drawingml/2006/main" xmlns:r="http://schemas.openxmlformats.org/officeDocument/2006/relationships" xmlns:p="http://schemas.openxmlformats.org/presentationml/2006/main">
-  <p:cSld>
-    <p:spTree>
-      <p:nvGrpSpPr>
-        <p:cNvPr id="1" name=""/>
-        <p:cNvGrpSpPr/>
-        <p:nvPr/>
-      </p:nvGrpSpPr>
-      <p:grpSpPr>
-        <a:xfrm>
-          <a:off x="0" y="0"/>
-          <a:ext cx="0" cy="0"/>
-          <a:chOff x="0" y="0"/>
-          <a:chExt cx="0" cy="0"/>
-        </a:xfrm>
-      </p:grpSpPr>
-      <p:sp>
-        <p:nvSpPr>
-          <p:cNvPr id="4" name="Slide Number Placeholder 3"/>
           <p:cNvSpPr>
             <a:spLocks noGrp="1"/>
           </p:cNvSpPr>
@@ -4468,216 +4161,20 @@
               <a:pPr>
                 <a:defRPr/>
               </a:pPr>
-              <a:t>6</a:t>
+              <a:t>5</a:t>
             </a:fld>
-            <a:endParaRPr lang="en-US" dirty="0">
+            <a:endParaRPr lang="en-US">
               <a:solidFill>
                 <a:srgbClr val="808080"/>
               </a:solidFill>
             </a:endParaRPr>
-          </a:p>
-        </p:txBody>
-      </p:sp>
-      <p:pic>
-        <p:nvPicPr>
-          <p:cNvPr id="8" name="Picture 7"/>
-          <p:cNvPicPr>
-            <a:picLocks noChangeAspect="1"/>
-          </p:cNvPicPr>
-          <p:nvPr/>
-        </p:nvPicPr>
-        <p:blipFill>
-          <a:blip r:embed="rId3" cstate="screen">
-            <a:extLst>
-              <a:ext uri="{28A0092B-C50C-407E-A947-70E740481C1C}">
-                <a14:useLocalDpi xmlns:a14="http://schemas.microsoft.com/office/drawing/2010/main"/>
-              </a:ext>
-            </a:extLst>
-          </a:blip>
-          <a:stretch>
-            <a:fillRect/>
-          </a:stretch>
-        </p:blipFill>
-        <p:spPr>
-          <a:xfrm>
-            <a:off x="6004561" y="2621280"/>
-            <a:ext cx="5385345" cy="5254232"/>
-          </a:xfrm>
-          <a:prstGeom prst="rect">
-            <a:avLst/>
-          </a:prstGeom>
-        </p:spPr>
-      </p:pic>
-      <p:sp>
-        <p:nvSpPr>
-          <p:cNvPr id="9" name="Text Box 14"/>
-          <p:cNvSpPr txBox="1">
-            <a:spLocks noChangeArrowheads="1"/>
-          </p:cNvSpPr>
-          <p:nvPr/>
-        </p:nvSpPr>
-        <p:spPr bwMode="auto">
-          <a:xfrm>
-            <a:off x="3855271" y="666757"/>
-            <a:ext cx="9911431" cy="830997"/>
-          </a:xfrm>
-          <a:prstGeom prst="rect">
-            <a:avLst/>
-          </a:prstGeom>
-          <a:noFill/>
-          <a:ln>
-            <a:noFill/>
-          </a:ln>
-          <a:extLst>
-            <a:ext uri="{909E8E84-426E-40DD-AFC4-6F175D3DCCD1}">
-              <a14:hiddenFill xmlns:a14="http://schemas.microsoft.com/office/drawing/2010/main">
-                <a:solidFill>
-                  <a:srgbClr val="FFFFFF"/>
-                </a:solidFill>
-              </a14:hiddenFill>
-            </a:ext>
-            <a:ext uri="{91240B29-F687-4F45-9708-019B960494DF}">
-              <a14:hiddenLine xmlns:a14="http://schemas.microsoft.com/office/drawing/2010/main" w="9525">
-                <a:solidFill>
-                  <a:srgbClr val="000000"/>
-                </a:solidFill>
-                <a:miter lim="800000"/>
-                <a:headEnd/>
-                <a:tailEnd/>
-              </a14:hiddenLine>
-            </a:ext>
-          </a:extLst>
-        </p:spPr>
-        <p:txBody>
-          <a:bodyPr wrap="none">
-            <a:spAutoFit/>
-          </a:bodyPr>
-          <a:lstStyle>
-            <a:lvl1pPr eaLnBrk="0" hangingPunct="0">
-              <a:defRPr sz="1400">
-                <a:solidFill>
-                  <a:schemeClr val="tx1"/>
-                </a:solidFill>
-                <a:latin typeface="Arial" charset="0"/>
-                <a:cs typeface="Arial" charset="0"/>
-              </a:defRPr>
-            </a:lvl1pPr>
-            <a:lvl2pPr marL="742950" indent="-285750" eaLnBrk="0" hangingPunct="0">
-              <a:defRPr sz="1400">
-                <a:solidFill>
-                  <a:schemeClr val="tx1"/>
-                </a:solidFill>
-                <a:latin typeface="Arial" charset="0"/>
-                <a:cs typeface="Arial" charset="0"/>
-              </a:defRPr>
-            </a:lvl2pPr>
-            <a:lvl3pPr marL="1143000" indent="-228600" eaLnBrk="0" hangingPunct="0">
-              <a:defRPr sz="1400">
-                <a:solidFill>
-                  <a:schemeClr val="tx1"/>
-                </a:solidFill>
-                <a:latin typeface="Arial" charset="0"/>
-                <a:cs typeface="Arial" charset="0"/>
-              </a:defRPr>
-            </a:lvl3pPr>
-            <a:lvl4pPr marL="1600200" indent="-228600" eaLnBrk="0" hangingPunct="0">
-              <a:defRPr sz="1400">
-                <a:solidFill>
-                  <a:schemeClr val="tx1"/>
-                </a:solidFill>
-                <a:latin typeface="Arial" charset="0"/>
-                <a:cs typeface="Arial" charset="0"/>
-              </a:defRPr>
-            </a:lvl4pPr>
-            <a:lvl5pPr marL="2057400" indent="-228600" eaLnBrk="0" hangingPunct="0">
-              <a:defRPr sz="1400">
-                <a:solidFill>
-                  <a:schemeClr val="tx1"/>
-                </a:solidFill>
-                <a:latin typeface="Arial" charset="0"/>
-                <a:cs typeface="Arial" charset="0"/>
-              </a:defRPr>
-            </a:lvl5pPr>
-            <a:lvl6pPr marL="2514600" indent="-228600" eaLnBrk="0" fontAlgn="base" hangingPunct="0">
-              <a:spcBef>
-                <a:spcPct val="0"/>
-              </a:spcBef>
-              <a:spcAft>
-                <a:spcPct val="0"/>
-              </a:spcAft>
-              <a:defRPr sz="1400">
-                <a:solidFill>
-                  <a:schemeClr val="tx1"/>
-                </a:solidFill>
-                <a:latin typeface="Arial" charset="0"/>
-                <a:cs typeface="Arial" charset="0"/>
-              </a:defRPr>
-            </a:lvl6pPr>
-            <a:lvl7pPr marL="2971800" indent="-228600" eaLnBrk="0" fontAlgn="base" hangingPunct="0">
-              <a:spcBef>
-                <a:spcPct val="0"/>
-              </a:spcBef>
-              <a:spcAft>
-                <a:spcPct val="0"/>
-              </a:spcAft>
-              <a:defRPr sz="1400">
-                <a:solidFill>
-                  <a:schemeClr val="tx1"/>
-                </a:solidFill>
-                <a:latin typeface="Arial" charset="0"/>
-                <a:cs typeface="Arial" charset="0"/>
-              </a:defRPr>
-            </a:lvl7pPr>
-            <a:lvl8pPr marL="3429000" indent="-228600" eaLnBrk="0" fontAlgn="base" hangingPunct="0">
-              <a:spcBef>
-                <a:spcPct val="0"/>
-              </a:spcBef>
-              <a:spcAft>
-                <a:spcPct val="0"/>
-              </a:spcAft>
-              <a:defRPr sz="1400">
-                <a:solidFill>
-                  <a:schemeClr val="tx1"/>
-                </a:solidFill>
-                <a:latin typeface="Arial" charset="0"/>
-                <a:cs typeface="Arial" charset="0"/>
-              </a:defRPr>
-            </a:lvl8pPr>
-            <a:lvl9pPr marL="3886200" indent="-228600" eaLnBrk="0" fontAlgn="base" hangingPunct="0">
-              <a:spcBef>
-                <a:spcPct val="0"/>
-              </a:spcBef>
-              <a:spcAft>
-                <a:spcPct val="0"/>
-              </a:spcAft>
-              <a:defRPr sz="1400">
-                <a:solidFill>
-                  <a:schemeClr val="tx1"/>
-                </a:solidFill>
-                <a:latin typeface="Arial" charset="0"/>
-                <a:cs typeface="Arial" charset="0"/>
-              </a:defRPr>
-            </a:lvl9pPr>
-          </a:lstStyle>
-          <a:p>
-            <a:pPr algn="ctr">
-              <a:defRPr/>
-            </a:pPr>
-            <a:r>
-              <a:rPr lang="en-US" altLang="en-US" sz="4800" b="1" i="1" dirty="0">
-                <a:solidFill>
-                  <a:srgbClr val="000000"/>
-                </a:solidFill>
-              </a:rPr>
-              <a:t>The Air Force’s Personnel Center</a:t>
-            </a:r>
           </a:p>
         </p:txBody>
       </p:sp>
     </p:spTree>
     <p:extLst>
       <p:ext uri="{BB962C8B-B14F-4D97-AF65-F5344CB8AC3E}">
-        <p14:creationId xmlns:p14="http://schemas.microsoft.com/office/powerpoint/2010/main" val="2240843255"/>
+        <p14:creationId xmlns:p14="http://schemas.microsoft.com/office/powerpoint/2010/main" val="3222399312"/>
       </p:ext>
     </p:extLst>
   </p:cSld>
@@ -4688,7 +4185,7 @@
 </file>
 
 <file path=ppt/theme/theme1.xml><?xml version="1.0" encoding="utf-8"?>
-<a:theme xmlns:a="http://schemas.openxmlformats.org/drawingml/2006/main" name="3_USAF(Unclas)">
+<a:theme xmlns:a="http://schemas.openxmlformats.org/drawingml/2006/main" name="4_USAF(Unclas)">
   <a:themeElements>
     <a:clrScheme name="USAF(Unclas) 1">
       <a:dk1>
@@ -5296,44 +4793,44 @@
         <a:sysClr val="window" lastClr="FFFFFF"/>
       </a:lt1>
       <a:dk2>
-        <a:srgbClr val="1F497D"/>
+        <a:srgbClr val="0E2841"/>
       </a:dk2>
       <a:lt2>
-        <a:srgbClr val="EEECE1"/>
+        <a:srgbClr val="E8E8E8"/>
       </a:lt2>
       <a:accent1>
-        <a:srgbClr val="4F81BD"/>
+        <a:srgbClr val="156082"/>
       </a:accent1>
       <a:accent2>
-        <a:srgbClr val="C0504D"/>
+        <a:srgbClr val="E97132"/>
       </a:accent2>
       <a:accent3>
-        <a:srgbClr val="9BBB59"/>
+        <a:srgbClr val="196B24"/>
       </a:accent3>
       <a:accent4>
-        <a:srgbClr val="8064A2"/>
+        <a:srgbClr val="0F9ED5"/>
       </a:accent4>
       <a:accent5>
-        <a:srgbClr val="4BACC6"/>
+        <a:srgbClr val="A02B93"/>
       </a:accent5>
       <a:accent6>
-        <a:srgbClr val="F79646"/>
+        <a:srgbClr val="4EA72E"/>
       </a:accent6>
       <a:hlink>
-        <a:srgbClr val="0000FF"/>
+        <a:srgbClr val="467886"/>
       </a:hlink>
       <a:folHlink>
-        <a:srgbClr val="800080"/>
+        <a:srgbClr val="96607D"/>
       </a:folHlink>
     </a:clrScheme>
     <a:fontScheme name="Office">
       <a:majorFont>
-        <a:latin typeface="Calibri"/>
+        <a:latin typeface="Aptos Display" panose="02110004020202020204"/>
         <a:ea typeface=""/>
         <a:cs typeface=""/>
-        <a:font script="Jpan" typeface="ＭＳ Ｐゴシック"/>
+        <a:font script="Jpan" typeface="游ゴシック Light"/>
         <a:font script="Hang" typeface="맑은 고딕"/>
-        <a:font script="Hans" typeface="宋体"/>
+        <a:font script="Hans" typeface="等线 Light"/>
         <a:font script="Hant" typeface="新細明體"/>
         <a:font script="Arab" typeface="Times New Roman"/>
         <a:font script="Hebr" typeface="Times New Roman"/>
@@ -5361,14 +4858,31 @@
         <a:font script="Viet" typeface="Times New Roman"/>
         <a:font script="Uigh" typeface="Microsoft Uighur"/>
         <a:font script="Geor" typeface="Sylfaen"/>
+        <a:font script="Armn" typeface="Arial"/>
+        <a:font script="Bugi" typeface="Leelawadee UI"/>
+        <a:font script="Bopo" typeface="Microsoft JhengHei"/>
+        <a:font script="Java" typeface="Javanese Text"/>
+        <a:font script="Lisu" typeface="Segoe UI"/>
+        <a:font script="Mymr" typeface="Myanmar Text"/>
+        <a:font script="Nkoo" typeface="Ebrima"/>
+        <a:font script="Olck" typeface="Nirmala UI"/>
+        <a:font script="Osma" typeface="Ebrima"/>
+        <a:font script="Phag" typeface="Phagspa"/>
+        <a:font script="Syrn" typeface="Estrangelo Edessa"/>
+        <a:font script="Syrj" typeface="Estrangelo Edessa"/>
+        <a:font script="Syre" typeface="Estrangelo Edessa"/>
+        <a:font script="Sora" typeface="Nirmala UI"/>
+        <a:font script="Tale" typeface="Microsoft Tai Le"/>
+        <a:font script="Talu" typeface="Microsoft New Tai Lue"/>
+        <a:font script="Tfng" typeface="Ebrima"/>
       </a:majorFont>
       <a:minorFont>
-        <a:latin typeface="Calibri"/>
+        <a:latin typeface="Aptos" panose="02110004020202020204"/>
         <a:ea typeface=""/>
         <a:cs typeface=""/>
-        <a:font script="Jpan" typeface="ＭＳ Ｐゴシック"/>
+        <a:font script="Jpan" typeface="游ゴシック"/>
         <a:font script="Hang" typeface="맑은 고딕"/>
-        <a:font script="Hans" typeface="宋体"/>
+        <a:font script="Hans" typeface="等线"/>
         <a:font script="Hant" typeface="新細明體"/>
         <a:font script="Arab" typeface="Arial"/>
         <a:font script="Hebr" typeface="Arial"/>
@@ -5396,291 +4910,23 @@
         <a:font script="Viet" typeface="Arial"/>
         <a:font script="Uigh" typeface="Microsoft Uighur"/>
         <a:font script="Geor" typeface="Sylfaen"/>
-      </a:minorFont>
-    </a:fontScheme>
-    <a:fmtScheme name="Office">
-      <a:fillStyleLst>
-        <a:solidFill>
-          <a:schemeClr val="phClr"/>
-        </a:solidFill>
-        <a:gradFill rotWithShape="1">
-          <a:gsLst>
-            <a:gs pos="0">
-              <a:schemeClr val="phClr">
-                <a:tint val="50000"/>
-                <a:satMod val="300000"/>
-              </a:schemeClr>
-            </a:gs>
-            <a:gs pos="35000">
-              <a:schemeClr val="phClr">
-                <a:tint val="37000"/>
-                <a:satMod val="300000"/>
-              </a:schemeClr>
-            </a:gs>
-            <a:gs pos="100000">
-              <a:schemeClr val="phClr">
-                <a:tint val="15000"/>
-                <a:satMod val="350000"/>
-              </a:schemeClr>
-            </a:gs>
-          </a:gsLst>
-          <a:lin ang="16200000" scaled="1"/>
-        </a:gradFill>
-        <a:gradFill rotWithShape="1">
-          <a:gsLst>
-            <a:gs pos="0">
-              <a:schemeClr val="phClr">
-                <a:shade val="51000"/>
-                <a:satMod val="130000"/>
-              </a:schemeClr>
-            </a:gs>
-            <a:gs pos="80000">
-              <a:schemeClr val="phClr">
-                <a:shade val="93000"/>
-                <a:satMod val="130000"/>
-              </a:schemeClr>
-            </a:gs>
-            <a:gs pos="100000">
-              <a:schemeClr val="phClr">
-                <a:shade val="94000"/>
-                <a:satMod val="135000"/>
-              </a:schemeClr>
-            </a:gs>
-          </a:gsLst>
-          <a:lin ang="16200000" scaled="0"/>
-        </a:gradFill>
-      </a:fillStyleLst>
-      <a:lnStyleLst>
-        <a:ln w="9525" cap="flat" cmpd="sng" algn="ctr">
-          <a:solidFill>
-            <a:schemeClr val="phClr">
-              <a:shade val="95000"/>
-              <a:satMod val="105000"/>
-            </a:schemeClr>
-          </a:solidFill>
-          <a:prstDash val="solid"/>
-        </a:ln>
-        <a:ln w="25400" cap="flat" cmpd="sng" algn="ctr">
-          <a:solidFill>
-            <a:schemeClr val="phClr"/>
-          </a:solidFill>
-          <a:prstDash val="solid"/>
-        </a:ln>
-        <a:ln w="38100" cap="flat" cmpd="sng" algn="ctr">
-          <a:solidFill>
-            <a:schemeClr val="phClr"/>
-          </a:solidFill>
-          <a:prstDash val="solid"/>
-        </a:ln>
-      </a:lnStyleLst>
-      <a:effectStyleLst>
-        <a:effectStyle>
-          <a:effectLst>
-            <a:outerShdw blurRad="40000" dist="20000" dir="5400000" rotWithShape="0">
-              <a:srgbClr val="000000">
-                <a:alpha val="38000"/>
-              </a:srgbClr>
-            </a:outerShdw>
-          </a:effectLst>
-        </a:effectStyle>
-        <a:effectStyle>
-          <a:effectLst>
-            <a:outerShdw blurRad="40000" dist="23000" dir="5400000" rotWithShape="0">
-              <a:srgbClr val="000000">
-                <a:alpha val="35000"/>
-              </a:srgbClr>
-            </a:outerShdw>
-          </a:effectLst>
-        </a:effectStyle>
-        <a:effectStyle>
-          <a:effectLst>
-            <a:outerShdw blurRad="40000" dist="23000" dir="5400000" rotWithShape="0">
-              <a:srgbClr val="000000">
-                <a:alpha val="35000"/>
-              </a:srgbClr>
-            </a:outerShdw>
-          </a:effectLst>
-          <a:scene3d>
-            <a:camera prst="orthographicFront">
-              <a:rot lat="0" lon="0" rev="0"/>
-            </a:camera>
-            <a:lightRig rig="threePt" dir="t">
-              <a:rot lat="0" lon="0" rev="1200000"/>
-            </a:lightRig>
-          </a:scene3d>
-          <a:sp3d>
-            <a:bevelT w="63500" h="25400"/>
-          </a:sp3d>
-        </a:effectStyle>
-      </a:effectStyleLst>
-      <a:bgFillStyleLst>
-        <a:solidFill>
-          <a:schemeClr val="phClr"/>
-        </a:solidFill>
-        <a:gradFill rotWithShape="1">
-          <a:gsLst>
-            <a:gs pos="0">
-              <a:schemeClr val="phClr">
-                <a:tint val="40000"/>
-                <a:satMod val="350000"/>
-              </a:schemeClr>
-            </a:gs>
-            <a:gs pos="40000">
-              <a:schemeClr val="phClr">
-                <a:tint val="45000"/>
-                <a:shade val="99000"/>
-                <a:satMod val="350000"/>
-              </a:schemeClr>
-            </a:gs>
-            <a:gs pos="100000">
-              <a:schemeClr val="phClr">
-                <a:shade val="20000"/>
-                <a:satMod val="255000"/>
-              </a:schemeClr>
-            </a:gs>
-          </a:gsLst>
-          <a:path path="circle">
-            <a:fillToRect l="50000" t="-80000" r="50000" b="180000"/>
-          </a:path>
-        </a:gradFill>
-        <a:gradFill rotWithShape="1">
-          <a:gsLst>
-            <a:gs pos="0">
-              <a:schemeClr val="phClr">
-                <a:tint val="80000"/>
-                <a:satMod val="300000"/>
-              </a:schemeClr>
-            </a:gs>
-            <a:gs pos="100000">
-              <a:schemeClr val="phClr">
-                <a:shade val="30000"/>
-                <a:satMod val="200000"/>
-              </a:schemeClr>
-            </a:gs>
-          </a:gsLst>
-          <a:path path="circle">
-            <a:fillToRect l="50000" t="50000" r="50000" b="50000"/>
-          </a:path>
-        </a:gradFill>
-      </a:bgFillStyleLst>
-    </a:fmtScheme>
-  </a:themeElements>
-  <a:objectDefaults/>
-  <a:extraClrSchemeLst/>
-</a:theme>
-</file>
-
-<file path=ppt/theme/theme3.xml><?xml version="1.0" encoding="utf-8"?>
-<a:theme xmlns:a="http://schemas.openxmlformats.org/drawingml/2006/main" name="Office Theme">
-  <a:themeElements>
-    <a:clrScheme name="Office">
-      <a:dk1>
-        <a:sysClr val="windowText" lastClr="000000"/>
-      </a:dk1>
-      <a:lt1>
-        <a:sysClr val="window" lastClr="FFFFFF"/>
-      </a:lt1>
-      <a:dk2>
-        <a:srgbClr val="44546A"/>
-      </a:dk2>
-      <a:lt2>
-        <a:srgbClr val="E7E6E6"/>
-      </a:lt2>
-      <a:accent1>
-        <a:srgbClr val="5B9BD5"/>
-      </a:accent1>
-      <a:accent2>
-        <a:srgbClr val="ED7D31"/>
-      </a:accent2>
-      <a:accent3>
-        <a:srgbClr val="A5A5A5"/>
-      </a:accent3>
-      <a:accent4>
-        <a:srgbClr val="FFC000"/>
-      </a:accent4>
-      <a:accent5>
-        <a:srgbClr val="4472C4"/>
-      </a:accent5>
-      <a:accent6>
-        <a:srgbClr val="70AD47"/>
-      </a:accent6>
-      <a:hlink>
-        <a:srgbClr val="0563C1"/>
-      </a:hlink>
-      <a:folHlink>
-        <a:srgbClr val="954F72"/>
-      </a:folHlink>
-    </a:clrScheme>
-    <a:fontScheme name="Office">
-      <a:majorFont>
-        <a:latin typeface="Calibri Light" panose="020F0302020204030204"/>
-        <a:ea typeface=""/>
-        <a:cs typeface=""/>
-        <a:font script="Jpan" typeface="ＭＳ Ｐゴシック"/>
-        <a:font script="Hang" typeface="맑은 고딕"/>
-        <a:font script="Hans" typeface="宋体"/>
-        <a:font script="Hant" typeface="新細明體"/>
-        <a:font script="Arab" typeface="Times New Roman"/>
-        <a:font script="Hebr" typeface="Times New Roman"/>
-        <a:font script="Thai" typeface="Angsana New"/>
-        <a:font script="Ethi" typeface="Nyala"/>
-        <a:font script="Beng" typeface="Vrinda"/>
-        <a:font script="Gujr" typeface="Shruti"/>
-        <a:font script="Khmr" typeface="MoolBoran"/>
-        <a:font script="Knda" typeface="Tunga"/>
-        <a:font script="Guru" typeface="Raavi"/>
-        <a:font script="Cans" typeface="Euphemia"/>
-        <a:font script="Cher" typeface="Plantagenet Cherokee"/>
-        <a:font script="Yiii" typeface="Microsoft Yi Baiti"/>
-        <a:font script="Tibt" typeface="Microsoft Himalaya"/>
-        <a:font script="Thaa" typeface="MV Boli"/>
-        <a:font script="Deva" typeface="Mangal"/>
-        <a:font script="Telu" typeface="Gautami"/>
-        <a:font script="Taml" typeface="Latha"/>
-        <a:font script="Syrc" typeface="Estrangelo Edessa"/>
-        <a:font script="Orya" typeface="Kalinga"/>
-        <a:font script="Mlym" typeface="Kartika"/>
-        <a:font script="Laoo" typeface="DokChampa"/>
-        <a:font script="Sinh" typeface="Iskoola Pota"/>
-        <a:font script="Mong" typeface="Mongolian Baiti"/>
-        <a:font script="Viet" typeface="Times New Roman"/>
-        <a:font script="Uigh" typeface="Microsoft Uighur"/>
-        <a:font script="Geor" typeface="Sylfaen"/>
-      </a:majorFont>
-      <a:minorFont>
-        <a:latin typeface="Calibri" panose="020F0502020204030204"/>
-        <a:ea typeface=""/>
-        <a:cs typeface=""/>
-        <a:font script="Jpan" typeface="ＭＳ Ｐゴシック"/>
-        <a:font script="Hang" typeface="맑은 고딕"/>
-        <a:font script="Hans" typeface="宋体"/>
-        <a:font script="Hant" typeface="新細明體"/>
-        <a:font script="Arab" typeface="Arial"/>
-        <a:font script="Hebr" typeface="Arial"/>
-        <a:font script="Thai" typeface="Cordia New"/>
-        <a:font script="Ethi" typeface="Nyala"/>
-        <a:font script="Beng" typeface="Vrinda"/>
-        <a:font script="Gujr" typeface="Shruti"/>
-        <a:font script="Khmr" typeface="DaunPenh"/>
-        <a:font script="Knda" typeface="Tunga"/>
-        <a:font script="Guru" typeface="Raavi"/>
-        <a:font script="Cans" typeface="Euphemia"/>
-        <a:font script="Cher" typeface="Plantagenet Cherokee"/>
-        <a:font script="Yiii" typeface="Microsoft Yi Baiti"/>
-        <a:font script="Tibt" typeface="Microsoft Himalaya"/>
-        <a:font script="Thaa" typeface="MV Boli"/>
-        <a:font script="Deva" typeface="Mangal"/>
-        <a:font script="Telu" typeface="Gautami"/>
-        <a:font script="Taml" typeface="Latha"/>
-        <a:font script="Syrc" typeface="Estrangelo Edessa"/>
-        <a:font script="Orya" typeface="Kalinga"/>
-        <a:font script="Mlym" typeface="Kartika"/>
-        <a:font script="Laoo" typeface="DokChampa"/>
-        <a:font script="Sinh" typeface="Iskoola Pota"/>
-        <a:font script="Mong" typeface="Mongolian Baiti"/>
-        <a:font script="Viet" typeface="Arial"/>
-        <a:font script="Uigh" typeface="Microsoft Uighur"/>
-        <a:font script="Geor" typeface="Sylfaen"/>
+        <a:font script="Armn" typeface="Arial"/>
+        <a:font script="Bugi" typeface="Leelawadee UI"/>
+        <a:font script="Bopo" typeface="Microsoft JhengHei"/>
+        <a:font script="Java" typeface="Javanese Text"/>
+        <a:font script="Lisu" typeface="Segoe UI"/>
+        <a:font script="Mymr" typeface="Myanmar Text"/>
+        <a:font script="Nkoo" typeface="Ebrima"/>
+        <a:font script="Olck" typeface="Nirmala UI"/>
+        <a:font script="Osma" typeface="Ebrima"/>
+        <a:font script="Phag" typeface="Phagspa"/>
+        <a:font script="Syrn" typeface="Estrangelo Edessa"/>
+        <a:font script="Syrj" typeface="Estrangelo Edessa"/>
+        <a:font script="Syre" typeface="Estrangelo Edessa"/>
+        <a:font script="Sora" typeface="Nirmala UI"/>
+        <a:font script="Tale" typeface="Microsoft Tai Le"/>
+        <a:font script="Talu" typeface="Microsoft New Tai Lue"/>
+        <a:font script="Tfng" typeface="Ebrima"/>
       </a:minorFont>
     </a:fontScheme>
     <a:fmtScheme name="Office">
@@ -5742,13 +4988,6 @@
         </a:gradFill>
       </a:fillStyleLst>
       <a:lnStyleLst>
-        <a:ln w="6350" cap="flat" cmpd="sng" algn="ctr">
-          <a:solidFill>
-            <a:schemeClr val="phClr"/>
-          </a:solidFill>
-          <a:prstDash val="solid"/>
-          <a:miter lim="800000"/>
-        </a:ln>
         <a:ln w="12700" cap="flat" cmpd="sng" algn="ctr">
           <a:solidFill>
             <a:schemeClr val="phClr"/>
@@ -5757,6 +4996,13 @@
           <a:miter lim="800000"/>
         </a:ln>
         <a:ln w="19050" cap="flat" cmpd="sng" algn="ctr">
+          <a:solidFill>
+            <a:schemeClr val="phClr"/>
+          </a:solidFill>
+          <a:prstDash val="solid"/>
+          <a:miter lim="800000"/>
+        </a:ln>
+        <a:ln w="25400" cap="flat" cmpd="sng" algn="ctr">
           <a:solidFill>
             <a:schemeClr val="phClr"/>
           </a:solidFill>
@@ -5821,11 +5067,31 @@
       </a:bgFillStyleLst>
     </a:fmtScheme>
   </a:themeElements>
-  <a:objectDefaults/>
+  <a:objectDefaults>
+    <a:lnDef>
+      <a:spPr/>
+      <a:bodyPr/>
+      <a:lstStyle/>
+      <a:style>
+        <a:lnRef idx="2">
+          <a:schemeClr val="accent1"/>
+        </a:lnRef>
+        <a:fillRef idx="0">
+          <a:schemeClr val="accent1"/>
+        </a:fillRef>
+        <a:effectRef idx="1">
+          <a:schemeClr val="accent1"/>
+        </a:effectRef>
+        <a:fontRef idx="minor">
+          <a:schemeClr val="tx1"/>
+        </a:fontRef>
+      </a:style>
+    </a:lnDef>
+  </a:objectDefaults>
   <a:extraClrSchemeLst/>
   <a:extLst>
     <a:ext uri="{05A4C25C-085E-4340-85A3-A5531E510DB2}">
-      <thm15:themeFamily xmlns:thm15="http://schemas.microsoft.com/office/thememl/2012/main" name="Office Theme" id="{62F939B6-93AF-4DB8-9C6B-D6C7DFDC589F}" vid="{4A3C46E8-61CC-4603-A589-7422A47A8E4A}"/>
+      <thm15:themeFamily xmlns:thm15="http://schemas.microsoft.com/office/thememl/2012/main" name="Office Theme" id="{2E142A2C-CD16-42D6-873A-C26D2A0506FA}" vid="{1BDDFF52-6CD6-40A5-AB3C-68EB2F1E4D0A}"/>
     </a:ext>
   </a:extLst>
 </a:theme>
@@ -5841,33 +5107,22 @@
 </file>
 
 <file path=customXml/item2.xml><?xml version="1.0" encoding="utf-8"?>
-<p:properties xmlns:p="http://schemas.microsoft.com/office/2006/metadata/properties" xmlns:xsi="http://www.w3.org/2001/XMLSchema-instance">
-  <documentManagement>
-    <_dlc_DocId xmlns="fb40db85-15e7-4374-938c-640af835de2c">KEDUC3FV4PV5-1655542392-23</_dlc_DocId>
-    <_dlc_DocIdUrl xmlns="fb40db85-15e7-4374-938c-640af835de2c">
-      <Url>https://usaf.dps.mil/sites/afpc-home/CM/_layouts/15/DocIdRedir.aspx?ID=KEDUC3FV4PV5-1655542392-23</Url>
-      <Description>KEDUC3FV4PV5-1655542392-23</Description>
-    </_dlc_DocIdUrl>
-  </documentManagement>
-</p:properties>
-</file>
-
-<file path=customXml/item3.xml><?xml version="1.0" encoding="utf-8"?>
-<ct:contentTypeSchema xmlns:ct="http://schemas.microsoft.com/office/2006/metadata/contentType" xmlns:ma="http://schemas.microsoft.com/office/2006/metadata/properties/metaAttributes" ct:_="" ma:_="" ma:contentTypeName="Document" ma:contentTypeID="0x010100BD6B77688A690C42B2638265E190DB0F" ma:contentTypeVersion="2" ma:contentTypeDescription="Create a new document." ma:contentTypeScope="" ma:versionID="80a7b2f511cabe8a5713c9b6480de24f">
-  <xsd:schema xmlns:xsd="http://www.w3.org/2001/XMLSchema" xmlns:xs="http://www.w3.org/2001/XMLSchema" xmlns:p="http://schemas.microsoft.com/office/2006/metadata/properties" xmlns:ns2="fb40db85-15e7-4374-938c-640af835de2c" xmlns:ns3="0b3afc86-20cd-4f93-8ffa-e067fefdd54a" targetNamespace="http://schemas.microsoft.com/office/2006/metadata/properties" ma:root="true" ma:fieldsID="b1f89d50e62445a6f85bf6dc9a67c282" ns2:_="" ns3:_="">
-    <xsd:import namespace="fb40db85-15e7-4374-938c-640af835de2c"/>
-    <xsd:import namespace="0b3afc86-20cd-4f93-8ffa-e067fefdd54a"/>
+<ct:contentTypeSchema xmlns:ct="http://schemas.microsoft.com/office/2006/metadata/contentType" xmlns:ma="http://schemas.microsoft.com/office/2006/metadata/properties/metaAttributes" ct:_="" ma:_="" ma:contentTypeName="Document" ma:contentTypeID="0x0101001B8007EF56209341AB6C2B13A6FE027B" ma:contentTypeVersion="6" ma:contentTypeDescription="Create a new document." ma:contentTypeScope="" ma:versionID="b22d9e08d33ca08643843c5f141e68d5">
+  <xsd:schema xmlns:xsd="http://www.w3.org/2001/XMLSchema" xmlns:xs="http://www.w3.org/2001/XMLSchema" xmlns:p="http://schemas.microsoft.com/office/2006/metadata/properties" xmlns:ns2="531bccbd-292c-49ab-9a0b-b4c770216460" xmlns:ns3="0e9d41ae-4249-446b-8316-88e9fdc24f25" targetNamespace="http://schemas.microsoft.com/office/2006/metadata/properties" ma:root="true" ma:fieldsID="1c13f5d751eac189b4ea056eaab342b0" ns2:_="" ns3:_="">
+    <xsd:import namespace="531bccbd-292c-49ab-9a0b-b4c770216460"/>
+    <xsd:import namespace="0e9d41ae-4249-446b-8316-88e9fdc24f25"/>
     <xsd:element name="properties">
       <xsd:complexType>
         <xsd:sequence>
           <xsd:element name="documentManagement">
             <xsd:complexType>
               <xsd:all>
-                <xsd:element ref="ns2:_dlc_DocId" minOccurs="0"/>
-                <xsd:element ref="ns2:_dlc_DocIdUrl" minOccurs="0"/>
-                <xsd:element ref="ns2:_dlc_DocIdPersistId" minOccurs="0"/>
-                <xsd:element ref="ns3:MediaServiceMetadata" minOccurs="0"/>
-                <xsd:element ref="ns3:MediaServiceFastMetadata" minOccurs="0"/>
+                <xsd:element ref="ns2:MediaServiceMetadata" minOccurs="0"/>
+                <xsd:element ref="ns2:MediaServiceFastMetadata" minOccurs="0"/>
+                <xsd:element ref="ns2:MediaServiceObjectDetectorVersions" minOccurs="0"/>
+                <xsd:element ref="ns2:MediaServiceSearchProperties" minOccurs="0"/>
+                <xsd:element ref="ns3:SharedWithUsers" minOccurs="0"/>
+                <xsd:element ref="ns3:SharedWithDetails" minOccurs="0"/>
               </xsd:all>
             </xsd:complexType>
           </xsd:element>
@@ -5875,43 +5130,57 @@
       </xsd:complexType>
     </xsd:element>
   </xsd:schema>
-  <xsd:schema xmlns:xsd="http://www.w3.org/2001/XMLSchema" xmlns:xs="http://www.w3.org/2001/XMLSchema" xmlns:dms="http://schemas.microsoft.com/office/2006/documentManagement/types" xmlns:pc="http://schemas.microsoft.com/office/infopath/2007/PartnerControls" targetNamespace="fb40db85-15e7-4374-938c-640af835de2c" elementFormDefault="qualified">
+  <xsd:schema xmlns:xsd="http://www.w3.org/2001/XMLSchema" xmlns:xs="http://www.w3.org/2001/XMLSchema" xmlns:dms="http://schemas.microsoft.com/office/2006/documentManagement/types" xmlns:pc="http://schemas.microsoft.com/office/infopath/2007/PartnerControls" targetNamespace="531bccbd-292c-49ab-9a0b-b4c770216460" elementFormDefault="qualified">
     <xsd:import namespace="http://schemas.microsoft.com/office/2006/documentManagement/types"/>
     <xsd:import namespace="http://schemas.microsoft.com/office/infopath/2007/PartnerControls"/>
-    <xsd:element name="_dlc_DocId" ma:index="8" nillable="true" ma:displayName="Document ID Value" ma:description="The value of the document ID assigned to this item." ma:internalName="_dlc_DocId" ma:readOnly="true">
+    <xsd:element name="MediaServiceMetadata" ma:index="8" nillable="true" ma:displayName="MediaServiceMetadata" ma:hidden="true" ma:internalName="MediaServiceMetadata" ma:readOnly="true">
+      <xsd:simpleType>
+        <xsd:restriction base="dms:Note"/>
+      </xsd:simpleType>
+    </xsd:element>
+    <xsd:element name="MediaServiceFastMetadata" ma:index="9" nillable="true" ma:displayName="MediaServiceFastMetadata" ma:hidden="true" ma:internalName="MediaServiceFastMetadata" ma:readOnly="true">
+      <xsd:simpleType>
+        <xsd:restriction base="dms:Note"/>
+      </xsd:simpleType>
+    </xsd:element>
+    <xsd:element name="MediaServiceObjectDetectorVersions" ma:index="10" nillable="true" ma:displayName="MediaServiceObjectDetectorVersions" ma:hidden="true" ma:indexed="true" ma:internalName="MediaServiceObjectDetectorVersions" ma:readOnly="true">
       <xsd:simpleType>
         <xsd:restriction base="dms:Text"/>
       </xsd:simpleType>
     </xsd:element>
-    <xsd:element name="_dlc_DocIdUrl" ma:index="9" nillable="true" ma:displayName="Document ID" ma:description="Permanent link to this document." ma:hidden="true" ma:internalName="_dlc_DocIdUrl" ma:readOnly="true">
+    <xsd:element name="MediaServiceSearchProperties" ma:index="11" nillable="true" ma:displayName="MediaServiceSearchProperties" ma:hidden="true" ma:internalName="MediaServiceSearchProperties" ma:readOnly="true">
+      <xsd:simpleType>
+        <xsd:restriction base="dms:Note"/>
+      </xsd:simpleType>
+    </xsd:element>
+  </xsd:schema>
+  <xsd:schema xmlns:xsd="http://www.w3.org/2001/XMLSchema" xmlns:xs="http://www.w3.org/2001/XMLSchema" xmlns:dms="http://schemas.microsoft.com/office/2006/documentManagement/types" xmlns:pc="http://schemas.microsoft.com/office/infopath/2007/PartnerControls" targetNamespace="0e9d41ae-4249-446b-8316-88e9fdc24f25" elementFormDefault="qualified">
+    <xsd:import namespace="http://schemas.microsoft.com/office/2006/documentManagement/types"/>
+    <xsd:import namespace="http://schemas.microsoft.com/office/infopath/2007/PartnerControls"/>
+    <xsd:element name="SharedWithUsers" ma:index="12" nillable="true" ma:displayName="Shared With" ma:internalName="SharedWithUsers" ma:readOnly="true">
       <xsd:complexType>
         <xsd:complexContent>
-          <xsd:extension base="dms:URL">
+          <xsd:extension base="dms:UserMulti">
             <xsd:sequence>
-              <xsd:element name="Url" type="dms:ValidUrl" minOccurs="0" nillable="true"/>
-              <xsd:element name="Description" type="xsd:string" nillable="true"/>
+              <xsd:element name="UserInfo" minOccurs="0" maxOccurs="unbounded">
+                <xsd:complexType>
+                  <xsd:sequence>
+                    <xsd:element name="DisplayName" type="xsd:string" minOccurs="0"/>
+                    <xsd:element name="AccountId" type="dms:UserId" minOccurs="0" nillable="true"/>
+                    <xsd:element name="AccountType" type="xsd:string" minOccurs="0"/>
+                  </xsd:sequence>
+                </xsd:complexType>
+              </xsd:element>
             </xsd:sequence>
           </xsd:extension>
         </xsd:complexContent>
       </xsd:complexType>
     </xsd:element>
-    <xsd:element name="_dlc_DocIdPersistId" ma:index="10" nillable="true" ma:displayName="Persist ID" ma:description="Keep ID on add." ma:hidden="true" ma:internalName="_dlc_DocIdPersistId" ma:readOnly="true">
+    <xsd:element name="SharedWithDetails" ma:index="13" nillable="true" ma:displayName="Shared With Details" ma:internalName="SharedWithDetails" ma:readOnly="true">
       <xsd:simpleType>
-        <xsd:restriction base="dms:Boolean"/>
-      </xsd:simpleType>
-    </xsd:element>
-  </xsd:schema>
-  <xsd:schema xmlns:xsd="http://www.w3.org/2001/XMLSchema" xmlns:xs="http://www.w3.org/2001/XMLSchema" xmlns:dms="http://schemas.microsoft.com/office/2006/documentManagement/types" xmlns:pc="http://schemas.microsoft.com/office/infopath/2007/PartnerControls" targetNamespace="0b3afc86-20cd-4f93-8ffa-e067fefdd54a" elementFormDefault="qualified">
-    <xsd:import namespace="http://schemas.microsoft.com/office/2006/documentManagement/types"/>
-    <xsd:import namespace="http://schemas.microsoft.com/office/infopath/2007/PartnerControls"/>
-    <xsd:element name="MediaServiceMetadata" ma:index="11" nillable="true" ma:displayName="MediaServiceMetadata" ma:hidden="true" ma:internalName="MediaServiceMetadata" ma:readOnly="true">
-      <xsd:simpleType>
-        <xsd:restriction base="dms:Note"/>
-      </xsd:simpleType>
-    </xsd:element>
-    <xsd:element name="MediaServiceFastMetadata" ma:index="12" nillable="true" ma:displayName="MediaServiceFastMetadata" ma:hidden="true" ma:internalName="MediaServiceFastMetadata" ma:readOnly="true">
-      <xsd:simpleType>
-        <xsd:restriction base="dms:Note"/>
+        <xsd:restriction base="dms:Note">
+          <xsd:maxLength value="255"/>
+        </xsd:restriction>
       </xsd:simpleType>
     </xsd:element>
   </xsd:schema>
@@ -6014,58 +5283,14 @@
 </ct:contentTypeSchema>
 </file>
 
-<file path=customXml/item4.xml><?xml version="1.0" encoding="utf-8"?>
-<?mso-contentType ?>
-<spe:Receivers xmlns:spe="http://schemas.microsoft.com/sharepoint/events">
-  <Receiver>
-    <Name>Document ID Generator</Name>
-    <Synchronization>Synchronous</Synchronization>
-    <Type>10001</Type>
-    <SequenceNumber>1000</SequenceNumber>
-    <Url/>
-    <Assembly>Microsoft.Office.DocumentManagement, Version=16.0.0.0, Culture=neutral, PublicKeyToken=71e9bce111e9429c</Assembly>
-    <Class>Microsoft.Office.DocumentManagement.Internal.DocIdHandler</Class>
-    <Data/>
-    <Filter/>
-  </Receiver>
-  <Receiver>
-    <Name>Document ID Generator</Name>
-    <Synchronization>Synchronous</Synchronization>
-    <Type>10002</Type>
-    <SequenceNumber>1001</SequenceNumber>
-    <Url/>
-    <Assembly>Microsoft.Office.DocumentManagement, Version=16.0.0.0, Culture=neutral, PublicKeyToken=71e9bce111e9429c</Assembly>
-    <Class>Microsoft.Office.DocumentManagement.Internal.DocIdHandler</Class>
-    <Data/>
-    <Filter/>
-  </Receiver>
-  <Receiver>
-    <Name>Document ID Generator</Name>
-    <Synchronization>Synchronous</Synchronization>
-    <Type>10004</Type>
-    <SequenceNumber>1002</SequenceNumber>
-    <Url/>
-    <Assembly>Microsoft.Office.DocumentManagement, Version=16.0.0.0, Culture=neutral, PublicKeyToken=71e9bce111e9429c</Assembly>
-    <Class>Microsoft.Office.DocumentManagement.Internal.DocIdHandler</Class>
-    <Data/>
-    <Filter/>
-  </Receiver>
-  <Receiver>
-    <Name>Document ID Generator</Name>
-    <Synchronization>Synchronous</Synchronization>
-    <Type>10006</Type>
-    <SequenceNumber>1003</SequenceNumber>
-    <Url/>
-    <Assembly>Microsoft.Office.DocumentManagement, Version=16.0.0.0, Culture=neutral, PublicKeyToken=71e9bce111e9429c</Assembly>
-    <Class>Microsoft.Office.DocumentManagement.Internal.DocIdHandler</Class>
-    <Data/>
-    <Filter/>
-  </Receiver>
-</spe:Receivers>
+<file path=customXml/item3.xml><?xml version="1.0" encoding="utf-8"?>
+<p:properties xmlns:p="http://schemas.microsoft.com/office/2006/metadata/properties" xmlns:xsi="http://www.w3.org/2001/XMLSchema-instance" xmlns:pc="http://schemas.microsoft.com/office/infopath/2007/PartnerControls">
+  <documentManagement/>
+</p:properties>
 </file>
 
 <file path=customXml/itemProps1.xml><?xml version="1.0" encoding="utf-8"?>
-<ds:datastoreItem xmlns:ds="http://schemas.openxmlformats.org/officeDocument/2006/customXml" ds:itemID="{AD70942B-67CC-4766-8E64-6B701B2DF5F4}">
+<ds:datastoreItem xmlns:ds="http://schemas.openxmlformats.org/officeDocument/2006/customXml" ds:itemID="{F0210A9E-FB7A-4395-8F34-1716D0AD47AF}">
   <ds:schemaRefs>
     <ds:schemaRef ds:uri="http://schemas.microsoft.com/sharepoint/v3/contenttype/forms"/>
   </ds:schemaRefs>
@@ -6073,45 +5298,43 @@
 </file>
 
 <file path=customXml/itemProps2.xml><?xml version="1.0" encoding="utf-8"?>
-<ds:datastoreItem xmlns:ds="http://schemas.openxmlformats.org/officeDocument/2006/customXml" ds:itemID="{33B5525E-3377-4F7F-AF5A-BED6F1602287}">
+<ds:datastoreItem xmlns:ds="http://schemas.openxmlformats.org/officeDocument/2006/customXml" ds:itemID="{918EDA23-B0B4-4354-B462-6C424B3AB55D}">
   <ds:schemaRefs>
+    <ds:schemaRef ds:uri="0e9d41ae-4249-446b-8316-88e9fdc24f25"/>
+    <ds:schemaRef ds:uri="531bccbd-292c-49ab-9a0b-b4c770216460"/>
+    <ds:schemaRef ds:uri="http://purl.org/dc/elements/1.1/"/>
+    <ds:schemaRef ds:uri="http://purl.org/dc/terms/"/>
+    <ds:schemaRef ds:uri="http://schemas.microsoft.com/internal/obd"/>
+    <ds:schemaRef ds:uri="http://schemas.microsoft.com/office/2006/documentManagement/types"/>
+    <ds:schemaRef ds:uri="http://schemas.microsoft.com/office/2006/metadata/contentType"/>
+    <ds:schemaRef ds:uri="http://schemas.microsoft.com/office/2006/metadata/properties"/>
+    <ds:schemaRef ds:uri="http://schemas.microsoft.com/office/2006/metadata/properties/metaAttributes"/>
+    <ds:schemaRef ds:uri="http://schemas.microsoft.com/office/infopath/2007/PartnerControls"/>
     <ds:schemaRef ds:uri="http://schemas.openxmlformats.org/package/2006/metadata/core-properties"/>
-    <ds:schemaRef ds:uri="http://purl.org/dc/terms/"/>
-    <ds:schemaRef ds:uri="http://schemas.microsoft.com/office/infopath/2007/PartnerControls"/>
-    <ds:schemaRef ds:uri="http://schemas.microsoft.com/office/2006/documentManagement/types"/>
-    <ds:schemaRef ds:uri="http://purl.org/dc/elements/1.1/"/>
-    <ds:schemaRef ds:uri="http://schemas.microsoft.com/office/2006/metadata/properties"/>
-    <ds:schemaRef ds:uri="5cbdda85-93df-4f67-beda-b931f93d828b"/>
-    <ds:schemaRef ds:uri="http://www.w3.org/XML/1998/namespace"/>
-    <ds:schemaRef ds:uri="http://purl.org/dc/dcmitype/"/>
-    <ds:schemaRef ds:uri="fb40db85-15e7-4374-938c-640af835de2c"/>
+    <ds:schemaRef ds:uri="http://www.w3.org/2001/XMLSchema"/>
   </ds:schemaRefs>
 </ds:datastoreItem>
 </file>
 
 <file path=customXml/itemProps3.xml><?xml version="1.0" encoding="utf-8"?>
-<ds:datastoreItem xmlns:ds="http://schemas.openxmlformats.org/officeDocument/2006/customXml" ds:itemID="{4D12CDE2-96A9-4530-9A53-34C778CB59A8}">
+<ds:datastoreItem xmlns:ds="http://schemas.openxmlformats.org/officeDocument/2006/customXml" ds:itemID="{F4FCE405-1005-4980-8098-E51D3FB2D57F}">
   <ds:schemaRefs>
-    <ds:schemaRef ds:uri="http://schemas.microsoft.com/office/2006/metadata/contentType"/>
-    <ds:schemaRef ds:uri="http://schemas.microsoft.com/office/2006/metadata/properties/metaAttributes"/>
-    <ds:schemaRef ds:uri="http://www.w3.org/2001/XMLSchema"/>
+    <ds:schemaRef ds:uri="0e9d41ae-4249-446b-8316-88e9fdc24f25"/>
+    <ds:schemaRef ds:uri="531bccbd-292c-49ab-9a0b-b4c770216460"/>
+    <ds:schemaRef ds:uri="http://purl.org/dc/dcmitype/"/>
+    <ds:schemaRef ds:uri="http://purl.org/dc/elements/1.1/"/>
+    <ds:schemaRef ds:uri="http://purl.org/dc/terms/"/>
+    <ds:schemaRef ds:uri="http://schemas.microsoft.com/office/2006/documentManagement/types"/>
     <ds:schemaRef ds:uri="http://schemas.microsoft.com/office/2006/metadata/properties"/>
-    <ds:schemaRef ds:uri="fb40db85-15e7-4374-938c-640af835de2c"/>
-    <ds:schemaRef ds:uri="0b3afc86-20cd-4f93-8ffa-e067fefdd54a"/>
-    <ds:schemaRef ds:uri="http://schemas.microsoft.com/office/2006/documentManagement/types"/>
     <ds:schemaRef ds:uri="http://schemas.microsoft.com/office/infopath/2007/PartnerControls"/>
     <ds:schemaRef ds:uri="http://schemas.openxmlformats.org/package/2006/metadata/core-properties"/>
-    <ds:schemaRef ds:uri="http://purl.org/dc/elements/1.1/"/>
-    <ds:schemaRef ds:uri="http://purl.org/dc/terms/"/>
-    <ds:schemaRef ds:uri="http://schemas.microsoft.com/internal/obd"/>
+    <ds:schemaRef ds:uri="http://www.w3.org/XML/1998/namespace"/>
   </ds:schemaRefs>
 </ds:datastoreItem>
 </file>
 
-<file path=customXml/itemProps4.xml><?xml version="1.0" encoding="utf-8"?>
-<ds:datastoreItem xmlns:ds="http://schemas.openxmlformats.org/officeDocument/2006/customXml" ds:itemID="{4E886D4B-5FD2-47BC-9068-6B1D9B6D1568}">
-  <ds:schemaRefs>
-    <ds:schemaRef ds:uri="http://schemas.microsoft.com/sharepoint/events"/>
-  </ds:schemaRefs>
-</ds:datastoreItem>
+<file path=docMetadata/LabelInfo.xml><?xml version="1.0" encoding="utf-8"?>
+<clbl:labelList xmlns:clbl="http://schemas.microsoft.com/office/2020/mipLabelMetadata">
+  <clbl:label id="{8331b18d-2d87-48ef-a35f-ac8818ebf9b4}" enabled="0" method="" siteId="{8331b18d-2d87-48ef-a35f-ac8818ebf9b4}" removed="1"/>
+</clbl:labelList>
 </file>
</xml_diff>